<commit_message>
updating powerpoint for the piechart
</commit_message>
<xml_diff>
--- a/Presentation - Project 1.pptx
+++ b/Presentation - Project 1.pptx
@@ -5,7 +5,7 @@
     <p:sldMasterId id="2147483648" r:id="rId1"/>
   </p:sldMasterIdLst>
   <p:notesMasterIdLst>
-    <p:notesMasterId r:id="rId13"/>
+    <p:notesMasterId r:id="rId14"/>
   </p:notesMasterIdLst>
   <p:sldIdLst>
     <p:sldId id="256" r:id="rId2"/>
@@ -13,12 +13,13 @@
     <p:sldId id="259" r:id="rId4"/>
     <p:sldId id="260" r:id="rId5"/>
     <p:sldId id="268" r:id="rId6"/>
-    <p:sldId id="257" r:id="rId7"/>
-    <p:sldId id="265" r:id="rId8"/>
-    <p:sldId id="266" r:id="rId9"/>
-    <p:sldId id="262" r:id="rId10"/>
-    <p:sldId id="263" r:id="rId11"/>
-    <p:sldId id="264" r:id="rId12"/>
+    <p:sldId id="269" r:id="rId7"/>
+    <p:sldId id="257" r:id="rId8"/>
+    <p:sldId id="265" r:id="rId9"/>
+    <p:sldId id="266" r:id="rId10"/>
+    <p:sldId id="262" r:id="rId11"/>
+    <p:sldId id="263" r:id="rId12"/>
+    <p:sldId id="264" r:id="rId13"/>
   </p:sldIdLst>
   <p:sldSz cx="12192000" cy="6858000"/>
   <p:notesSz cx="6858000" cy="9144000"/>
@@ -6275,6 +6276,107 @@
           <p:cNvPr id="2" name="Title 1">
             <a:extLst>
               <a:ext uri="{FF2B5EF4-FFF2-40B4-BE49-F238E27FC236}">
+                <a16:creationId xmlns:a16="http://schemas.microsoft.com/office/drawing/2014/main" id="{779939FC-E1A4-4777-8A48-719D2D9DEF40}"/>
+              </a:ext>
+            </a:extLst>
+          </p:cNvPr>
+          <p:cNvSpPr>
+            <a:spLocks noGrp="1"/>
+          </p:cNvSpPr>
+          <p:nvPr>
+            <p:ph type="title"/>
+          </p:nvPr>
+        </p:nvSpPr>
+        <p:spPr/>
+        <p:txBody>
+          <a:bodyPr/>
+          <a:lstStyle/>
+          <a:p>
+            <a:r>
+              <a:rPr lang="en-US" dirty="0"/>
+              <a:t>Discussion</a:t>
+            </a:r>
+          </a:p>
+        </p:txBody>
+      </p:sp>
+      <p:sp>
+        <p:nvSpPr>
+          <p:cNvPr id="3" name="Content Placeholder 2">
+            <a:extLst>
+              <a:ext uri="{FF2B5EF4-FFF2-40B4-BE49-F238E27FC236}">
+                <a16:creationId xmlns:a16="http://schemas.microsoft.com/office/drawing/2014/main" id="{2B85A8BF-CD6D-42FF-BBFC-29DDE9615866}"/>
+              </a:ext>
+            </a:extLst>
+          </p:cNvPr>
+          <p:cNvSpPr>
+            <a:spLocks noGrp="1"/>
+          </p:cNvSpPr>
+          <p:nvPr>
+            <p:ph idx="1"/>
+          </p:nvPr>
+        </p:nvSpPr>
+        <p:spPr/>
+        <p:txBody>
+          <a:bodyPr/>
+          <a:lstStyle/>
+          <a:p>
+            <a:r>
+              <a:rPr lang="en-US" dirty="0"/>
+              <a:t>States with low stats decrease the trends YOY/State to State</a:t>
+            </a:r>
+          </a:p>
+          <a:p>
+            <a:r>
+              <a:rPr lang="en-US" dirty="0"/>
+              <a:t>There are correlations between types of fire and fire size</a:t>
+            </a:r>
+          </a:p>
+          <a:p>
+            <a:r>
+              <a:rPr lang="en-US" dirty="0"/>
+              <a:t>There is an obvious concentration of fires on the West Coast from California up to Alaska</a:t>
+            </a:r>
+          </a:p>
+          <a:p>
+            <a:endParaRPr lang="en-US" dirty="0"/>
+          </a:p>
+        </p:txBody>
+      </p:sp>
+    </p:spTree>
+    <p:extLst>
+      <p:ext uri="{BB962C8B-B14F-4D97-AF65-F5344CB8AC3E}">
+        <p14:creationId xmlns:p14="http://schemas.microsoft.com/office/powerpoint/2010/main" val="2915610449"/>
+      </p:ext>
+    </p:extLst>
+  </p:cSld>
+  <p:clrMapOvr>
+    <a:masterClrMapping/>
+  </p:clrMapOvr>
+</p:sld>
+</file>
+
+<file path=ppt/slides/slide11.xml><?xml version="1.0" encoding="utf-8"?>
+<p:sld xmlns:a="http://schemas.openxmlformats.org/drawingml/2006/main" xmlns:r="http://schemas.openxmlformats.org/officeDocument/2006/relationships" xmlns:p="http://schemas.openxmlformats.org/presentationml/2006/main">
+  <p:cSld>
+    <p:spTree>
+      <p:nvGrpSpPr>
+        <p:cNvPr id="1" name=""/>
+        <p:cNvGrpSpPr/>
+        <p:nvPr/>
+      </p:nvGrpSpPr>
+      <p:grpSpPr>
+        <a:xfrm>
+          <a:off x="0" y="0"/>
+          <a:ext cx="0" cy="0"/>
+          <a:chOff x="0" y="0"/>
+          <a:chExt cx="0" cy="0"/>
+        </a:xfrm>
+      </p:grpSpPr>
+      <p:sp>
+        <p:nvSpPr>
+          <p:cNvPr id="2" name="Title 1">
+            <a:extLst>
+              <a:ext uri="{FF2B5EF4-FFF2-40B4-BE49-F238E27FC236}">
                 <a16:creationId xmlns:a16="http://schemas.microsoft.com/office/drawing/2014/main" id="{98387A69-2263-46AA-8AC5-1C27CAA82C3A}"/>
               </a:ext>
             </a:extLst>
@@ -6348,7 +6450,7 @@
 </p:sld>
 </file>
 
-<file path=ppt/slides/slide11.xml><?xml version="1.0" encoding="utf-8"?>
+<file path=ppt/slides/slide12.xml><?xml version="1.0" encoding="utf-8"?>
 <p:sld xmlns:a="http://schemas.openxmlformats.org/drawingml/2006/main" xmlns:r="http://schemas.openxmlformats.org/officeDocument/2006/relationships" xmlns:p="http://schemas.openxmlformats.org/presentationml/2006/main">
   <p:cSld>
     <p:spTree>
@@ -7015,7 +7117,7 @@
           <p:cNvPr id="2" name="Title 1">
             <a:extLst>
               <a:ext uri="{FF2B5EF4-FFF2-40B4-BE49-F238E27FC236}">
-                <a16:creationId xmlns:a16="http://schemas.microsoft.com/office/drawing/2014/main" id="{19CD08C8-D4A6-4EC2-9C36-5C60792206C3}"/>
+                <a16:creationId xmlns:a16="http://schemas.microsoft.com/office/drawing/2014/main" id="{FF6EDBB6-D931-4711-B91E-6A4C7FFD5BEC}"/>
               </a:ext>
             </a:extLst>
           </p:cNvPr>
@@ -7040,10 +7142,42 @@
       </p:sp>
       <p:pic>
         <p:nvPicPr>
-          <p:cNvPr id="7" name="Picture 6" descr="A screenshot of a cell phone&#10;&#10;Description automatically generated">
+          <p:cNvPr id="4" name="Content Placeholder 3">
             <a:extLst>
               <a:ext uri="{FF2B5EF4-FFF2-40B4-BE49-F238E27FC236}">
-                <a16:creationId xmlns:a16="http://schemas.microsoft.com/office/drawing/2014/main" id="{52A0C2FC-B938-4DFB-8071-DD5C2388041C}"/>
+                <a16:creationId xmlns:a16="http://schemas.microsoft.com/office/drawing/2014/main" id="{7E68AB6F-6EE5-4F45-99A0-C6C1CA8878EE}"/>
+              </a:ext>
+            </a:extLst>
+          </p:cNvPr>
+          <p:cNvPicPr>
+            <a:picLocks noGrp="1" noChangeAspect="1"/>
+          </p:cNvPicPr>
+          <p:nvPr>
+            <p:ph idx="1"/>
+          </p:nvPr>
+        </p:nvPicPr>
+        <p:blipFill>
+          <a:blip r:embed="rId2"/>
+          <a:stretch>
+            <a:fillRect/>
+          </a:stretch>
+        </p:blipFill>
+        <p:spPr>
+          <a:xfrm>
+            <a:off x="348343" y="2264229"/>
+            <a:ext cx="5252368" cy="4114799"/>
+          </a:xfrm>
+          <a:prstGeom prst="rect">
+            <a:avLst/>
+          </a:prstGeom>
+        </p:spPr>
+      </p:pic>
+      <p:pic>
+        <p:nvPicPr>
+          <p:cNvPr id="5" name="Picture 4">
+            <a:extLst>
+              <a:ext uri="{FF2B5EF4-FFF2-40B4-BE49-F238E27FC236}">
+                <a16:creationId xmlns:a16="http://schemas.microsoft.com/office/drawing/2014/main" id="{5BCE6CFD-A2E2-4A3C-A5AE-5BF174924CF5}"/>
               </a:ext>
             </a:extLst>
           </p:cNvPr>
@@ -7053,38 +7187,6 @@
           <p:nvPr/>
         </p:nvPicPr>
         <p:blipFill>
-          <a:blip r:embed="rId2"/>
-          <a:stretch>
-            <a:fillRect/>
-          </a:stretch>
-        </p:blipFill>
-        <p:spPr>
-          <a:xfrm>
-            <a:off x="304175" y="2861669"/>
-            <a:ext cx="5487650" cy="3658433"/>
-          </a:xfrm>
-          <a:prstGeom prst="rect">
-            <a:avLst/>
-          </a:prstGeom>
-        </p:spPr>
-      </p:pic>
-      <p:pic>
-        <p:nvPicPr>
-          <p:cNvPr id="11" name="Content Placeholder 10" descr="A screenshot of a cell phone&#10;&#10;Description automatically generated">
-            <a:extLst>
-              <a:ext uri="{FF2B5EF4-FFF2-40B4-BE49-F238E27FC236}">
-                <a16:creationId xmlns:a16="http://schemas.microsoft.com/office/drawing/2014/main" id="{D7089094-FB63-4278-92AA-B5253A756850}"/>
-              </a:ext>
-            </a:extLst>
-          </p:cNvPr>
-          <p:cNvPicPr>
-            <a:picLocks noGrp="1" noChangeAspect="1"/>
-          </p:cNvPicPr>
-          <p:nvPr>
-            <p:ph idx="1"/>
-          </p:nvPr>
-        </p:nvPicPr>
-        <p:blipFill>
           <a:blip r:embed="rId3"/>
           <a:stretch>
             <a:fillRect/>
@@ -7092,35 +7194,8 @@
         </p:blipFill>
         <p:spPr>
           <a:xfrm>
-            <a:off x="6400175" y="2861669"/>
-            <a:ext cx="5487650" cy="3658433"/>
-          </a:xfrm>
-        </p:spPr>
-      </p:pic>
-      <p:pic>
-        <p:nvPicPr>
-          <p:cNvPr id="3" name="Picture 2">
-            <a:extLst>
-              <a:ext uri="{FF2B5EF4-FFF2-40B4-BE49-F238E27FC236}">
-                <a16:creationId xmlns:a16="http://schemas.microsoft.com/office/drawing/2014/main" id="{DBD354B3-5182-4A5C-8643-C862C4D6A5E1}"/>
-              </a:ext>
-            </a:extLst>
-          </p:cNvPr>
-          <p:cNvPicPr>
-            <a:picLocks noChangeAspect="1"/>
-          </p:cNvPicPr>
-          <p:nvPr/>
-        </p:nvPicPr>
-        <p:blipFill>
-          <a:blip r:embed="rId4"/>
-          <a:stretch>
-            <a:fillRect/>
-          </a:stretch>
-        </p:blipFill>
-        <p:spPr>
-          <a:xfrm>
-            <a:off x="719139" y="307415"/>
-            <a:ext cx="4352921" cy="2206943"/>
+            <a:off x="5816373" y="2707198"/>
+            <a:ext cx="6291727" cy="1200774"/>
           </a:xfrm>
           <a:prstGeom prst="rect">
             <a:avLst/>
@@ -7130,7 +7205,7 @@
     </p:spTree>
     <p:extLst>
       <p:ext uri="{BB962C8B-B14F-4D97-AF65-F5344CB8AC3E}">
-        <p14:creationId xmlns:p14="http://schemas.microsoft.com/office/powerpoint/2010/main" val="3189742200"/>
+        <p14:creationId xmlns:p14="http://schemas.microsoft.com/office/powerpoint/2010/main" val="2482300198"/>
       </p:ext>
     </p:extLst>
   </p:cSld>
@@ -7187,42 +7262,10 @@
       </p:sp>
       <p:pic>
         <p:nvPicPr>
-          <p:cNvPr id="6" name="Content Placeholder 5">
+          <p:cNvPr id="7" name="Picture 6" descr="A screenshot of a cell phone&#10;&#10;Description automatically generated">
             <a:extLst>
               <a:ext uri="{FF2B5EF4-FFF2-40B4-BE49-F238E27FC236}">
-                <a16:creationId xmlns:a16="http://schemas.microsoft.com/office/drawing/2014/main" id="{1ACD8209-20EA-45C1-960A-9E0F0941FBEC}"/>
-              </a:ext>
-            </a:extLst>
-          </p:cNvPr>
-          <p:cNvPicPr>
-            <a:picLocks noGrp="1" noChangeAspect="1"/>
-          </p:cNvPicPr>
-          <p:nvPr>
-            <p:ph idx="1"/>
-          </p:nvPr>
-        </p:nvPicPr>
-        <p:blipFill>
-          <a:blip r:embed="rId2"/>
-          <a:stretch>
-            <a:fillRect/>
-          </a:stretch>
-        </p:blipFill>
-        <p:spPr>
-          <a:xfrm>
-            <a:off x="6411685" y="2888341"/>
-            <a:ext cx="5529944" cy="3686629"/>
-          </a:xfrm>
-          <a:prstGeom prst="rect">
-            <a:avLst/>
-          </a:prstGeom>
-        </p:spPr>
-      </p:pic>
-      <p:pic>
-        <p:nvPicPr>
-          <p:cNvPr id="8" name="Picture 7">
-            <a:extLst>
-              <a:ext uri="{FF2B5EF4-FFF2-40B4-BE49-F238E27FC236}">
-                <a16:creationId xmlns:a16="http://schemas.microsoft.com/office/drawing/2014/main" id="{6A9247FD-522C-40A1-9F88-941A37B17A2A}"/>
+                <a16:creationId xmlns:a16="http://schemas.microsoft.com/office/drawing/2014/main" id="{52A0C2FC-B938-4DFB-8071-DD5C2388041C}"/>
               </a:ext>
             </a:extLst>
           </p:cNvPr>
@@ -7232,6 +7275,38 @@
           <p:nvPr/>
         </p:nvPicPr>
         <p:blipFill>
+          <a:blip r:embed="rId2"/>
+          <a:stretch>
+            <a:fillRect/>
+          </a:stretch>
+        </p:blipFill>
+        <p:spPr>
+          <a:xfrm>
+            <a:off x="304175" y="2861669"/>
+            <a:ext cx="5487650" cy="3658433"/>
+          </a:xfrm>
+          <a:prstGeom prst="rect">
+            <a:avLst/>
+          </a:prstGeom>
+        </p:spPr>
+      </p:pic>
+      <p:pic>
+        <p:nvPicPr>
+          <p:cNvPr id="11" name="Content Placeholder 10" descr="A screenshot of a cell phone&#10;&#10;Description automatically generated">
+            <a:extLst>
+              <a:ext uri="{FF2B5EF4-FFF2-40B4-BE49-F238E27FC236}">
+                <a16:creationId xmlns:a16="http://schemas.microsoft.com/office/drawing/2014/main" id="{D7089094-FB63-4278-92AA-B5253A756850}"/>
+              </a:ext>
+            </a:extLst>
+          </p:cNvPr>
+          <p:cNvPicPr>
+            <a:picLocks noGrp="1" noChangeAspect="1"/>
+          </p:cNvPicPr>
+          <p:nvPr>
+            <p:ph idx="1"/>
+          </p:nvPr>
+        </p:nvPicPr>
+        <p:blipFill>
           <a:blip r:embed="rId3"/>
           <a:stretch>
             <a:fillRect/>
@@ -7239,12 +7314,9 @@
         </p:blipFill>
         <p:spPr>
           <a:xfrm>
-            <a:off x="250371" y="2888341"/>
-            <a:ext cx="5529944" cy="3686629"/>
-          </a:xfrm>
-          <a:prstGeom prst="rect">
-            <a:avLst/>
-          </a:prstGeom>
+            <a:off x="6400175" y="2861669"/>
+            <a:ext cx="5487650" cy="3658433"/>
+          </a:xfrm>
         </p:spPr>
       </p:pic>
       <p:pic>
@@ -7252,7 +7324,7 @@
           <p:cNvPr id="3" name="Picture 2">
             <a:extLst>
               <a:ext uri="{FF2B5EF4-FFF2-40B4-BE49-F238E27FC236}">
-                <a16:creationId xmlns:a16="http://schemas.microsoft.com/office/drawing/2014/main" id="{18B07742-D8AA-4997-85C4-57378BF1DEF9}"/>
+                <a16:creationId xmlns:a16="http://schemas.microsoft.com/office/drawing/2014/main" id="{DBD354B3-5182-4A5C-8643-C862C4D6A5E1}"/>
               </a:ext>
             </a:extLst>
           </p:cNvPr>
@@ -7269,8 +7341,8 @@
         </p:blipFill>
         <p:spPr>
           <a:xfrm>
-            <a:off x="1157287" y="534587"/>
-            <a:ext cx="3476625" cy="1752600"/>
+            <a:off x="719139" y="307415"/>
+            <a:ext cx="4352921" cy="2206943"/>
           </a:xfrm>
           <a:prstGeom prst="rect">
             <a:avLst/>
@@ -7280,7 +7352,7 @@
     </p:spTree>
     <p:extLst>
       <p:ext uri="{BB962C8B-B14F-4D97-AF65-F5344CB8AC3E}">
-        <p14:creationId xmlns:p14="http://schemas.microsoft.com/office/powerpoint/2010/main" val="3758669070"/>
+        <p14:creationId xmlns:p14="http://schemas.microsoft.com/office/powerpoint/2010/main" val="3189742200"/>
       </p:ext>
     </p:extLst>
   </p:cSld>
@@ -7312,7 +7384,7 @@
           <p:cNvPr id="2" name="Title 1">
             <a:extLst>
               <a:ext uri="{FF2B5EF4-FFF2-40B4-BE49-F238E27FC236}">
-                <a16:creationId xmlns:a16="http://schemas.microsoft.com/office/drawing/2014/main" id="{D876A3BB-5909-4ACC-82AE-88651C2817FA}"/>
+                <a16:creationId xmlns:a16="http://schemas.microsoft.com/office/drawing/2014/main" id="{19CD08C8-D4A6-4EC2-9C36-5C60792206C3}"/>
               </a:ext>
             </a:extLst>
           </p:cNvPr>
@@ -7337,10 +7409,10 @@
       </p:sp>
       <p:pic>
         <p:nvPicPr>
-          <p:cNvPr id="4" name="Content Placeholder 3">
+          <p:cNvPr id="6" name="Content Placeholder 5">
             <a:extLst>
               <a:ext uri="{FF2B5EF4-FFF2-40B4-BE49-F238E27FC236}">
-                <a16:creationId xmlns:a16="http://schemas.microsoft.com/office/drawing/2014/main" id="{0EEED033-8FFD-4883-ADB6-70D9DD2D59D6}"/>
+                <a16:creationId xmlns:a16="http://schemas.microsoft.com/office/drawing/2014/main" id="{1ACD8209-20EA-45C1-960A-9E0F0941FBEC}"/>
               </a:ext>
             </a:extLst>
           </p:cNvPr>
@@ -7351,15 +7423,16 @@
             <p:ph idx="1"/>
           </p:nvPr>
         </p:nvPicPr>
-        <p:blipFill rotWithShape="1">
+        <p:blipFill>
           <a:blip r:embed="rId2"/>
-          <a:srcRect l="17389" r="12867"/>
-          <a:stretch/>
+          <a:stretch>
+            <a:fillRect/>
+          </a:stretch>
         </p:blipFill>
         <p:spPr>
           <a:xfrm>
-            <a:off x="5312372" y="2797345"/>
-            <a:ext cx="6717910" cy="3764814"/>
+            <a:off x="6411685" y="2888341"/>
+            <a:ext cx="5529944" cy="3686629"/>
           </a:xfrm>
           <a:prstGeom prst="rect">
             <a:avLst/>
@@ -7368,10 +7441,10 @@
       </p:pic>
       <p:pic>
         <p:nvPicPr>
-          <p:cNvPr id="5" name="Content Placeholder 3">
+          <p:cNvPr id="8" name="Picture 7">
             <a:extLst>
               <a:ext uri="{FF2B5EF4-FFF2-40B4-BE49-F238E27FC236}">
-                <a16:creationId xmlns:a16="http://schemas.microsoft.com/office/drawing/2014/main" id="{3B0C5EA2-727E-4A8E-A163-D46268E64966}"/>
+                <a16:creationId xmlns:a16="http://schemas.microsoft.com/office/drawing/2014/main" id="{6A9247FD-522C-40A1-9F88-941A37B17A2A}"/>
               </a:ext>
             </a:extLst>
           </p:cNvPr>
@@ -7380,15 +7453,46 @@
           </p:cNvPicPr>
           <p:nvPr/>
         </p:nvPicPr>
-        <p:blipFill rotWithShape="1">
+        <p:blipFill>
           <a:blip r:embed="rId3"/>
-          <a:srcRect r="46867"/>
-          <a:stretch/>
+          <a:stretch>
+            <a:fillRect/>
+          </a:stretch>
         </p:blipFill>
         <p:spPr>
           <a:xfrm>
-            <a:off x="139949" y="2799436"/>
-            <a:ext cx="5085335" cy="3740952"/>
+            <a:off x="250371" y="2888341"/>
+            <a:ext cx="5529944" cy="3686629"/>
+          </a:xfrm>
+          <a:prstGeom prst="rect">
+            <a:avLst/>
+          </a:prstGeom>
+        </p:spPr>
+      </p:pic>
+      <p:pic>
+        <p:nvPicPr>
+          <p:cNvPr id="3" name="Picture 2">
+            <a:extLst>
+              <a:ext uri="{FF2B5EF4-FFF2-40B4-BE49-F238E27FC236}">
+                <a16:creationId xmlns:a16="http://schemas.microsoft.com/office/drawing/2014/main" id="{18B07742-D8AA-4997-85C4-57378BF1DEF9}"/>
+              </a:ext>
+            </a:extLst>
+          </p:cNvPr>
+          <p:cNvPicPr>
+            <a:picLocks noChangeAspect="1"/>
+          </p:cNvPicPr>
+          <p:nvPr/>
+        </p:nvPicPr>
+        <p:blipFill>
+          <a:blip r:embed="rId4"/>
+          <a:stretch>
+            <a:fillRect/>
+          </a:stretch>
+        </p:blipFill>
+        <p:spPr>
+          <a:xfrm>
+            <a:off x="1157287" y="534587"/>
+            <a:ext cx="3476625" cy="1752600"/>
           </a:xfrm>
           <a:prstGeom prst="rect">
             <a:avLst/>
@@ -7398,7 +7502,7 @@
     </p:spTree>
     <p:extLst>
       <p:ext uri="{BB962C8B-B14F-4D97-AF65-F5344CB8AC3E}">
-        <p14:creationId xmlns:p14="http://schemas.microsoft.com/office/powerpoint/2010/main" val="2041279089"/>
+        <p14:creationId xmlns:p14="http://schemas.microsoft.com/office/powerpoint/2010/main" val="3758669070"/>
       </p:ext>
     </p:extLst>
   </p:cSld>
@@ -7430,7 +7534,7 @@
           <p:cNvPr id="2" name="Title 1">
             <a:extLst>
               <a:ext uri="{FF2B5EF4-FFF2-40B4-BE49-F238E27FC236}">
-                <a16:creationId xmlns:a16="http://schemas.microsoft.com/office/drawing/2014/main" id="{779939FC-E1A4-4777-8A48-719D2D9DEF40}"/>
+                <a16:creationId xmlns:a16="http://schemas.microsoft.com/office/drawing/2014/main" id="{D876A3BB-5909-4ACC-82AE-88651C2817FA}"/>
               </a:ext>
             </a:extLst>
           </p:cNvPr>
@@ -7448,58 +7552,75 @@
           <a:p>
             <a:r>
               <a:rPr lang="en-US" dirty="0"/>
-              <a:t>Discussion</a:t>
-            </a:r>
-          </a:p>
-        </p:txBody>
-      </p:sp>
-      <p:sp>
-        <p:nvSpPr>
-          <p:cNvPr id="3" name="Content Placeholder 2">
+              <a:t>Data Analysis</a:t>
+            </a:r>
+          </a:p>
+        </p:txBody>
+      </p:sp>
+      <p:pic>
+        <p:nvPicPr>
+          <p:cNvPr id="4" name="Content Placeholder 3">
             <a:extLst>
               <a:ext uri="{FF2B5EF4-FFF2-40B4-BE49-F238E27FC236}">
-                <a16:creationId xmlns:a16="http://schemas.microsoft.com/office/drawing/2014/main" id="{2B85A8BF-CD6D-42FF-BBFC-29DDE9615866}"/>
+                <a16:creationId xmlns:a16="http://schemas.microsoft.com/office/drawing/2014/main" id="{0EEED033-8FFD-4883-ADB6-70D9DD2D59D6}"/>
               </a:ext>
             </a:extLst>
           </p:cNvPr>
-          <p:cNvSpPr>
-            <a:spLocks noGrp="1"/>
-          </p:cNvSpPr>
+          <p:cNvPicPr>
+            <a:picLocks noGrp="1" noChangeAspect="1"/>
+          </p:cNvPicPr>
           <p:nvPr>
             <p:ph idx="1"/>
           </p:nvPr>
-        </p:nvSpPr>
-        <p:spPr/>
-        <p:txBody>
-          <a:bodyPr/>
-          <a:lstStyle/>
-          <a:p>
-            <a:r>
-              <a:rPr lang="en-US" dirty="0"/>
-              <a:t>States with low stats decrease the trends YOY/State to State</a:t>
-            </a:r>
-          </a:p>
-          <a:p>
-            <a:r>
-              <a:rPr lang="en-US" dirty="0"/>
-              <a:t>There are correlations between types of fire and fire size</a:t>
-            </a:r>
-          </a:p>
-          <a:p>
-            <a:r>
-              <a:rPr lang="en-US" dirty="0"/>
-              <a:t>There is an obvious concentration of fires on the West Coast from California up to Alaska</a:t>
-            </a:r>
-          </a:p>
-          <a:p>
-            <a:endParaRPr lang="en-US" dirty="0"/>
-          </a:p>
-        </p:txBody>
-      </p:sp>
+        </p:nvPicPr>
+        <p:blipFill rotWithShape="1">
+          <a:blip r:embed="rId2"/>
+          <a:srcRect l="17389" r="12867"/>
+          <a:stretch/>
+        </p:blipFill>
+        <p:spPr>
+          <a:xfrm>
+            <a:off x="5312372" y="2797345"/>
+            <a:ext cx="6717910" cy="3764814"/>
+          </a:xfrm>
+          <a:prstGeom prst="rect">
+            <a:avLst/>
+          </a:prstGeom>
+        </p:spPr>
+      </p:pic>
+      <p:pic>
+        <p:nvPicPr>
+          <p:cNvPr id="5" name="Content Placeholder 3">
+            <a:extLst>
+              <a:ext uri="{FF2B5EF4-FFF2-40B4-BE49-F238E27FC236}">
+                <a16:creationId xmlns:a16="http://schemas.microsoft.com/office/drawing/2014/main" id="{3B0C5EA2-727E-4A8E-A163-D46268E64966}"/>
+              </a:ext>
+            </a:extLst>
+          </p:cNvPr>
+          <p:cNvPicPr>
+            <a:picLocks noChangeAspect="1"/>
+          </p:cNvPicPr>
+          <p:nvPr/>
+        </p:nvPicPr>
+        <p:blipFill rotWithShape="1">
+          <a:blip r:embed="rId3"/>
+          <a:srcRect r="46867"/>
+          <a:stretch/>
+        </p:blipFill>
+        <p:spPr>
+          <a:xfrm>
+            <a:off x="139949" y="2799436"/>
+            <a:ext cx="5085335" cy="3740952"/>
+          </a:xfrm>
+          <a:prstGeom prst="rect">
+            <a:avLst/>
+          </a:prstGeom>
+        </p:spPr>
+      </p:pic>
     </p:spTree>
     <p:extLst>
       <p:ext uri="{BB962C8B-B14F-4D97-AF65-F5344CB8AC3E}">
-        <p14:creationId xmlns:p14="http://schemas.microsoft.com/office/powerpoint/2010/main" val="2915610449"/>
+        <p14:creationId xmlns:p14="http://schemas.microsoft.com/office/powerpoint/2010/main" val="2041279089"/>
       </p:ext>
     </p:extLst>
   </p:cSld>

</xml_diff>

<commit_message>
adding temps file and updating powerpoint
</commit_message>
<xml_diff>
--- a/Presentation - Project 1.pptx
+++ b/Presentation - Project 1.pptx
@@ -5,7 +5,7 @@
     <p:sldMasterId id="2147483648" r:id="rId1"/>
   </p:sldMasterIdLst>
   <p:notesMasterIdLst>
-    <p:notesMasterId r:id="rId14"/>
+    <p:notesMasterId r:id="rId15"/>
   </p:notesMasterIdLst>
   <p:sldIdLst>
     <p:sldId id="256" r:id="rId2"/>
@@ -13,13 +13,14 @@
     <p:sldId id="259" r:id="rId4"/>
     <p:sldId id="260" r:id="rId5"/>
     <p:sldId id="268" r:id="rId6"/>
-    <p:sldId id="269" r:id="rId7"/>
-    <p:sldId id="257" r:id="rId8"/>
-    <p:sldId id="265" r:id="rId9"/>
-    <p:sldId id="266" r:id="rId10"/>
-    <p:sldId id="262" r:id="rId11"/>
-    <p:sldId id="263" r:id="rId12"/>
-    <p:sldId id="264" r:id="rId13"/>
+    <p:sldId id="270" r:id="rId7"/>
+    <p:sldId id="269" r:id="rId8"/>
+    <p:sldId id="257" r:id="rId9"/>
+    <p:sldId id="265" r:id="rId10"/>
+    <p:sldId id="266" r:id="rId11"/>
+    <p:sldId id="262" r:id="rId12"/>
+    <p:sldId id="263" r:id="rId13"/>
+    <p:sldId id="264" r:id="rId14"/>
   </p:sldIdLst>
   <p:sldSz cx="12192000" cy="6858000"/>
   <p:notesSz cx="6858000" cy="9144000"/>
@@ -6276,7 +6277,7 @@
           <p:cNvPr id="2" name="Title 1">
             <a:extLst>
               <a:ext uri="{FF2B5EF4-FFF2-40B4-BE49-F238E27FC236}">
-                <a16:creationId xmlns:a16="http://schemas.microsoft.com/office/drawing/2014/main" id="{779939FC-E1A4-4777-8A48-719D2D9DEF40}"/>
+                <a16:creationId xmlns:a16="http://schemas.microsoft.com/office/drawing/2014/main" id="{D876A3BB-5909-4ACC-82AE-88651C2817FA}"/>
               </a:ext>
             </a:extLst>
           </p:cNvPr>
@@ -6294,58 +6295,75 @@
           <a:p>
             <a:r>
               <a:rPr lang="en-US" dirty="0"/>
-              <a:t>Discussion</a:t>
-            </a:r>
-          </a:p>
-        </p:txBody>
-      </p:sp>
-      <p:sp>
-        <p:nvSpPr>
-          <p:cNvPr id="3" name="Content Placeholder 2">
+              <a:t>Data Analysis</a:t>
+            </a:r>
+          </a:p>
+        </p:txBody>
+      </p:sp>
+      <p:pic>
+        <p:nvPicPr>
+          <p:cNvPr id="4" name="Content Placeholder 3">
             <a:extLst>
               <a:ext uri="{FF2B5EF4-FFF2-40B4-BE49-F238E27FC236}">
-                <a16:creationId xmlns:a16="http://schemas.microsoft.com/office/drawing/2014/main" id="{2B85A8BF-CD6D-42FF-BBFC-29DDE9615866}"/>
+                <a16:creationId xmlns:a16="http://schemas.microsoft.com/office/drawing/2014/main" id="{0EEED033-8FFD-4883-ADB6-70D9DD2D59D6}"/>
               </a:ext>
             </a:extLst>
           </p:cNvPr>
-          <p:cNvSpPr>
-            <a:spLocks noGrp="1"/>
-          </p:cNvSpPr>
+          <p:cNvPicPr>
+            <a:picLocks noGrp="1" noChangeAspect="1"/>
+          </p:cNvPicPr>
           <p:nvPr>
             <p:ph idx="1"/>
           </p:nvPr>
-        </p:nvSpPr>
-        <p:spPr/>
-        <p:txBody>
-          <a:bodyPr/>
-          <a:lstStyle/>
-          <a:p>
-            <a:r>
-              <a:rPr lang="en-US" dirty="0"/>
-              <a:t>States with low stats decrease the trends YOY/State to State</a:t>
-            </a:r>
-          </a:p>
-          <a:p>
-            <a:r>
-              <a:rPr lang="en-US" dirty="0"/>
-              <a:t>There are correlations between types of fire and fire size</a:t>
-            </a:r>
-          </a:p>
-          <a:p>
-            <a:r>
-              <a:rPr lang="en-US" dirty="0"/>
-              <a:t>There is an obvious concentration of fires on the West Coast from California up to Alaska</a:t>
-            </a:r>
-          </a:p>
-          <a:p>
-            <a:endParaRPr lang="en-US" dirty="0"/>
-          </a:p>
-        </p:txBody>
-      </p:sp>
+        </p:nvPicPr>
+        <p:blipFill rotWithShape="1">
+          <a:blip r:embed="rId2"/>
+          <a:srcRect l="17389" r="12867"/>
+          <a:stretch/>
+        </p:blipFill>
+        <p:spPr>
+          <a:xfrm>
+            <a:off x="5312372" y="2797345"/>
+            <a:ext cx="6717910" cy="3764814"/>
+          </a:xfrm>
+          <a:prstGeom prst="rect">
+            <a:avLst/>
+          </a:prstGeom>
+        </p:spPr>
+      </p:pic>
+      <p:pic>
+        <p:nvPicPr>
+          <p:cNvPr id="5" name="Content Placeholder 3">
+            <a:extLst>
+              <a:ext uri="{FF2B5EF4-FFF2-40B4-BE49-F238E27FC236}">
+                <a16:creationId xmlns:a16="http://schemas.microsoft.com/office/drawing/2014/main" id="{3B0C5EA2-727E-4A8E-A163-D46268E64966}"/>
+              </a:ext>
+            </a:extLst>
+          </p:cNvPr>
+          <p:cNvPicPr>
+            <a:picLocks noChangeAspect="1"/>
+          </p:cNvPicPr>
+          <p:nvPr/>
+        </p:nvPicPr>
+        <p:blipFill rotWithShape="1">
+          <a:blip r:embed="rId3"/>
+          <a:srcRect r="46867"/>
+          <a:stretch/>
+        </p:blipFill>
+        <p:spPr>
+          <a:xfrm>
+            <a:off x="139949" y="2799436"/>
+            <a:ext cx="5085335" cy="3740952"/>
+          </a:xfrm>
+          <a:prstGeom prst="rect">
+            <a:avLst/>
+          </a:prstGeom>
+        </p:spPr>
+      </p:pic>
     </p:spTree>
     <p:extLst>
       <p:ext uri="{BB962C8B-B14F-4D97-AF65-F5344CB8AC3E}">
-        <p14:creationId xmlns:p14="http://schemas.microsoft.com/office/powerpoint/2010/main" val="2915610449"/>
+        <p14:creationId xmlns:p14="http://schemas.microsoft.com/office/powerpoint/2010/main" val="2041279089"/>
       </p:ext>
     </p:extLst>
   </p:cSld>
@@ -6377,6 +6395,107 @@
           <p:cNvPr id="2" name="Title 1">
             <a:extLst>
               <a:ext uri="{FF2B5EF4-FFF2-40B4-BE49-F238E27FC236}">
+                <a16:creationId xmlns:a16="http://schemas.microsoft.com/office/drawing/2014/main" id="{779939FC-E1A4-4777-8A48-719D2D9DEF40}"/>
+              </a:ext>
+            </a:extLst>
+          </p:cNvPr>
+          <p:cNvSpPr>
+            <a:spLocks noGrp="1"/>
+          </p:cNvSpPr>
+          <p:nvPr>
+            <p:ph type="title"/>
+          </p:nvPr>
+        </p:nvSpPr>
+        <p:spPr/>
+        <p:txBody>
+          <a:bodyPr/>
+          <a:lstStyle/>
+          <a:p>
+            <a:r>
+              <a:rPr lang="en-US" dirty="0"/>
+              <a:t>Discussion</a:t>
+            </a:r>
+          </a:p>
+        </p:txBody>
+      </p:sp>
+      <p:sp>
+        <p:nvSpPr>
+          <p:cNvPr id="3" name="Content Placeholder 2">
+            <a:extLst>
+              <a:ext uri="{FF2B5EF4-FFF2-40B4-BE49-F238E27FC236}">
+                <a16:creationId xmlns:a16="http://schemas.microsoft.com/office/drawing/2014/main" id="{2B85A8BF-CD6D-42FF-BBFC-29DDE9615866}"/>
+              </a:ext>
+            </a:extLst>
+          </p:cNvPr>
+          <p:cNvSpPr>
+            <a:spLocks noGrp="1"/>
+          </p:cNvSpPr>
+          <p:nvPr>
+            <p:ph idx="1"/>
+          </p:nvPr>
+        </p:nvSpPr>
+        <p:spPr/>
+        <p:txBody>
+          <a:bodyPr/>
+          <a:lstStyle/>
+          <a:p>
+            <a:r>
+              <a:rPr lang="en-US" dirty="0"/>
+              <a:t>States with low stats decrease the trends YOY/State to State</a:t>
+            </a:r>
+          </a:p>
+          <a:p>
+            <a:r>
+              <a:rPr lang="en-US" dirty="0"/>
+              <a:t>There are correlations between types of fire and fire size</a:t>
+            </a:r>
+          </a:p>
+          <a:p>
+            <a:r>
+              <a:rPr lang="en-US" dirty="0"/>
+              <a:t>There is an obvious concentration of fires on the West Coast from California up to Alaska</a:t>
+            </a:r>
+          </a:p>
+          <a:p>
+            <a:endParaRPr lang="en-US" dirty="0"/>
+          </a:p>
+        </p:txBody>
+      </p:sp>
+    </p:spTree>
+    <p:extLst>
+      <p:ext uri="{BB962C8B-B14F-4D97-AF65-F5344CB8AC3E}">
+        <p14:creationId xmlns:p14="http://schemas.microsoft.com/office/powerpoint/2010/main" val="2915610449"/>
+      </p:ext>
+    </p:extLst>
+  </p:cSld>
+  <p:clrMapOvr>
+    <a:masterClrMapping/>
+  </p:clrMapOvr>
+</p:sld>
+</file>
+
+<file path=ppt/slides/slide12.xml><?xml version="1.0" encoding="utf-8"?>
+<p:sld xmlns:a="http://schemas.openxmlformats.org/drawingml/2006/main" xmlns:r="http://schemas.openxmlformats.org/officeDocument/2006/relationships" xmlns:p="http://schemas.openxmlformats.org/presentationml/2006/main">
+  <p:cSld>
+    <p:spTree>
+      <p:nvGrpSpPr>
+        <p:cNvPr id="1" name=""/>
+        <p:cNvGrpSpPr/>
+        <p:nvPr/>
+      </p:nvGrpSpPr>
+      <p:grpSpPr>
+        <a:xfrm>
+          <a:off x="0" y="0"/>
+          <a:ext cx="0" cy="0"/>
+          <a:chOff x="0" y="0"/>
+          <a:chExt cx="0" cy="0"/>
+        </a:xfrm>
+      </p:grpSpPr>
+      <p:sp>
+        <p:nvSpPr>
+          <p:cNvPr id="2" name="Title 1">
+            <a:extLst>
+              <a:ext uri="{FF2B5EF4-FFF2-40B4-BE49-F238E27FC236}">
                 <a16:creationId xmlns:a16="http://schemas.microsoft.com/office/drawing/2014/main" id="{98387A69-2263-46AA-8AC5-1C27CAA82C3A}"/>
               </a:ext>
             </a:extLst>
@@ -6450,7 +6569,7 @@
 </p:sld>
 </file>
 
-<file path=ppt/slides/slide12.xml><?xml version="1.0" encoding="utf-8"?>
+<file path=ppt/slides/slide13.xml><?xml version="1.0" encoding="utf-8"?>
 <p:sld xmlns:a="http://schemas.openxmlformats.org/drawingml/2006/main" xmlns:r="http://schemas.openxmlformats.org/officeDocument/2006/relationships" xmlns:p="http://schemas.openxmlformats.org/presentationml/2006/main">
   <p:cSld>
     <p:spTree>
@@ -6979,16 +7098,15 @@
           </p:cNvPicPr>
           <p:nvPr/>
         </p:nvPicPr>
-        <p:blipFill>
+        <p:blipFill rotWithShape="1">
           <a:blip r:embed="rId3"/>
-          <a:stretch>
-            <a:fillRect/>
-          </a:stretch>
+          <a:srcRect l="7434" t="4923"/>
+          <a:stretch/>
         </p:blipFill>
         <p:spPr>
           <a:xfrm>
-            <a:off x="2490107" y="4874262"/>
-            <a:ext cx="7211786" cy="1820451"/>
+            <a:off x="3026229" y="4963886"/>
+            <a:ext cx="6675664" cy="1730827"/>
           </a:xfrm>
           <a:prstGeom prst="rect">
             <a:avLst/>
@@ -7117,7 +7235,7 @@
           <p:cNvPr id="2" name="Title 1">
             <a:extLst>
               <a:ext uri="{FF2B5EF4-FFF2-40B4-BE49-F238E27FC236}">
-                <a16:creationId xmlns:a16="http://schemas.microsoft.com/office/drawing/2014/main" id="{FF6EDBB6-D931-4711-B91E-6A4C7FFD5BEC}"/>
+                <a16:creationId xmlns:a16="http://schemas.microsoft.com/office/drawing/2014/main" id="{C0016DF1-4D43-4FBF-8D9F-5CD30271F800}"/>
               </a:ext>
             </a:extLst>
           </p:cNvPr>
@@ -7145,7 +7263,7 @@
           <p:cNvPr id="4" name="Content Placeholder 3">
             <a:extLst>
               <a:ext uri="{FF2B5EF4-FFF2-40B4-BE49-F238E27FC236}">
-                <a16:creationId xmlns:a16="http://schemas.microsoft.com/office/drawing/2014/main" id="{7E68AB6F-6EE5-4F45-99A0-C6C1CA8878EE}"/>
+                <a16:creationId xmlns:a16="http://schemas.microsoft.com/office/drawing/2014/main" id="{5D7FB06B-F50D-4FC2-B577-FA36B058F27C}"/>
               </a:ext>
             </a:extLst>
           </p:cNvPr>
@@ -7164,8 +7282,8 @@
         </p:blipFill>
         <p:spPr>
           <a:xfrm>
-            <a:off x="348343" y="2264229"/>
-            <a:ext cx="5252368" cy="4114799"/>
+            <a:off x="4255068" y="2057401"/>
+            <a:ext cx="7791675" cy="3895838"/>
           </a:xfrm>
           <a:prstGeom prst="rect">
             <a:avLst/>
@@ -7177,7 +7295,7 @@
           <p:cNvPr id="5" name="Picture 4">
             <a:extLst>
               <a:ext uri="{FF2B5EF4-FFF2-40B4-BE49-F238E27FC236}">
-                <a16:creationId xmlns:a16="http://schemas.microsoft.com/office/drawing/2014/main" id="{5BCE6CFD-A2E2-4A3C-A5AE-5BF174924CF5}"/>
+                <a16:creationId xmlns:a16="http://schemas.microsoft.com/office/drawing/2014/main" id="{673118E6-9FA8-44E2-BC01-6DEE144DC473}"/>
               </a:ext>
             </a:extLst>
           </p:cNvPr>
@@ -7186,16 +7304,15 @@
           </p:cNvPicPr>
           <p:nvPr/>
         </p:nvPicPr>
-        <p:blipFill>
+        <p:blipFill rotWithShape="1">
           <a:blip r:embed="rId3"/>
-          <a:stretch>
-            <a:fillRect/>
-          </a:stretch>
+          <a:srcRect l="18119" t="4856"/>
+          <a:stretch/>
         </p:blipFill>
         <p:spPr>
           <a:xfrm>
-            <a:off x="5816373" y="2707198"/>
-            <a:ext cx="6291727" cy="1200774"/>
+            <a:off x="111354" y="2416629"/>
+            <a:ext cx="3929742" cy="2908526"/>
           </a:xfrm>
           <a:prstGeom prst="rect">
             <a:avLst/>
@@ -7205,7 +7322,7 @@
     </p:spTree>
     <p:extLst>
       <p:ext uri="{BB962C8B-B14F-4D97-AF65-F5344CB8AC3E}">
-        <p14:creationId xmlns:p14="http://schemas.microsoft.com/office/powerpoint/2010/main" val="2482300198"/>
+        <p14:creationId xmlns:p14="http://schemas.microsoft.com/office/powerpoint/2010/main" val="2755994038"/>
       </p:ext>
     </p:extLst>
   </p:cSld>
@@ -7237,7 +7354,7 @@
           <p:cNvPr id="2" name="Title 1">
             <a:extLst>
               <a:ext uri="{FF2B5EF4-FFF2-40B4-BE49-F238E27FC236}">
-                <a16:creationId xmlns:a16="http://schemas.microsoft.com/office/drawing/2014/main" id="{19CD08C8-D4A6-4EC2-9C36-5C60792206C3}"/>
+                <a16:creationId xmlns:a16="http://schemas.microsoft.com/office/drawing/2014/main" id="{FF6EDBB6-D931-4711-B91E-6A4C7FFD5BEC}"/>
               </a:ext>
             </a:extLst>
           </p:cNvPr>
@@ -7248,7 +7365,12 @@
             <p:ph type="title"/>
           </p:nvPr>
         </p:nvSpPr>
-        <p:spPr/>
+        <p:spPr>
+          <a:xfrm>
+            <a:off x="2974527" y="797030"/>
+            <a:ext cx="8610600" cy="1293028"/>
+          </a:xfrm>
+        </p:spPr>
         <p:txBody>
           <a:bodyPr/>
           <a:lstStyle/>
@@ -7262,10 +7384,42 @@
       </p:sp>
       <p:pic>
         <p:nvPicPr>
-          <p:cNvPr id="7" name="Picture 6" descr="A screenshot of a cell phone&#10;&#10;Description automatically generated">
+          <p:cNvPr id="4" name="Content Placeholder 3">
             <a:extLst>
               <a:ext uri="{FF2B5EF4-FFF2-40B4-BE49-F238E27FC236}">
-                <a16:creationId xmlns:a16="http://schemas.microsoft.com/office/drawing/2014/main" id="{52A0C2FC-B938-4DFB-8071-DD5C2388041C}"/>
+                <a16:creationId xmlns:a16="http://schemas.microsoft.com/office/drawing/2014/main" id="{7E68AB6F-6EE5-4F45-99A0-C6C1CA8878EE}"/>
+              </a:ext>
+            </a:extLst>
+          </p:cNvPr>
+          <p:cNvPicPr>
+            <a:picLocks noGrp="1" noChangeAspect="1"/>
+          </p:cNvPicPr>
+          <p:nvPr>
+            <p:ph idx="1"/>
+          </p:nvPr>
+        </p:nvPicPr>
+        <p:blipFill>
+          <a:blip r:embed="rId2"/>
+          <a:stretch>
+            <a:fillRect/>
+          </a:stretch>
+        </p:blipFill>
+        <p:spPr>
+          <a:xfrm>
+            <a:off x="5856514" y="1826428"/>
+            <a:ext cx="6137070" cy="4807890"/>
+          </a:xfrm>
+          <a:prstGeom prst="rect">
+            <a:avLst/>
+          </a:prstGeom>
+        </p:spPr>
+      </p:pic>
+      <p:pic>
+        <p:nvPicPr>
+          <p:cNvPr id="5" name="Picture 4">
+            <a:extLst>
+              <a:ext uri="{FF2B5EF4-FFF2-40B4-BE49-F238E27FC236}">
+                <a16:creationId xmlns:a16="http://schemas.microsoft.com/office/drawing/2014/main" id="{5BCE6CFD-A2E2-4A3C-A5AE-5BF174924CF5}"/>
               </a:ext>
             </a:extLst>
           </p:cNvPr>
@@ -7274,75 +7428,15 @@
           </p:cNvPicPr>
           <p:nvPr/>
         </p:nvPicPr>
-        <p:blipFill>
-          <a:blip r:embed="rId2"/>
-          <a:stretch>
-            <a:fillRect/>
-          </a:stretch>
+        <p:blipFill rotWithShape="1">
+          <a:blip r:embed="rId3"/>
+          <a:srcRect l="8821"/>
+          <a:stretch/>
         </p:blipFill>
         <p:spPr>
           <a:xfrm>
-            <a:off x="304175" y="2861669"/>
-            <a:ext cx="5487650" cy="3658433"/>
-          </a:xfrm>
-          <a:prstGeom prst="rect">
-            <a:avLst/>
-          </a:prstGeom>
-        </p:spPr>
-      </p:pic>
-      <p:pic>
-        <p:nvPicPr>
-          <p:cNvPr id="11" name="Content Placeholder 10" descr="A screenshot of a cell phone&#10;&#10;Description automatically generated">
-            <a:extLst>
-              <a:ext uri="{FF2B5EF4-FFF2-40B4-BE49-F238E27FC236}">
-                <a16:creationId xmlns:a16="http://schemas.microsoft.com/office/drawing/2014/main" id="{D7089094-FB63-4278-92AA-B5253A756850}"/>
-              </a:ext>
-            </a:extLst>
-          </p:cNvPr>
-          <p:cNvPicPr>
-            <a:picLocks noGrp="1" noChangeAspect="1"/>
-          </p:cNvPicPr>
-          <p:nvPr>
-            <p:ph idx="1"/>
-          </p:nvPr>
-        </p:nvPicPr>
-        <p:blipFill>
-          <a:blip r:embed="rId3"/>
-          <a:stretch>
-            <a:fillRect/>
-          </a:stretch>
-        </p:blipFill>
-        <p:spPr>
-          <a:xfrm>
-            <a:off x="6400175" y="2861669"/>
-            <a:ext cx="5487650" cy="3658433"/>
-          </a:xfrm>
-        </p:spPr>
-      </p:pic>
-      <p:pic>
-        <p:nvPicPr>
-          <p:cNvPr id="3" name="Picture 2">
-            <a:extLst>
-              <a:ext uri="{FF2B5EF4-FFF2-40B4-BE49-F238E27FC236}">
-                <a16:creationId xmlns:a16="http://schemas.microsoft.com/office/drawing/2014/main" id="{DBD354B3-5182-4A5C-8643-C862C4D6A5E1}"/>
-              </a:ext>
-            </a:extLst>
-          </p:cNvPr>
-          <p:cNvPicPr>
-            <a:picLocks noChangeAspect="1"/>
-          </p:cNvPicPr>
-          <p:nvPr/>
-        </p:nvPicPr>
-        <p:blipFill>
-          <a:blip r:embed="rId4"/>
-          <a:stretch>
-            <a:fillRect/>
-          </a:stretch>
-        </p:blipFill>
-        <p:spPr>
-          <a:xfrm>
-            <a:off x="719139" y="307415"/>
-            <a:ext cx="4352921" cy="2206943"/>
+            <a:off x="0" y="3761801"/>
+            <a:ext cx="5736771" cy="1200774"/>
           </a:xfrm>
           <a:prstGeom prst="rect">
             <a:avLst/>
@@ -7352,7 +7446,7 @@
     </p:spTree>
     <p:extLst>
       <p:ext uri="{BB962C8B-B14F-4D97-AF65-F5344CB8AC3E}">
-        <p14:creationId xmlns:p14="http://schemas.microsoft.com/office/powerpoint/2010/main" val="3189742200"/>
+        <p14:creationId xmlns:p14="http://schemas.microsoft.com/office/powerpoint/2010/main" val="2482300198"/>
       </p:ext>
     </p:extLst>
   </p:cSld>
@@ -7409,42 +7503,10 @@
       </p:sp>
       <p:pic>
         <p:nvPicPr>
-          <p:cNvPr id="6" name="Content Placeholder 5">
+          <p:cNvPr id="7" name="Picture 6" descr="A screenshot of a cell phone&#10;&#10;Description automatically generated">
             <a:extLst>
               <a:ext uri="{FF2B5EF4-FFF2-40B4-BE49-F238E27FC236}">
-                <a16:creationId xmlns:a16="http://schemas.microsoft.com/office/drawing/2014/main" id="{1ACD8209-20EA-45C1-960A-9E0F0941FBEC}"/>
-              </a:ext>
-            </a:extLst>
-          </p:cNvPr>
-          <p:cNvPicPr>
-            <a:picLocks noGrp="1" noChangeAspect="1"/>
-          </p:cNvPicPr>
-          <p:nvPr>
-            <p:ph idx="1"/>
-          </p:nvPr>
-        </p:nvPicPr>
-        <p:blipFill>
-          <a:blip r:embed="rId2"/>
-          <a:stretch>
-            <a:fillRect/>
-          </a:stretch>
-        </p:blipFill>
-        <p:spPr>
-          <a:xfrm>
-            <a:off x="6411685" y="2888341"/>
-            <a:ext cx="5529944" cy="3686629"/>
-          </a:xfrm>
-          <a:prstGeom prst="rect">
-            <a:avLst/>
-          </a:prstGeom>
-        </p:spPr>
-      </p:pic>
-      <p:pic>
-        <p:nvPicPr>
-          <p:cNvPr id="8" name="Picture 7">
-            <a:extLst>
-              <a:ext uri="{FF2B5EF4-FFF2-40B4-BE49-F238E27FC236}">
-                <a16:creationId xmlns:a16="http://schemas.microsoft.com/office/drawing/2014/main" id="{6A9247FD-522C-40A1-9F88-941A37B17A2A}"/>
+                <a16:creationId xmlns:a16="http://schemas.microsoft.com/office/drawing/2014/main" id="{52A0C2FC-B938-4DFB-8071-DD5C2388041C}"/>
               </a:ext>
             </a:extLst>
           </p:cNvPr>
@@ -7454,6 +7516,38 @@
           <p:nvPr/>
         </p:nvPicPr>
         <p:blipFill>
+          <a:blip r:embed="rId2"/>
+          <a:stretch>
+            <a:fillRect/>
+          </a:stretch>
+        </p:blipFill>
+        <p:spPr>
+          <a:xfrm>
+            <a:off x="304175" y="2861669"/>
+            <a:ext cx="5487650" cy="3658433"/>
+          </a:xfrm>
+          <a:prstGeom prst="rect">
+            <a:avLst/>
+          </a:prstGeom>
+        </p:spPr>
+      </p:pic>
+      <p:pic>
+        <p:nvPicPr>
+          <p:cNvPr id="11" name="Content Placeholder 10" descr="A screenshot of a cell phone&#10;&#10;Description automatically generated">
+            <a:extLst>
+              <a:ext uri="{FF2B5EF4-FFF2-40B4-BE49-F238E27FC236}">
+                <a16:creationId xmlns:a16="http://schemas.microsoft.com/office/drawing/2014/main" id="{D7089094-FB63-4278-92AA-B5253A756850}"/>
+              </a:ext>
+            </a:extLst>
+          </p:cNvPr>
+          <p:cNvPicPr>
+            <a:picLocks noGrp="1" noChangeAspect="1"/>
+          </p:cNvPicPr>
+          <p:nvPr>
+            <p:ph idx="1"/>
+          </p:nvPr>
+        </p:nvPicPr>
+        <p:blipFill>
           <a:blip r:embed="rId3"/>
           <a:stretch>
             <a:fillRect/>
@@ -7461,12 +7555,9 @@
         </p:blipFill>
         <p:spPr>
           <a:xfrm>
-            <a:off x="250371" y="2888341"/>
-            <a:ext cx="5529944" cy="3686629"/>
-          </a:xfrm>
-          <a:prstGeom prst="rect">
-            <a:avLst/>
-          </a:prstGeom>
+            <a:off x="6400175" y="2861669"/>
+            <a:ext cx="5487650" cy="3658433"/>
+          </a:xfrm>
         </p:spPr>
       </p:pic>
       <p:pic>
@@ -7474,7 +7565,7 @@
           <p:cNvPr id="3" name="Picture 2">
             <a:extLst>
               <a:ext uri="{FF2B5EF4-FFF2-40B4-BE49-F238E27FC236}">
-                <a16:creationId xmlns:a16="http://schemas.microsoft.com/office/drawing/2014/main" id="{18B07742-D8AA-4997-85C4-57378BF1DEF9}"/>
+                <a16:creationId xmlns:a16="http://schemas.microsoft.com/office/drawing/2014/main" id="{DBD354B3-5182-4A5C-8643-C862C4D6A5E1}"/>
               </a:ext>
             </a:extLst>
           </p:cNvPr>
@@ -7491,8 +7582,8 @@
         </p:blipFill>
         <p:spPr>
           <a:xfrm>
-            <a:off x="1157287" y="534587"/>
-            <a:ext cx="3476625" cy="1752600"/>
+            <a:off x="719139" y="307415"/>
+            <a:ext cx="4352921" cy="2206943"/>
           </a:xfrm>
           <a:prstGeom prst="rect">
             <a:avLst/>
@@ -7502,7 +7593,7 @@
     </p:spTree>
     <p:extLst>
       <p:ext uri="{BB962C8B-B14F-4D97-AF65-F5344CB8AC3E}">
-        <p14:creationId xmlns:p14="http://schemas.microsoft.com/office/powerpoint/2010/main" val="3758669070"/>
+        <p14:creationId xmlns:p14="http://schemas.microsoft.com/office/powerpoint/2010/main" val="3189742200"/>
       </p:ext>
     </p:extLst>
   </p:cSld>
@@ -7534,7 +7625,7 @@
           <p:cNvPr id="2" name="Title 1">
             <a:extLst>
               <a:ext uri="{FF2B5EF4-FFF2-40B4-BE49-F238E27FC236}">
-                <a16:creationId xmlns:a16="http://schemas.microsoft.com/office/drawing/2014/main" id="{D876A3BB-5909-4ACC-82AE-88651C2817FA}"/>
+                <a16:creationId xmlns:a16="http://schemas.microsoft.com/office/drawing/2014/main" id="{19CD08C8-D4A6-4EC2-9C36-5C60792206C3}"/>
               </a:ext>
             </a:extLst>
           </p:cNvPr>
@@ -7559,10 +7650,10 @@
       </p:sp>
       <p:pic>
         <p:nvPicPr>
-          <p:cNvPr id="4" name="Content Placeholder 3">
+          <p:cNvPr id="6" name="Content Placeholder 5">
             <a:extLst>
               <a:ext uri="{FF2B5EF4-FFF2-40B4-BE49-F238E27FC236}">
-                <a16:creationId xmlns:a16="http://schemas.microsoft.com/office/drawing/2014/main" id="{0EEED033-8FFD-4883-ADB6-70D9DD2D59D6}"/>
+                <a16:creationId xmlns:a16="http://schemas.microsoft.com/office/drawing/2014/main" id="{1ACD8209-20EA-45C1-960A-9E0F0941FBEC}"/>
               </a:ext>
             </a:extLst>
           </p:cNvPr>
@@ -7573,15 +7664,16 @@
             <p:ph idx="1"/>
           </p:nvPr>
         </p:nvPicPr>
-        <p:blipFill rotWithShape="1">
+        <p:blipFill>
           <a:blip r:embed="rId2"/>
-          <a:srcRect l="17389" r="12867"/>
-          <a:stretch/>
+          <a:stretch>
+            <a:fillRect/>
+          </a:stretch>
         </p:blipFill>
         <p:spPr>
           <a:xfrm>
-            <a:off x="5312372" y="2797345"/>
-            <a:ext cx="6717910" cy="3764814"/>
+            <a:off x="6411685" y="2888341"/>
+            <a:ext cx="5529944" cy="3686629"/>
           </a:xfrm>
           <a:prstGeom prst="rect">
             <a:avLst/>
@@ -7590,10 +7682,10 @@
       </p:pic>
       <p:pic>
         <p:nvPicPr>
-          <p:cNvPr id="5" name="Content Placeholder 3">
+          <p:cNvPr id="8" name="Picture 7">
             <a:extLst>
               <a:ext uri="{FF2B5EF4-FFF2-40B4-BE49-F238E27FC236}">
-                <a16:creationId xmlns:a16="http://schemas.microsoft.com/office/drawing/2014/main" id="{3B0C5EA2-727E-4A8E-A163-D46268E64966}"/>
+                <a16:creationId xmlns:a16="http://schemas.microsoft.com/office/drawing/2014/main" id="{6A9247FD-522C-40A1-9F88-941A37B17A2A}"/>
               </a:ext>
             </a:extLst>
           </p:cNvPr>
@@ -7602,15 +7694,46 @@
           </p:cNvPicPr>
           <p:nvPr/>
         </p:nvPicPr>
-        <p:blipFill rotWithShape="1">
+        <p:blipFill>
           <a:blip r:embed="rId3"/>
-          <a:srcRect r="46867"/>
-          <a:stretch/>
+          <a:stretch>
+            <a:fillRect/>
+          </a:stretch>
         </p:blipFill>
         <p:spPr>
           <a:xfrm>
-            <a:off x="139949" y="2799436"/>
-            <a:ext cx="5085335" cy="3740952"/>
+            <a:off x="250371" y="2888341"/>
+            <a:ext cx="5529944" cy="3686629"/>
+          </a:xfrm>
+          <a:prstGeom prst="rect">
+            <a:avLst/>
+          </a:prstGeom>
+        </p:spPr>
+      </p:pic>
+      <p:pic>
+        <p:nvPicPr>
+          <p:cNvPr id="3" name="Picture 2">
+            <a:extLst>
+              <a:ext uri="{FF2B5EF4-FFF2-40B4-BE49-F238E27FC236}">
+                <a16:creationId xmlns:a16="http://schemas.microsoft.com/office/drawing/2014/main" id="{18B07742-D8AA-4997-85C4-57378BF1DEF9}"/>
+              </a:ext>
+            </a:extLst>
+          </p:cNvPr>
+          <p:cNvPicPr>
+            <a:picLocks noChangeAspect="1"/>
+          </p:cNvPicPr>
+          <p:nvPr/>
+        </p:nvPicPr>
+        <p:blipFill>
+          <a:blip r:embed="rId4"/>
+          <a:stretch>
+            <a:fillRect/>
+          </a:stretch>
+        </p:blipFill>
+        <p:spPr>
+          <a:xfrm>
+            <a:off x="1157287" y="534587"/>
+            <a:ext cx="3476625" cy="1752600"/>
           </a:xfrm>
           <a:prstGeom prst="rect">
             <a:avLst/>
@@ -7620,7 +7743,7 @@
     </p:spTree>
     <p:extLst>
       <p:ext uri="{BB962C8B-B14F-4D97-AF65-F5344CB8AC3E}">
-        <p14:creationId xmlns:p14="http://schemas.microsoft.com/office/powerpoint/2010/main" val="2041279089"/>
+        <p14:creationId xmlns:p14="http://schemas.microsoft.com/office/powerpoint/2010/main" val="3758669070"/>
       </p:ext>
     </p:extLst>
   </p:cSld>

</xml_diff>

<commit_message>
power point end of day 1/21
</commit_message>
<xml_diff>
--- a/Presentation - Project 1.pptx
+++ b/Presentation - Project 1.pptx
@@ -615,6 +615,90 @@
     <p:extLst>
       <p:ext uri="{BB962C8B-B14F-4D97-AF65-F5344CB8AC3E}">
         <p14:creationId xmlns:p14="http://schemas.microsoft.com/office/powerpoint/2010/main" val="3515847930"/>
+      </p:ext>
+    </p:extLst>
+  </p:cSld>
+  <p:clrMapOvr>
+    <a:masterClrMapping/>
+  </p:clrMapOvr>
+</p:notes>
+</file>
+
+<file path=ppt/notesSlides/notesSlide2.xml><?xml version="1.0" encoding="utf-8"?>
+<p:notes xmlns:a="http://schemas.openxmlformats.org/drawingml/2006/main" xmlns:r="http://schemas.openxmlformats.org/officeDocument/2006/relationships" xmlns:p="http://schemas.openxmlformats.org/presentationml/2006/main">
+  <p:cSld>
+    <p:spTree>
+      <p:nvGrpSpPr>
+        <p:cNvPr id="1" name=""/>
+        <p:cNvGrpSpPr/>
+        <p:nvPr/>
+      </p:nvGrpSpPr>
+      <p:grpSpPr>
+        <a:xfrm>
+          <a:off x="0" y="0"/>
+          <a:ext cx="0" cy="0"/>
+          <a:chOff x="0" y="0"/>
+          <a:chExt cx="0" cy="0"/>
+        </a:xfrm>
+      </p:grpSpPr>
+      <p:sp>
+        <p:nvSpPr>
+          <p:cNvPr id="2" name="Slide Image Placeholder 1"/>
+          <p:cNvSpPr>
+            <a:spLocks noGrp="1" noRot="1" noChangeAspect="1"/>
+          </p:cNvSpPr>
+          <p:nvPr>
+            <p:ph type="sldImg"/>
+          </p:nvPr>
+        </p:nvSpPr>
+        <p:spPr/>
+      </p:sp>
+      <p:sp>
+        <p:nvSpPr>
+          <p:cNvPr id="3" name="Notes Placeholder 2"/>
+          <p:cNvSpPr>
+            <a:spLocks noGrp="1"/>
+          </p:cNvSpPr>
+          <p:nvPr>
+            <p:ph type="body" idx="1"/>
+          </p:nvPr>
+        </p:nvSpPr>
+        <p:spPr/>
+        <p:txBody>
+          <a:bodyPr/>
+          <a:lstStyle/>
+          <a:p>
+            <a:endParaRPr lang="en-US" dirty="0"/>
+          </a:p>
+        </p:txBody>
+      </p:sp>
+      <p:sp>
+        <p:nvSpPr>
+          <p:cNvPr id="4" name="Slide Number Placeholder 3"/>
+          <p:cNvSpPr>
+            <a:spLocks noGrp="1"/>
+          </p:cNvSpPr>
+          <p:nvPr>
+            <p:ph type="sldNum" sz="quarter" idx="5"/>
+          </p:nvPr>
+        </p:nvSpPr>
+        <p:spPr/>
+        <p:txBody>
+          <a:bodyPr/>
+          <a:lstStyle/>
+          <a:p>
+            <a:fld id="{76EE7F15-8406-4641-8D67-25DB3BF862B4}" type="slidenum">
+              <a:rPr lang="en-US" smtClean="0"/>
+              <a:t>7</a:t>
+            </a:fld>
+            <a:endParaRPr lang="en-US"/>
+          </a:p>
+        </p:txBody>
+      </p:sp>
+    </p:spTree>
+    <p:extLst>
+      <p:ext uri="{BB962C8B-B14F-4D97-AF65-F5344CB8AC3E}">
+        <p14:creationId xmlns:p14="http://schemas.microsoft.com/office/powerpoint/2010/main" val="3989648659"/>
       </p:ext>
     </p:extLst>
   </p:cSld>
@@ -7384,38 +7468,6 @@
       </p:sp>
       <p:pic>
         <p:nvPicPr>
-          <p:cNvPr id="4" name="Content Placeholder 3">
-            <a:extLst>
-              <a:ext uri="{FF2B5EF4-FFF2-40B4-BE49-F238E27FC236}">
-                <a16:creationId xmlns:a16="http://schemas.microsoft.com/office/drawing/2014/main" id="{7E68AB6F-6EE5-4F45-99A0-C6C1CA8878EE}"/>
-              </a:ext>
-            </a:extLst>
-          </p:cNvPr>
-          <p:cNvPicPr>
-            <a:picLocks noGrp="1" noChangeAspect="1"/>
-          </p:cNvPicPr>
-          <p:nvPr>
-            <p:ph idx="1"/>
-          </p:nvPr>
-        </p:nvPicPr>
-        <p:blipFill>
-          <a:blip r:embed="rId2"/>
-          <a:stretch>
-            <a:fillRect/>
-          </a:stretch>
-        </p:blipFill>
-        <p:spPr>
-          <a:xfrm>
-            <a:off x="5856514" y="1826428"/>
-            <a:ext cx="6137070" cy="4807890"/>
-          </a:xfrm>
-          <a:prstGeom prst="rect">
-            <a:avLst/>
-          </a:prstGeom>
-        </p:spPr>
-      </p:pic>
-      <p:pic>
-        <p:nvPicPr>
           <p:cNvPr id="5" name="Picture 4">
             <a:extLst>
               <a:ext uri="{FF2B5EF4-FFF2-40B4-BE49-F238E27FC236}">
@@ -7435,8 +7487,38 @@
         </p:blipFill>
         <p:spPr>
           <a:xfrm>
-            <a:off x="0" y="3761801"/>
-            <a:ext cx="5736771" cy="1200774"/>
+            <a:off x="106141" y="398115"/>
+            <a:ext cx="6272888" cy="1312990"/>
+          </a:xfrm>
+          <a:prstGeom prst="rect">
+            <a:avLst/>
+          </a:prstGeom>
+        </p:spPr>
+      </p:pic>
+      <p:pic>
+        <p:nvPicPr>
+          <p:cNvPr id="6" name="Picture 5" descr="A picture containing accessory, umbrella, clock&#10;&#10;Description automatically generated">
+            <a:extLst>
+              <a:ext uri="{FF2B5EF4-FFF2-40B4-BE49-F238E27FC236}">
+                <a16:creationId xmlns:a16="http://schemas.microsoft.com/office/drawing/2014/main" id="{96918972-B59D-4872-A06A-E819018B38F1}"/>
+              </a:ext>
+            </a:extLst>
+          </p:cNvPr>
+          <p:cNvPicPr>
+            <a:picLocks noChangeAspect="1"/>
+          </p:cNvPicPr>
+          <p:nvPr/>
+        </p:nvPicPr>
+        <p:blipFill>
+          <a:blip r:embed="rId4"/>
+          <a:stretch>
+            <a:fillRect/>
+          </a:stretch>
+        </p:blipFill>
+        <p:spPr>
+          <a:xfrm>
+            <a:off x="2747976" y="1997804"/>
+            <a:ext cx="6189872" cy="4702627"/>
           </a:xfrm>
           <a:prstGeom prst="rect">
             <a:avLst/>

</xml_diff>

<commit_message>
final powerpoint with name assignments
</commit_message>
<xml_diff>
--- a/Presentation - Project 1.pptx
+++ b/Presentation - Project 1.pptx
@@ -5,22 +5,21 @@
     <p:sldMasterId id="2147483648" r:id="rId1"/>
   </p:sldMasterIdLst>
   <p:notesMasterIdLst>
-    <p:notesMasterId r:id="rId15"/>
+    <p:notesMasterId r:id="rId14"/>
   </p:notesMasterIdLst>
   <p:sldIdLst>
     <p:sldId id="256" r:id="rId2"/>
     <p:sldId id="258" r:id="rId3"/>
     <p:sldId id="259" r:id="rId4"/>
     <p:sldId id="260" r:id="rId5"/>
-    <p:sldId id="268" r:id="rId6"/>
-    <p:sldId id="270" r:id="rId7"/>
-    <p:sldId id="269" r:id="rId8"/>
-    <p:sldId id="257" r:id="rId9"/>
-    <p:sldId id="265" r:id="rId10"/>
+    <p:sldId id="257" r:id="rId6"/>
+    <p:sldId id="265" r:id="rId7"/>
+    <p:sldId id="268" r:id="rId8"/>
+    <p:sldId id="269" r:id="rId9"/>
+    <p:sldId id="270" r:id="rId10"/>
     <p:sldId id="266" r:id="rId11"/>
     <p:sldId id="262" r:id="rId12"/>
-    <p:sldId id="263" r:id="rId13"/>
-    <p:sldId id="264" r:id="rId14"/>
+    <p:sldId id="264" r:id="rId13"/>
   </p:sldIdLst>
   <p:sldSz cx="12192000" cy="6858000"/>
   <p:notesSz cx="6858000" cy="9144000"/>
@@ -532,6 +531,212 @@
           <a:bodyPr/>
           <a:lstStyle/>
           <a:p>
+            <a:r>
+              <a:rPr lang="en-US" dirty="0"/>
+              <a:t>Queue </a:t>
+            </a:r>
+            <a:r>
+              <a:rPr lang="en-US" dirty="0" err="1"/>
+              <a:t>gordan</a:t>
+            </a:r>
+            <a:r>
+              <a:rPr lang="en-US" dirty="0"/>
+              <a:t> </a:t>
+            </a:r>
+            <a:r>
+              <a:rPr lang="en-US" dirty="0" err="1"/>
+              <a:t>ramsey</a:t>
+            </a:r>
+            <a:r>
+              <a:rPr lang="en-US" dirty="0"/>
+              <a:t> fire song</a:t>
+            </a:r>
+          </a:p>
+        </p:txBody>
+      </p:sp>
+      <p:sp>
+        <p:nvSpPr>
+          <p:cNvPr id="4" name="Slide Number Placeholder 3"/>
+          <p:cNvSpPr>
+            <a:spLocks noGrp="1"/>
+          </p:cNvSpPr>
+          <p:nvPr>
+            <p:ph type="sldNum" sz="quarter" idx="5"/>
+          </p:nvPr>
+        </p:nvSpPr>
+        <p:spPr/>
+        <p:txBody>
+          <a:bodyPr/>
+          <a:lstStyle/>
+          <a:p>
+            <a:fld id="{76EE7F15-8406-4641-8D67-25DB3BF862B4}" type="slidenum">
+              <a:rPr lang="en-US" smtClean="0"/>
+              <a:t>1</a:t>
+            </a:fld>
+            <a:endParaRPr lang="en-US"/>
+          </a:p>
+        </p:txBody>
+      </p:sp>
+    </p:spTree>
+    <p:extLst>
+      <p:ext uri="{BB962C8B-B14F-4D97-AF65-F5344CB8AC3E}">
+        <p14:creationId xmlns:p14="http://schemas.microsoft.com/office/powerpoint/2010/main" val="2747987997"/>
+      </p:ext>
+    </p:extLst>
+  </p:cSld>
+  <p:clrMapOvr>
+    <a:masterClrMapping/>
+  </p:clrMapOvr>
+</p:notes>
+</file>
+
+<file path=ppt/notesSlides/notesSlide10.xml><?xml version="1.0" encoding="utf-8"?>
+<p:notes xmlns:a="http://schemas.openxmlformats.org/drawingml/2006/main" xmlns:r="http://schemas.openxmlformats.org/officeDocument/2006/relationships" xmlns:p="http://schemas.openxmlformats.org/presentationml/2006/main">
+  <p:cSld>
+    <p:spTree>
+      <p:nvGrpSpPr>
+        <p:cNvPr id="1" name=""/>
+        <p:cNvGrpSpPr/>
+        <p:nvPr/>
+      </p:nvGrpSpPr>
+      <p:grpSpPr>
+        <a:xfrm>
+          <a:off x="0" y="0"/>
+          <a:ext cx="0" cy="0"/>
+          <a:chOff x="0" y="0"/>
+          <a:chExt cx="0" cy="0"/>
+        </a:xfrm>
+      </p:grpSpPr>
+      <p:sp>
+        <p:nvSpPr>
+          <p:cNvPr id="2" name="Slide Image Placeholder 1"/>
+          <p:cNvSpPr>
+            <a:spLocks noGrp="1" noRot="1" noChangeAspect="1"/>
+          </p:cNvSpPr>
+          <p:nvPr>
+            <p:ph type="sldImg"/>
+          </p:nvPr>
+        </p:nvSpPr>
+        <p:spPr/>
+      </p:sp>
+      <p:sp>
+        <p:nvSpPr>
+          <p:cNvPr id="3" name="Notes Placeholder 2"/>
+          <p:cNvSpPr>
+            <a:spLocks noGrp="1"/>
+          </p:cNvSpPr>
+          <p:nvPr>
+            <p:ph type="body" idx="1"/>
+          </p:nvPr>
+        </p:nvSpPr>
+        <p:spPr/>
+        <p:txBody>
+          <a:bodyPr/>
+          <a:lstStyle/>
+          <a:p>
+            <a:r>
+              <a:rPr lang="en-US" dirty="0"/>
+              <a:t>Bassam</a:t>
+            </a:r>
+          </a:p>
+        </p:txBody>
+      </p:sp>
+      <p:sp>
+        <p:nvSpPr>
+          <p:cNvPr id="4" name="Slide Number Placeholder 3"/>
+          <p:cNvSpPr>
+            <a:spLocks noGrp="1"/>
+          </p:cNvSpPr>
+          <p:nvPr>
+            <p:ph type="sldNum" sz="quarter" idx="5"/>
+          </p:nvPr>
+        </p:nvSpPr>
+        <p:spPr/>
+        <p:txBody>
+          <a:bodyPr/>
+          <a:lstStyle/>
+          <a:p>
+            <a:fld id="{76EE7F15-8406-4641-8D67-25DB3BF862B4}" type="slidenum">
+              <a:rPr lang="en-US" smtClean="0"/>
+              <a:t>10</a:t>
+            </a:fld>
+            <a:endParaRPr lang="en-US"/>
+          </a:p>
+        </p:txBody>
+      </p:sp>
+    </p:spTree>
+    <p:extLst>
+      <p:ext uri="{BB962C8B-B14F-4D97-AF65-F5344CB8AC3E}">
+        <p14:creationId xmlns:p14="http://schemas.microsoft.com/office/powerpoint/2010/main" val="3416750728"/>
+      </p:ext>
+    </p:extLst>
+  </p:cSld>
+  <p:clrMapOvr>
+    <a:masterClrMapping/>
+  </p:clrMapOvr>
+</p:notes>
+</file>
+
+<file path=ppt/notesSlides/notesSlide11.xml><?xml version="1.0" encoding="utf-8"?>
+<p:notes xmlns:a="http://schemas.openxmlformats.org/drawingml/2006/main" xmlns:r="http://schemas.openxmlformats.org/officeDocument/2006/relationships" xmlns:p="http://schemas.openxmlformats.org/presentationml/2006/main">
+  <p:cSld>
+    <p:spTree>
+      <p:nvGrpSpPr>
+        <p:cNvPr id="1" name=""/>
+        <p:cNvGrpSpPr/>
+        <p:nvPr/>
+      </p:nvGrpSpPr>
+      <p:grpSpPr>
+        <a:xfrm>
+          <a:off x="0" y="0"/>
+          <a:ext cx="0" cy="0"/>
+          <a:chOff x="0" y="0"/>
+          <a:chExt cx="0" cy="0"/>
+        </a:xfrm>
+      </p:grpSpPr>
+      <p:sp>
+        <p:nvSpPr>
+          <p:cNvPr id="2" name="Slide Image Placeholder 1"/>
+          <p:cNvSpPr>
+            <a:spLocks noGrp="1" noRot="1" noChangeAspect="1"/>
+          </p:cNvSpPr>
+          <p:nvPr>
+            <p:ph type="sldImg"/>
+          </p:nvPr>
+        </p:nvSpPr>
+        <p:spPr/>
+      </p:sp>
+      <p:sp>
+        <p:nvSpPr>
+          <p:cNvPr id="3" name="Notes Placeholder 2"/>
+          <p:cNvSpPr>
+            <a:spLocks noGrp="1"/>
+          </p:cNvSpPr>
+          <p:nvPr>
+            <p:ph type="body" idx="1"/>
+          </p:nvPr>
+        </p:nvSpPr>
+        <p:spPr/>
+        <p:txBody>
+          <a:bodyPr/>
+          <a:lstStyle/>
+          <a:p>
+            <a:r>
+              <a:rPr lang="en-US" dirty="0"/>
+              <a:t>Noor – </a:t>
+            </a:r>
+          </a:p>
+          <a:p>
+            <a:r>
+              <a:rPr lang="en-US"/>
+              <a:t>Data </a:t>
+            </a:r>
+            <a:r>
+              <a:rPr lang="en-US" dirty="0"/>
+              <a:t>limitations within data set</a:t>
+            </a:r>
+          </a:p>
+          <a:p>
             <a:pPr marL="0" marR="0" lvl="0" indent="0" algn="l" defTabSz="914400" rtl="0" eaLnBrk="1" fontAlgn="auto" latinLnBrk="0" hangingPunct="1">
               <a:lnSpc>
                 <a:spcPct val="100000"/>
@@ -550,37 +755,8 @@
               <a:defRPr/>
             </a:pPr>
             <a:r>
-              <a:rPr lang="en-US" sz="1200" kern="1200" dirty="0">
-                <a:solidFill>
-                  <a:schemeClr val="tx1"/>
-                </a:solidFill>
-                <a:latin typeface="+mn-lt"/>
-                <a:ea typeface="+mn-ea"/>
-                <a:cs typeface="+mn-cs"/>
-              </a:rPr>
-              <a:t>15K acres - </a:t>
-            </a:r>
-            <a:r>
-              <a:rPr lang="en-US" sz="1200" kern="1200" dirty="0" err="1">
-                <a:solidFill>
-                  <a:schemeClr val="tx1"/>
-                </a:solidFill>
-                <a:latin typeface="+mn-lt"/>
-                <a:ea typeface="+mn-ea"/>
-                <a:cs typeface="+mn-cs"/>
-              </a:rPr>
-              <a:t>limitor</a:t>
-            </a:r>
-            <a:r>
-              <a:rPr lang="en-US" sz="1200" kern="1200" dirty="0">
-                <a:solidFill>
-                  <a:schemeClr val="tx1"/>
-                </a:solidFill>
-                <a:latin typeface="+mn-lt"/>
-                <a:ea typeface="+mn-ea"/>
-                <a:cs typeface="+mn-cs"/>
-              </a:rPr>
-              <a:t> for relatively insignificant fires</a:t>
+              <a:rPr lang="en-US" dirty="0"/>
+              <a:t>Limitations on data – exploration – wish list</a:t>
             </a:r>
           </a:p>
           <a:p>
@@ -605,7 +781,7 @@
           <a:p>
             <a:fld id="{76EE7F15-8406-4641-8D67-25DB3BF862B4}" type="slidenum">
               <a:rPr lang="en-US" smtClean="0"/>
-              <a:t>2</a:t>
+              <a:t>11</a:t>
             </a:fld>
             <a:endParaRPr lang="en-US"/>
           </a:p>
@@ -614,7 +790,7 @@
     </p:spTree>
     <p:extLst>
       <p:ext uri="{BB962C8B-B14F-4D97-AF65-F5344CB8AC3E}">
-        <p14:creationId xmlns:p14="http://schemas.microsoft.com/office/powerpoint/2010/main" val="3515847930"/>
+        <p14:creationId xmlns:p14="http://schemas.microsoft.com/office/powerpoint/2010/main" val="2926178902"/>
       </p:ext>
     </p:extLst>
   </p:cSld>
@@ -668,7 +844,512 @@
           <a:bodyPr/>
           <a:lstStyle/>
           <a:p>
-            <a:endParaRPr lang="en-US" dirty="0"/>
+            <a:r>
+              <a:rPr lang="en-US" dirty="0"/>
+              <a:t>Sam</a:t>
+            </a:r>
+          </a:p>
+          <a:p>
+            <a:r>
+              <a:rPr lang="en-US" dirty="0"/>
+              <a:t>Increase in average size of fires YOY</a:t>
+            </a:r>
+          </a:p>
+          <a:p>
+            <a:r>
+              <a:rPr lang="en-US" dirty="0"/>
+              <a:t>Lightning is biggest contributor to fire size</a:t>
+            </a:r>
+          </a:p>
+          <a:p>
+            <a:r>
+              <a:rPr lang="en-US" dirty="0"/>
+              <a:t>West Coast has the most notable fires over 15K acres</a:t>
+            </a:r>
+          </a:p>
+          <a:p>
+            <a:r>
+              <a:rPr lang="en-US" dirty="0"/>
+              <a:t>2015 is the most recent year of data - limiter</a:t>
+            </a:r>
+          </a:p>
+          <a:p>
+            <a:endParaRPr lang="en-US" dirty="0"/>
+          </a:p>
+        </p:txBody>
+      </p:sp>
+      <p:sp>
+        <p:nvSpPr>
+          <p:cNvPr id="4" name="Slide Number Placeholder 3"/>
+          <p:cNvSpPr>
+            <a:spLocks noGrp="1"/>
+          </p:cNvSpPr>
+          <p:nvPr>
+            <p:ph type="sldNum" sz="quarter" idx="5"/>
+          </p:nvPr>
+        </p:nvSpPr>
+        <p:spPr/>
+        <p:txBody>
+          <a:bodyPr/>
+          <a:lstStyle/>
+          <a:p>
+            <a:fld id="{76EE7F15-8406-4641-8D67-25DB3BF862B4}" type="slidenum">
+              <a:rPr lang="en-US" smtClean="0"/>
+              <a:t>2</a:t>
+            </a:fld>
+            <a:endParaRPr lang="en-US"/>
+          </a:p>
+        </p:txBody>
+      </p:sp>
+    </p:spTree>
+    <p:extLst>
+      <p:ext uri="{BB962C8B-B14F-4D97-AF65-F5344CB8AC3E}">
+        <p14:creationId xmlns:p14="http://schemas.microsoft.com/office/powerpoint/2010/main" val="3515847930"/>
+      </p:ext>
+    </p:extLst>
+  </p:cSld>
+  <p:clrMapOvr>
+    <a:masterClrMapping/>
+  </p:clrMapOvr>
+</p:notes>
+</file>
+
+<file path=ppt/notesSlides/notesSlide3.xml><?xml version="1.0" encoding="utf-8"?>
+<p:notes xmlns:a="http://schemas.openxmlformats.org/drawingml/2006/main" xmlns:r="http://schemas.openxmlformats.org/officeDocument/2006/relationships" xmlns:p="http://schemas.openxmlformats.org/presentationml/2006/main">
+  <p:cSld>
+    <p:spTree>
+      <p:nvGrpSpPr>
+        <p:cNvPr id="1" name=""/>
+        <p:cNvGrpSpPr/>
+        <p:nvPr/>
+      </p:nvGrpSpPr>
+      <p:grpSpPr>
+        <a:xfrm>
+          <a:off x="0" y="0"/>
+          <a:ext cx="0" cy="0"/>
+          <a:chOff x="0" y="0"/>
+          <a:chExt cx="0" cy="0"/>
+        </a:xfrm>
+      </p:grpSpPr>
+      <p:sp>
+        <p:nvSpPr>
+          <p:cNvPr id="2" name="Slide Image Placeholder 1"/>
+          <p:cNvSpPr>
+            <a:spLocks noGrp="1" noRot="1" noChangeAspect="1"/>
+          </p:cNvSpPr>
+          <p:nvPr>
+            <p:ph type="sldImg"/>
+          </p:nvPr>
+        </p:nvSpPr>
+        <p:spPr/>
+      </p:sp>
+      <p:sp>
+        <p:nvSpPr>
+          <p:cNvPr id="3" name="Notes Placeholder 2"/>
+          <p:cNvSpPr>
+            <a:spLocks noGrp="1"/>
+          </p:cNvSpPr>
+          <p:nvPr>
+            <p:ph type="body" idx="1"/>
+          </p:nvPr>
+        </p:nvSpPr>
+        <p:spPr/>
+        <p:txBody>
+          <a:bodyPr/>
+          <a:lstStyle/>
+          <a:p>
+            <a:r>
+              <a:rPr lang="en-US" dirty="0"/>
+              <a:t>Noor – </a:t>
+            </a:r>
+          </a:p>
+          <a:p>
+            <a:pPr marL="171450" indent="-171450">
+              <a:buFontTx/>
+              <a:buChar char="-"/>
+            </a:pPr>
+            <a:r>
+              <a:rPr lang="en-US" dirty="0"/>
+              <a:t>We only kept 9 columns of data our of 39 in the file to actually analyze</a:t>
+            </a:r>
+          </a:p>
+          <a:p>
+            <a:pPr marL="171450" indent="-171450">
+              <a:buFontTx/>
+              <a:buChar char="-"/>
+            </a:pPr>
+            <a:r>
+              <a:rPr lang="en-US" dirty="0"/>
+              <a:t>While the count of fires decreased, their size increased as a US average YOY – our next slide visualizes this</a:t>
+            </a:r>
+          </a:p>
+          <a:p>
+            <a:pPr marL="171450" indent="-171450">
+              <a:buFontTx/>
+              <a:buChar char="-"/>
+            </a:pPr>
+            <a:r>
+              <a:rPr lang="en-US" dirty="0"/>
+              <a:t>There was a main contributor to both fire size AND frequency</a:t>
+            </a:r>
+          </a:p>
+          <a:p>
+            <a:pPr marL="171450" indent="-171450">
+              <a:buFontTx/>
+              <a:buChar char="-"/>
+            </a:pPr>
+            <a:r>
+              <a:rPr lang="en-US" dirty="0"/>
+              <a:t>there are states that have stronger YOY trends</a:t>
+            </a:r>
+          </a:p>
+        </p:txBody>
+      </p:sp>
+      <p:sp>
+        <p:nvSpPr>
+          <p:cNvPr id="4" name="Slide Number Placeholder 3"/>
+          <p:cNvSpPr>
+            <a:spLocks noGrp="1"/>
+          </p:cNvSpPr>
+          <p:nvPr>
+            <p:ph type="sldNum" sz="quarter" idx="5"/>
+          </p:nvPr>
+        </p:nvSpPr>
+        <p:spPr/>
+        <p:txBody>
+          <a:bodyPr/>
+          <a:lstStyle/>
+          <a:p>
+            <a:fld id="{76EE7F15-8406-4641-8D67-25DB3BF862B4}" type="slidenum">
+              <a:rPr lang="en-US" smtClean="0"/>
+              <a:t>3</a:t>
+            </a:fld>
+            <a:endParaRPr lang="en-US"/>
+          </a:p>
+        </p:txBody>
+      </p:sp>
+    </p:spTree>
+    <p:extLst>
+      <p:ext uri="{BB962C8B-B14F-4D97-AF65-F5344CB8AC3E}">
+        <p14:creationId xmlns:p14="http://schemas.microsoft.com/office/powerpoint/2010/main" val="2669078229"/>
+      </p:ext>
+    </p:extLst>
+  </p:cSld>
+  <p:clrMapOvr>
+    <a:masterClrMapping/>
+  </p:clrMapOvr>
+</p:notes>
+</file>
+
+<file path=ppt/notesSlides/notesSlide4.xml><?xml version="1.0" encoding="utf-8"?>
+<p:notes xmlns:a="http://schemas.openxmlformats.org/drawingml/2006/main" xmlns:r="http://schemas.openxmlformats.org/officeDocument/2006/relationships" xmlns:p="http://schemas.openxmlformats.org/presentationml/2006/main">
+  <p:cSld>
+    <p:spTree>
+      <p:nvGrpSpPr>
+        <p:cNvPr id="1" name=""/>
+        <p:cNvGrpSpPr/>
+        <p:nvPr/>
+      </p:nvGrpSpPr>
+      <p:grpSpPr>
+        <a:xfrm>
+          <a:off x="0" y="0"/>
+          <a:ext cx="0" cy="0"/>
+          <a:chOff x="0" y="0"/>
+          <a:chExt cx="0" cy="0"/>
+        </a:xfrm>
+      </p:grpSpPr>
+      <p:sp>
+        <p:nvSpPr>
+          <p:cNvPr id="2" name="Slide Image Placeholder 1"/>
+          <p:cNvSpPr>
+            <a:spLocks noGrp="1" noRot="1" noChangeAspect="1"/>
+          </p:cNvSpPr>
+          <p:nvPr>
+            <p:ph type="sldImg"/>
+          </p:nvPr>
+        </p:nvSpPr>
+        <p:spPr/>
+      </p:sp>
+      <p:sp>
+        <p:nvSpPr>
+          <p:cNvPr id="3" name="Notes Placeholder 2"/>
+          <p:cNvSpPr>
+            <a:spLocks noGrp="1"/>
+          </p:cNvSpPr>
+          <p:nvPr>
+            <p:ph type="body" idx="1"/>
+          </p:nvPr>
+        </p:nvSpPr>
+        <p:spPr/>
+        <p:txBody>
+          <a:bodyPr/>
+          <a:lstStyle/>
+          <a:p>
+            <a:r>
+              <a:rPr lang="en-US" dirty="0"/>
+              <a:t>Sam</a:t>
+            </a:r>
+          </a:p>
+        </p:txBody>
+      </p:sp>
+      <p:sp>
+        <p:nvSpPr>
+          <p:cNvPr id="4" name="Slide Number Placeholder 3"/>
+          <p:cNvSpPr>
+            <a:spLocks noGrp="1"/>
+          </p:cNvSpPr>
+          <p:nvPr>
+            <p:ph type="sldNum" sz="quarter" idx="5"/>
+          </p:nvPr>
+        </p:nvSpPr>
+        <p:spPr/>
+        <p:txBody>
+          <a:bodyPr/>
+          <a:lstStyle/>
+          <a:p>
+            <a:fld id="{76EE7F15-8406-4641-8D67-25DB3BF862B4}" type="slidenum">
+              <a:rPr lang="en-US" smtClean="0"/>
+              <a:t>4</a:t>
+            </a:fld>
+            <a:endParaRPr lang="en-US"/>
+          </a:p>
+        </p:txBody>
+      </p:sp>
+    </p:spTree>
+    <p:extLst>
+      <p:ext uri="{BB962C8B-B14F-4D97-AF65-F5344CB8AC3E}">
+        <p14:creationId xmlns:p14="http://schemas.microsoft.com/office/powerpoint/2010/main" val="620736697"/>
+      </p:ext>
+    </p:extLst>
+  </p:cSld>
+  <p:clrMapOvr>
+    <a:masterClrMapping/>
+  </p:clrMapOvr>
+</p:notes>
+</file>
+
+<file path=ppt/notesSlides/notesSlide5.xml><?xml version="1.0" encoding="utf-8"?>
+<p:notes xmlns:a="http://schemas.openxmlformats.org/drawingml/2006/main" xmlns:r="http://schemas.openxmlformats.org/officeDocument/2006/relationships" xmlns:p="http://schemas.openxmlformats.org/presentationml/2006/main">
+  <p:cSld>
+    <p:spTree>
+      <p:nvGrpSpPr>
+        <p:cNvPr id="1" name=""/>
+        <p:cNvGrpSpPr/>
+        <p:nvPr/>
+      </p:nvGrpSpPr>
+      <p:grpSpPr>
+        <a:xfrm>
+          <a:off x="0" y="0"/>
+          <a:ext cx="0" cy="0"/>
+          <a:chOff x="0" y="0"/>
+          <a:chExt cx="0" cy="0"/>
+        </a:xfrm>
+      </p:grpSpPr>
+      <p:sp>
+        <p:nvSpPr>
+          <p:cNvPr id="2" name="Slide Image Placeholder 1"/>
+          <p:cNvSpPr>
+            <a:spLocks noGrp="1" noRot="1" noChangeAspect="1"/>
+          </p:cNvSpPr>
+          <p:nvPr>
+            <p:ph type="sldImg"/>
+          </p:nvPr>
+        </p:nvSpPr>
+        <p:spPr/>
+      </p:sp>
+      <p:sp>
+        <p:nvSpPr>
+          <p:cNvPr id="3" name="Notes Placeholder 2"/>
+          <p:cNvSpPr>
+            <a:spLocks noGrp="1"/>
+          </p:cNvSpPr>
+          <p:nvPr>
+            <p:ph type="body" idx="1"/>
+          </p:nvPr>
+        </p:nvSpPr>
+        <p:spPr/>
+        <p:txBody>
+          <a:bodyPr/>
+          <a:lstStyle/>
+          <a:p>
+            <a:r>
+              <a:rPr lang="en-US" dirty="0"/>
+              <a:t>Sam</a:t>
+            </a:r>
+          </a:p>
+        </p:txBody>
+      </p:sp>
+      <p:sp>
+        <p:nvSpPr>
+          <p:cNvPr id="4" name="Slide Number Placeholder 3"/>
+          <p:cNvSpPr>
+            <a:spLocks noGrp="1"/>
+          </p:cNvSpPr>
+          <p:nvPr>
+            <p:ph type="sldNum" sz="quarter" idx="5"/>
+          </p:nvPr>
+        </p:nvSpPr>
+        <p:spPr/>
+        <p:txBody>
+          <a:bodyPr/>
+          <a:lstStyle/>
+          <a:p>
+            <a:fld id="{76EE7F15-8406-4641-8D67-25DB3BF862B4}" type="slidenum">
+              <a:rPr lang="en-US" smtClean="0"/>
+              <a:t>5</a:t>
+            </a:fld>
+            <a:endParaRPr lang="en-US"/>
+          </a:p>
+        </p:txBody>
+      </p:sp>
+    </p:spTree>
+    <p:extLst>
+      <p:ext uri="{BB962C8B-B14F-4D97-AF65-F5344CB8AC3E}">
+        <p14:creationId xmlns:p14="http://schemas.microsoft.com/office/powerpoint/2010/main" val="3753655465"/>
+      </p:ext>
+    </p:extLst>
+  </p:cSld>
+  <p:clrMapOvr>
+    <a:masterClrMapping/>
+  </p:clrMapOvr>
+</p:notes>
+</file>
+
+<file path=ppt/notesSlides/notesSlide6.xml><?xml version="1.0" encoding="utf-8"?>
+<p:notes xmlns:a="http://schemas.openxmlformats.org/drawingml/2006/main" xmlns:r="http://schemas.openxmlformats.org/officeDocument/2006/relationships" xmlns:p="http://schemas.openxmlformats.org/presentationml/2006/main">
+  <p:cSld>
+    <p:spTree>
+      <p:nvGrpSpPr>
+        <p:cNvPr id="1" name=""/>
+        <p:cNvGrpSpPr/>
+        <p:nvPr/>
+      </p:nvGrpSpPr>
+      <p:grpSpPr>
+        <a:xfrm>
+          <a:off x="0" y="0"/>
+          <a:ext cx="0" cy="0"/>
+          <a:chOff x="0" y="0"/>
+          <a:chExt cx="0" cy="0"/>
+        </a:xfrm>
+      </p:grpSpPr>
+      <p:sp>
+        <p:nvSpPr>
+          <p:cNvPr id="2" name="Slide Image Placeholder 1"/>
+          <p:cNvSpPr>
+            <a:spLocks noGrp="1" noRot="1" noChangeAspect="1"/>
+          </p:cNvSpPr>
+          <p:nvPr>
+            <p:ph type="sldImg"/>
+          </p:nvPr>
+        </p:nvSpPr>
+        <p:spPr/>
+      </p:sp>
+      <p:sp>
+        <p:nvSpPr>
+          <p:cNvPr id="3" name="Notes Placeholder 2"/>
+          <p:cNvSpPr>
+            <a:spLocks noGrp="1"/>
+          </p:cNvSpPr>
+          <p:nvPr>
+            <p:ph type="body" idx="1"/>
+          </p:nvPr>
+        </p:nvSpPr>
+        <p:spPr/>
+        <p:txBody>
+          <a:bodyPr/>
+          <a:lstStyle/>
+          <a:p>
+            <a:r>
+              <a:rPr lang="en-US" dirty="0"/>
+              <a:t>Sam</a:t>
+            </a:r>
+          </a:p>
+        </p:txBody>
+      </p:sp>
+      <p:sp>
+        <p:nvSpPr>
+          <p:cNvPr id="4" name="Slide Number Placeholder 3"/>
+          <p:cNvSpPr>
+            <a:spLocks noGrp="1"/>
+          </p:cNvSpPr>
+          <p:nvPr>
+            <p:ph type="sldNum" sz="quarter" idx="5"/>
+          </p:nvPr>
+        </p:nvSpPr>
+        <p:spPr/>
+        <p:txBody>
+          <a:bodyPr/>
+          <a:lstStyle/>
+          <a:p>
+            <a:fld id="{76EE7F15-8406-4641-8D67-25DB3BF862B4}" type="slidenum">
+              <a:rPr lang="en-US" smtClean="0"/>
+              <a:t>6</a:t>
+            </a:fld>
+            <a:endParaRPr lang="en-US"/>
+          </a:p>
+        </p:txBody>
+      </p:sp>
+    </p:spTree>
+    <p:extLst>
+      <p:ext uri="{BB962C8B-B14F-4D97-AF65-F5344CB8AC3E}">
+        <p14:creationId xmlns:p14="http://schemas.microsoft.com/office/powerpoint/2010/main" val="2882463063"/>
+      </p:ext>
+    </p:extLst>
+  </p:cSld>
+  <p:clrMapOvr>
+    <a:masterClrMapping/>
+  </p:clrMapOvr>
+</p:notes>
+</file>
+
+<file path=ppt/notesSlides/notesSlide7.xml><?xml version="1.0" encoding="utf-8"?>
+<p:notes xmlns:a="http://schemas.openxmlformats.org/drawingml/2006/main" xmlns:r="http://schemas.openxmlformats.org/officeDocument/2006/relationships" xmlns:p="http://schemas.openxmlformats.org/presentationml/2006/main">
+  <p:cSld>
+    <p:spTree>
+      <p:nvGrpSpPr>
+        <p:cNvPr id="1" name=""/>
+        <p:cNvGrpSpPr/>
+        <p:nvPr/>
+      </p:nvGrpSpPr>
+      <p:grpSpPr>
+        <a:xfrm>
+          <a:off x="0" y="0"/>
+          <a:ext cx="0" cy="0"/>
+          <a:chOff x="0" y="0"/>
+          <a:chExt cx="0" cy="0"/>
+        </a:xfrm>
+      </p:grpSpPr>
+      <p:sp>
+        <p:nvSpPr>
+          <p:cNvPr id="2" name="Slide Image Placeholder 1"/>
+          <p:cNvSpPr>
+            <a:spLocks noGrp="1" noRot="1" noChangeAspect="1"/>
+          </p:cNvSpPr>
+          <p:nvPr>
+            <p:ph type="sldImg"/>
+          </p:nvPr>
+        </p:nvSpPr>
+        <p:spPr/>
+      </p:sp>
+      <p:sp>
+        <p:nvSpPr>
+          <p:cNvPr id="3" name="Notes Placeholder 2"/>
+          <p:cNvSpPr>
+            <a:spLocks noGrp="1"/>
+          </p:cNvSpPr>
+          <p:nvPr>
+            <p:ph type="body" idx="1"/>
+          </p:nvPr>
+        </p:nvSpPr>
+        <p:spPr/>
+        <p:txBody>
+          <a:bodyPr/>
+          <a:lstStyle/>
+          <a:p>
+            <a:r>
+              <a:rPr lang="en-US" dirty="0"/>
+              <a:t>Bassam</a:t>
+            </a:r>
           </a:p>
         </p:txBody>
       </p:sp>
@@ -698,7 +1379,181 @@
     </p:spTree>
     <p:extLst>
       <p:ext uri="{BB962C8B-B14F-4D97-AF65-F5344CB8AC3E}">
+        <p14:creationId xmlns:p14="http://schemas.microsoft.com/office/powerpoint/2010/main" val="1758311368"/>
+      </p:ext>
+    </p:extLst>
+  </p:cSld>
+  <p:clrMapOvr>
+    <a:masterClrMapping/>
+  </p:clrMapOvr>
+</p:notes>
+</file>
+
+<file path=ppt/notesSlides/notesSlide8.xml><?xml version="1.0" encoding="utf-8"?>
+<p:notes xmlns:a="http://schemas.openxmlformats.org/drawingml/2006/main" xmlns:r="http://schemas.openxmlformats.org/officeDocument/2006/relationships" xmlns:p="http://schemas.openxmlformats.org/presentationml/2006/main">
+  <p:cSld>
+    <p:spTree>
+      <p:nvGrpSpPr>
+        <p:cNvPr id="1" name=""/>
+        <p:cNvGrpSpPr/>
+        <p:nvPr/>
+      </p:nvGrpSpPr>
+      <p:grpSpPr>
+        <a:xfrm>
+          <a:off x="0" y="0"/>
+          <a:ext cx="0" cy="0"/>
+          <a:chOff x="0" y="0"/>
+          <a:chExt cx="0" cy="0"/>
+        </a:xfrm>
+      </p:grpSpPr>
+      <p:sp>
+        <p:nvSpPr>
+          <p:cNvPr id="2" name="Slide Image Placeholder 1"/>
+          <p:cNvSpPr>
+            <a:spLocks noGrp="1" noRot="1" noChangeAspect="1"/>
+          </p:cNvSpPr>
+          <p:nvPr>
+            <p:ph type="sldImg"/>
+          </p:nvPr>
+        </p:nvSpPr>
+        <p:spPr/>
+      </p:sp>
+      <p:sp>
+        <p:nvSpPr>
+          <p:cNvPr id="3" name="Notes Placeholder 2"/>
+          <p:cNvSpPr>
+            <a:spLocks noGrp="1"/>
+          </p:cNvSpPr>
+          <p:nvPr>
+            <p:ph type="body" idx="1"/>
+          </p:nvPr>
+        </p:nvSpPr>
+        <p:spPr/>
+        <p:txBody>
+          <a:bodyPr/>
+          <a:lstStyle/>
+          <a:p>
+            <a:r>
+              <a:rPr lang="en-US" dirty="0"/>
+              <a:t>Lei</a:t>
+            </a:r>
+          </a:p>
+        </p:txBody>
+      </p:sp>
+      <p:sp>
+        <p:nvSpPr>
+          <p:cNvPr id="4" name="Slide Number Placeholder 3"/>
+          <p:cNvSpPr>
+            <a:spLocks noGrp="1"/>
+          </p:cNvSpPr>
+          <p:nvPr>
+            <p:ph type="sldNum" sz="quarter" idx="5"/>
+          </p:nvPr>
+        </p:nvSpPr>
+        <p:spPr/>
+        <p:txBody>
+          <a:bodyPr/>
+          <a:lstStyle/>
+          <a:p>
+            <a:fld id="{76EE7F15-8406-4641-8D67-25DB3BF862B4}" type="slidenum">
+              <a:rPr lang="en-US" smtClean="0"/>
+              <a:t>8</a:t>
+            </a:fld>
+            <a:endParaRPr lang="en-US"/>
+          </a:p>
+        </p:txBody>
+      </p:sp>
+    </p:spTree>
+    <p:extLst>
+      <p:ext uri="{BB962C8B-B14F-4D97-AF65-F5344CB8AC3E}">
         <p14:creationId xmlns:p14="http://schemas.microsoft.com/office/powerpoint/2010/main" val="3989648659"/>
+      </p:ext>
+    </p:extLst>
+  </p:cSld>
+  <p:clrMapOvr>
+    <a:masterClrMapping/>
+  </p:clrMapOvr>
+</p:notes>
+</file>
+
+<file path=ppt/notesSlides/notesSlide9.xml><?xml version="1.0" encoding="utf-8"?>
+<p:notes xmlns:a="http://schemas.openxmlformats.org/drawingml/2006/main" xmlns:r="http://schemas.openxmlformats.org/officeDocument/2006/relationships" xmlns:p="http://schemas.openxmlformats.org/presentationml/2006/main">
+  <p:cSld>
+    <p:spTree>
+      <p:nvGrpSpPr>
+        <p:cNvPr id="1" name=""/>
+        <p:cNvGrpSpPr/>
+        <p:nvPr/>
+      </p:nvGrpSpPr>
+      <p:grpSpPr>
+        <a:xfrm>
+          <a:off x="0" y="0"/>
+          <a:ext cx="0" cy="0"/>
+          <a:chOff x="0" y="0"/>
+          <a:chExt cx="0" cy="0"/>
+        </a:xfrm>
+      </p:grpSpPr>
+      <p:sp>
+        <p:nvSpPr>
+          <p:cNvPr id="2" name="Slide Image Placeholder 1"/>
+          <p:cNvSpPr>
+            <a:spLocks noGrp="1" noRot="1" noChangeAspect="1"/>
+          </p:cNvSpPr>
+          <p:nvPr>
+            <p:ph type="sldImg"/>
+          </p:nvPr>
+        </p:nvSpPr>
+        <p:spPr/>
+      </p:sp>
+      <p:sp>
+        <p:nvSpPr>
+          <p:cNvPr id="3" name="Notes Placeholder 2"/>
+          <p:cNvSpPr>
+            <a:spLocks noGrp="1"/>
+          </p:cNvSpPr>
+          <p:nvPr>
+            <p:ph type="body" idx="1"/>
+          </p:nvPr>
+        </p:nvSpPr>
+        <p:spPr/>
+        <p:txBody>
+          <a:bodyPr/>
+          <a:lstStyle/>
+          <a:p>
+            <a:r>
+              <a:rPr lang="en-US" dirty="0"/>
+              <a:t>Lei</a:t>
+            </a:r>
+          </a:p>
+        </p:txBody>
+      </p:sp>
+      <p:sp>
+        <p:nvSpPr>
+          <p:cNvPr id="4" name="Slide Number Placeholder 3"/>
+          <p:cNvSpPr>
+            <a:spLocks noGrp="1"/>
+          </p:cNvSpPr>
+          <p:nvPr>
+            <p:ph type="sldNum" sz="quarter" idx="5"/>
+          </p:nvPr>
+        </p:nvSpPr>
+        <p:spPr/>
+        <p:txBody>
+          <a:bodyPr/>
+          <a:lstStyle/>
+          <a:p>
+            <a:fld id="{76EE7F15-8406-4641-8D67-25DB3BF862B4}" type="slidenum">
+              <a:rPr lang="en-US" smtClean="0"/>
+              <a:t>9</a:t>
+            </a:fld>
+            <a:endParaRPr lang="en-US"/>
+          </a:p>
+        </p:txBody>
+      </p:sp>
+    </p:spTree>
+    <p:extLst>
+      <p:ext uri="{BB962C8B-B14F-4D97-AF65-F5344CB8AC3E}">
+        <p14:creationId xmlns:p14="http://schemas.microsoft.com/office/powerpoint/2010/main" val="2272867888"/>
       </p:ext>
     </p:extLst>
   </p:cSld>
@@ -6281,7 +7136,15 @@
           <a:p>
             <a:r>
               <a:rPr lang="en-US" dirty="0"/>
-              <a:t>US Fires </a:t>
+              <a:t>US </a:t>
+            </a:r>
+            <a:r>
+              <a:rPr lang="en-US" dirty="0" err="1"/>
+              <a:t>WildFires</a:t>
+            </a:r>
+            <a:r>
+              <a:rPr lang="en-US" dirty="0"/>
+              <a:t> </a:t>
             </a:r>
             <a:r>
               <a:rPr lang="en-US" sz="2000" dirty="0"/>
@@ -6401,7 +7264,7 @@
           </p:nvPr>
         </p:nvPicPr>
         <p:blipFill rotWithShape="1">
-          <a:blip r:embed="rId2"/>
+          <a:blip r:embed="rId3"/>
           <a:srcRect l="17389" r="12867"/>
           <a:stretch/>
         </p:blipFill>
@@ -6430,7 +7293,7 @@
           <p:nvPr/>
         </p:nvPicPr>
         <p:blipFill rotWithShape="1">
-          <a:blip r:embed="rId3"/>
+          <a:blip r:embed="rId4"/>
           <a:srcRect r="46867"/>
           <a:stretch/>
         </p:blipFill>
@@ -6497,7 +7360,7 @@
           <a:p>
             <a:r>
               <a:rPr lang="en-US" dirty="0"/>
-              <a:t>Discussion</a:t>
+              <a:t>Discussion/Post Mortem</a:t>
             </a:r>
           </a:p>
         </p:txBody>
@@ -6525,20 +7388,31 @@
           <a:p>
             <a:r>
               <a:rPr lang="en-US" dirty="0"/>
-              <a:t>States with low stats decrease the trends YOY/State to State</a:t>
-            </a:r>
-          </a:p>
-          <a:p>
-            <a:r>
-              <a:rPr lang="en-US" dirty="0"/>
-              <a:t>There are correlations between types of fire and fire size</a:t>
-            </a:r>
-          </a:p>
-          <a:p>
-            <a:r>
-              <a:rPr lang="en-US" dirty="0"/>
-              <a:t>There is an obvious concentration of fires on the West Coast from California up to Alaska</a:t>
-            </a:r>
+              <a:t>Visualization – </a:t>
+            </a:r>
+            <a:r>
+              <a:rPr lang="en-US" dirty="0" err="1"/>
+              <a:t>Jupyter</a:t>
+            </a:r>
+            <a:r>
+              <a:rPr lang="en-US" dirty="0"/>
+              <a:t> Notebook</a:t>
+            </a:r>
+          </a:p>
+          <a:p>
+            <a:r>
+              <a:rPr lang="en-US" dirty="0"/>
+              <a:t>The data needed special encoding</a:t>
+            </a:r>
+          </a:p>
+          <a:p>
+            <a:r>
+              <a:rPr lang="en-US" dirty="0"/>
+              <a:t>Filtering thru the full file and slicing and dicing states for more concise comparisons were tedious</a:t>
+            </a:r>
+          </a:p>
+          <a:p>
+            <a:endParaRPr lang="en-US" dirty="0"/>
           </a:p>
           <a:p>
             <a:endParaRPr lang="en-US" dirty="0"/>
@@ -6580,101 +7454,6 @@
           <p:cNvPr id="2" name="Title 1">
             <a:extLst>
               <a:ext uri="{FF2B5EF4-FFF2-40B4-BE49-F238E27FC236}">
-                <a16:creationId xmlns:a16="http://schemas.microsoft.com/office/drawing/2014/main" id="{98387A69-2263-46AA-8AC5-1C27CAA82C3A}"/>
-              </a:ext>
-            </a:extLst>
-          </p:cNvPr>
-          <p:cNvSpPr>
-            <a:spLocks noGrp="1"/>
-          </p:cNvSpPr>
-          <p:nvPr>
-            <p:ph type="title"/>
-          </p:nvPr>
-        </p:nvSpPr>
-        <p:spPr/>
-        <p:txBody>
-          <a:bodyPr/>
-          <a:lstStyle/>
-          <a:p>
-            <a:r>
-              <a:rPr lang="en-US" dirty="0"/>
-              <a:t>Post Mortem</a:t>
-            </a:r>
-          </a:p>
-        </p:txBody>
-      </p:sp>
-      <p:sp>
-        <p:nvSpPr>
-          <p:cNvPr id="3" name="Content Placeholder 2">
-            <a:extLst>
-              <a:ext uri="{FF2B5EF4-FFF2-40B4-BE49-F238E27FC236}">
-                <a16:creationId xmlns:a16="http://schemas.microsoft.com/office/drawing/2014/main" id="{70CA401D-F4E8-4FF1-88EE-CE6B70190D2C}"/>
-              </a:ext>
-            </a:extLst>
-          </p:cNvPr>
-          <p:cNvSpPr>
-            <a:spLocks noGrp="1"/>
-          </p:cNvSpPr>
-          <p:nvPr>
-            <p:ph idx="1"/>
-          </p:nvPr>
-        </p:nvSpPr>
-        <p:spPr/>
-        <p:txBody>
-          <a:bodyPr/>
-          <a:lstStyle/>
-          <a:p>
-            <a:r>
-              <a:rPr lang="en-US" dirty="0"/>
-              <a:t>The data needed special encoding</a:t>
-            </a:r>
-          </a:p>
-          <a:p>
-            <a:r>
-              <a:rPr lang="en-US" dirty="0"/>
-              <a:t>Filtering thru the full file and slicing and dicing states for more concise comparisons were tedious</a:t>
-            </a:r>
-          </a:p>
-          <a:p>
-            <a:endParaRPr lang="en-US" dirty="0"/>
-          </a:p>
-        </p:txBody>
-      </p:sp>
-    </p:spTree>
-    <p:extLst>
-      <p:ext uri="{BB962C8B-B14F-4D97-AF65-F5344CB8AC3E}">
-        <p14:creationId xmlns:p14="http://schemas.microsoft.com/office/powerpoint/2010/main" val="1655024986"/>
-      </p:ext>
-    </p:extLst>
-  </p:cSld>
-  <p:clrMapOvr>
-    <a:masterClrMapping/>
-  </p:clrMapOvr>
-</p:sld>
-</file>
-
-<file path=ppt/slides/slide13.xml><?xml version="1.0" encoding="utf-8"?>
-<p:sld xmlns:a="http://schemas.openxmlformats.org/drawingml/2006/main" xmlns:r="http://schemas.openxmlformats.org/officeDocument/2006/relationships" xmlns:p="http://schemas.openxmlformats.org/presentationml/2006/main">
-  <p:cSld>
-    <p:spTree>
-      <p:nvGrpSpPr>
-        <p:cNvPr id="1" name=""/>
-        <p:cNvGrpSpPr/>
-        <p:nvPr/>
-      </p:nvGrpSpPr>
-      <p:grpSpPr>
-        <a:xfrm>
-          <a:off x="0" y="0"/>
-          <a:ext cx="0" cy="0"/>
-          <a:chOff x="0" y="0"/>
-          <a:chExt cx="0" cy="0"/>
-        </a:xfrm>
-      </p:grpSpPr>
-      <p:sp>
-        <p:nvSpPr>
-          <p:cNvPr id="2" name="Title 1">
-            <a:extLst>
-              <a:ext uri="{FF2B5EF4-FFF2-40B4-BE49-F238E27FC236}">
                 <a16:creationId xmlns:a16="http://schemas.microsoft.com/office/drawing/2014/main" id="{5159D2E7-CEAC-46AF-86DD-878506A999F9}"/>
               </a:ext>
             </a:extLst>
@@ -6799,8 +7578,16 @@
         </p:nvSpPr>
         <p:spPr/>
         <p:txBody>
-          <a:bodyPr/>
-          <a:lstStyle/>
+          <a:bodyPr>
+            <a:normAutofit/>
+          </a:bodyPr>
+          <a:lstStyle/>
+          <a:p>
+            <a:r>
+              <a:rPr lang="en-US" dirty="0"/>
+              <a:t>Recent notable fires</a:t>
+            </a:r>
+          </a:p>
           <a:p>
             <a:r>
               <a:rPr lang="en-US" dirty="0"/>
@@ -6825,6 +7612,13 @@
             <a:pPr lvl="1"/>
             <a:r>
               <a:rPr lang="en-US" dirty="0"/>
+              <a:t>Trends in size/frequency YOY</a:t>
+            </a:r>
+          </a:p>
+          <a:p>
+            <a:pPr lvl="1"/>
+            <a:r>
+              <a:rPr lang="en-US" dirty="0"/>
               <a:t>Fire cause and size/frequency of fires</a:t>
             </a:r>
           </a:p>
@@ -6836,40 +7630,28 @@
             </a:r>
           </a:p>
           <a:p>
-            <a:pPr lvl="1"/>
-            <a:r>
-              <a:rPr lang="en-US" dirty="0"/>
-              <a:t>Trends in size/frequency YOY</a:t>
-            </a:r>
-          </a:p>
-          <a:p>
-            <a:r>
-              <a:rPr lang="en-US" dirty="0"/>
-              <a:t>Increase in average size of fires YOY</a:t>
-            </a:r>
-          </a:p>
-          <a:p>
-            <a:r>
-              <a:rPr lang="en-US" dirty="0"/>
-              <a:t>Lightning is biggest contributor to fire size</a:t>
-            </a:r>
-          </a:p>
-          <a:p>
-            <a:r>
-              <a:rPr lang="en-US" dirty="0"/>
-              <a:t>West Coast has the most fires (over 15K acres)</a:t>
-            </a:r>
-          </a:p>
-          <a:p>
-            <a:r>
-              <a:rPr lang="en-US" dirty="0"/>
-              <a:t>2015 is the most recent year of data - </a:t>
-            </a:r>
-            <a:r>
-              <a:rPr lang="en-US" dirty="0" err="1"/>
-              <a:t>limitor</a:t>
-            </a:r>
-            <a:endParaRPr lang="en-US" dirty="0"/>
+            <a:r>
+              <a:rPr lang="en-US" dirty="0"/>
+              <a:t>We found some strong correlations when </a:t>
+            </a:r>
+          </a:p>
+          <a:p>
+            <a:pPr marL="0" indent="0">
+              <a:buNone/>
+            </a:pPr>
+            <a:r>
+              <a:rPr lang="en-US" dirty="0"/>
+              <a:t>looking at sizes of fires but not strong enough</a:t>
+            </a:r>
+          </a:p>
+          <a:p>
+            <a:pPr marL="0" indent="0">
+              <a:buNone/>
+            </a:pPr>
+            <a:r>
+              <a:rPr lang="en-US" dirty="0"/>
+              <a:t>to prove causation</a:t>
+            </a:r>
           </a:p>
         </p:txBody>
       </p:sp>
@@ -6895,8 +7677,8 @@
         </p:blipFill>
         <p:spPr>
           <a:xfrm>
-            <a:off x="7731534" y="2613566"/>
-            <a:ext cx="3774666" cy="3186112"/>
+            <a:off x="7142725" y="2365065"/>
+            <a:ext cx="4363475" cy="3683113"/>
           </a:xfrm>
           <a:prstGeom prst="rect">
             <a:avLst/>
@@ -6979,13 +7761,21 @@
         </p:nvSpPr>
         <p:spPr/>
         <p:txBody>
-          <a:bodyPr/>
-          <a:lstStyle/>
-          <a:p>
-            <a:r>
-              <a:rPr lang="en-US" dirty="0"/>
-              <a:t>Is count or size of fires more significant?</a:t>
-            </a:r>
+          <a:bodyPr>
+            <a:normAutofit/>
+          </a:bodyPr>
+          <a:lstStyle/>
+          <a:p>
+            <a:r>
+              <a:rPr lang="en-US" dirty="0"/>
+              <a:t>Is count or size of fires more significant? </a:t>
+            </a:r>
+          </a:p>
+          <a:p>
+            <a:pPr marL="0" indent="0">
+              <a:buNone/>
+            </a:pPr>
+            <a:endParaRPr lang="en-US" dirty="0"/>
           </a:p>
           <a:p>
             <a:r>
@@ -6997,56 +7787,47 @@
             <a:pPr lvl="1"/>
             <a:r>
               <a:rPr lang="en-US" dirty="0"/>
-              <a:t>Is there a YOY trend in count of fires or size of fires?</a:t>
+              <a:t>Is there a consistent top cause of fire?</a:t>
             </a:r>
           </a:p>
           <a:p>
             <a:pPr lvl="1"/>
             <a:r>
               <a:rPr lang="en-US" dirty="0"/>
-              <a:t>Is there a consistent top cause of fire?</a:t>
+              <a:t>Are there causes that result primarily in the largest fires?</a:t>
+            </a:r>
+          </a:p>
+          <a:p>
+            <a:pPr marL="457200" lvl="1" indent="0">
+              <a:buNone/>
+            </a:pPr>
+            <a:endParaRPr lang="en-US" dirty="0"/>
+          </a:p>
+          <a:p>
+            <a:r>
+              <a:rPr lang="en-US" dirty="0"/>
+              <a:t>State data…?</a:t>
             </a:r>
           </a:p>
           <a:p>
             <a:pPr lvl="1"/>
             <a:r>
               <a:rPr lang="en-US" dirty="0"/>
-              <a:t>Are there causes that result primarily in the largest fires?</a:t>
+              <a:t>Are there any states that have trends YOY?</a:t>
             </a:r>
           </a:p>
           <a:p>
             <a:pPr lvl="1"/>
-            <a:r>
-              <a:rPr lang="en-US" dirty="0"/>
-              <a:t>Are fires avoidable for the most part? </a:t>
-            </a:r>
-          </a:p>
-          <a:p>
-            <a:pPr lvl="1"/>
-            <a:r>
-              <a:rPr lang="en-US" dirty="0"/>
-              <a:t>Are there correlations between cause of fire and fire size?</a:t>
-            </a:r>
-          </a:p>
-          <a:p>
-            <a:r>
-              <a:rPr lang="en-US" dirty="0"/>
-              <a:t>  State data…?</a:t>
-            </a:r>
-          </a:p>
-          <a:p>
-            <a:pPr lvl="1"/>
-            <a:r>
-              <a:rPr lang="en-US" dirty="0"/>
-              <a:t>Are there any states that have trends YOY?</a:t>
-            </a:r>
-          </a:p>
-          <a:p>
-            <a:pPr lvl="1"/>
-            <a:r>
-              <a:rPr lang="en-US" dirty="0"/>
-              <a:t>Are there correlations between weather and fire size by state?</a:t>
-            </a:r>
+            <a:endParaRPr lang="en-US" dirty="0"/>
+          </a:p>
+          <a:p>
+            <a:r>
+              <a:rPr lang="en-US" dirty="0"/>
+              <a:t>Which combinations of data have strong trends?</a:t>
+            </a:r>
+          </a:p>
+          <a:p>
+            <a:endParaRPr lang="en-US" dirty="0"/>
           </a:p>
         </p:txBody>
       </p:sp>
@@ -7131,7 +7912,7 @@
           <a:p>
             <a:r>
               <a:rPr lang="en-US" dirty="0"/>
-              <a:t>CSV file was found containing 23 years of fire data for the US</a:t>
+              <a:t>CSV file – 23 years of fire data for the US – missing data</a:t>
             </a:r>
           </a:p>
           <a:p>
@@ -7142,7 +7923,7 @@
             </a:r>
             <a:r>
               <a:rPr lang="en-US" dirty="0">
-                <a:hlinkClick r:id="rId2"/>
+                <a:hlinkClick r:id="rId3"/>
               </a:rPr>
               <a:t>https://doi.org/10.2737/RDS-2013-0009.4</a:t>
             </a:r>
@@ -7183,14 +7964,14 @@
           <p:nvPr/>
         </p:nvPicPr>
         <p:blipFill rotWithShape="1">
-          <a:blip r:embed="rId3"/>
+          <a:blip r:embed="rId4"/>
           <a:srcRect l="7434" t="4923"/>
           <a:stretch/>
         </p:blipFill>
         <p:spPr>
           <a:xfrm>
-            <a:off x="3026229" y="4963886"/>
-            <a:ext cx="6675664" cy="1730827"/>
+            <a:off x="2892199" y="4913644"/>
+            <a:ext cx="6407603" cy="1661326"/>
           </a:xfrm>
           <a:prstGeom prst="rect">
             <a:avLst/>
@@ -7232,7 +8013,7 @@
           <p:cNvPr id="2" name="Title 1">
             <a:extLst>
               <a:ext uri="{FF2B5EF4-FFF2-40B4-BE49-F238E27FC236}">
-                <a16:creationId xmlns:a16="http://schemas.microsoft.com/office/drawing/2014/main" id="{48BBDA52-5DBD-4270-A388-ABBD364887AC}"/>
+                <a16:creationId xmlns:a16="http://schemas.microsoft.com/office/drawing/2014/main" id="{19CD08C8-D4A6-4EC2-9C36-5C60792206C3}"/>
               </a:ext>
             </a:extLst>
           </p:cNvPr>
@@ -7257,10 +8038,40 @@
       </p:sp>
       <p:pic>
         <p:nvPicPr>
-          <p:cNvPr id="5" name="Content Placeholder 4">
+          <p:cNvPr id="7" name="Picture 6" descr="A screenshot of a cell phone&#10;&#10;Description automatically generated">
             <a:extLst>
               <a:ext uri="{FF2B5EF4-FFF2-40B4-BE49-F238E27FC236}">
-                <a16:creationId xmlns:a16="http://schemas.microsoft.com/office/drawing/2014/main" id="{A64F2B58-5CA1-426B-A747-A92BE8D5B21E}"/>
+                <a16:creationId xmlns:a16="http://schemas.microsoft.com/office/drawing/2014/main" id="{52A0C2FC-B938-4DFB-8071-DD5C2388041C}"/>
+              </a:ext>
+            </a:extLst>
+          </p:cNvPr>
+          <p:cNvPicPr>
+            <a:picLocks noChangeAspect="1"/>
+          </p:cNvPicPr>
+          <p:nvPr/>
+        </p:nvPicPr>
+        <p:blipFill>
+          <a:blip r:embed="rId3"/>
+          <a:stretch>
+            <a:fillRect/>
+          </a:stretch>
+        </p:blipFill>
+        <p:spPr>
+          <a:xfrm>
+            <a:off x="6411061" y="2861669"/>
+            <a:ext cx="5487650" cy="3658433"/>
+          </a:xfrm>
+          <a:prstGeom prst="rect">
+            <a:avLst/>
+          </a:prstGeom>
+        </p:spPr>
+      </p:pic>
+      <p:pic>
+        <p:nvPicPr>
+          <p:cNvPr id="11" name="Content Placeholder 10" descr="A screenshot of a cell phone&#10;&#10;Description automatically generated">
+            <a:extLst>
+              <a:ext uri="{FF2B5EF4-FFF2-40B4-BE49-F238E27FC236}">
+                <a16:creationId xmlns:a16="http://schemas.microsoft.com/office/drawing/2014/main" id="{D7089094-FB63-4278-92AA-B5253A756850}"/>
               </a:ext>
             </a:extLst>
           </p:cNvPr>
@@ -7272,22 +8083,52 @@
           </p:nvPr>
         </p:nvPicPr>
         <p:blipFill>
-          <a:blip r:embed="rId2"/>
+          <a:blip r:embed="rId4"/>
           <a:stretch>
             <a:fillRect/>
           </a:stretch>
         </p:blipFill>
         <p:spPr>
           <a:xfrm>
-            <a:off x="2876550" y="2193925"/>
-            <a:ext cx="6438900" cy="4024313"/>
-          </a:xfrm>
+            <a:off x="293290" y="2861668"/>
+            <a:ext cx="5487650" cy="3658433"/>
+          </a:xfrm>
+        </p:spPr>
+      </p:pic>
+      <p:pic>
+        <p:nvPicPr>
+          <p:cNvPr id="3" name="Picture 2">
+            <a:extLst>
+              <a:ext uri="{FF2B5EF4-FFF2-40B4-BE49-F238E27FC236}">
+                <a16:creationId xmlns:a16="http://schemas.microsoft.com/office/drawing/2014/main" id="{DBD354B3-5182-4A5C-8643-C862C4D6A5E1}"/>
+              </a:ext>
+            </a:extLst>
+          </p:cNvPr>
+          <p:cNvPicPr>
+            <a:picLocks noChangeAspect="1"/>
+          </p:cNvPicPr>
+          <p:nvPr/>
+        </p:nvPicPr>
+        <p:blipFill>
+          <a:blip r:embed="rId5"/>
+          <a:stretch>
+            <a:fillRect/>
+          </a:stretch>
+        </p:blipFill>
+        <p:spPr>
+          <a:xfrm>
+            <a:off x="719139" y="307415"/>
+            <a:ext cx="4352921" cy="2206943"/>
+          </a:xfrm>
+          <a:prstGeom prst="rect">
+            <a:avLst/>
+          </a:prstGeom>
         </p:spPr>
       </p:pic>
     </p:spTree>
     <p:extLst>
       <p:ext uri="{BB962C8B-B14F-4D97-AF65-F5344CB8AC3E}">
-        <p14:creationId xmlns:p14="http://schemas.microsoft.com/office/powerpoint/2010/main" val="3255844021"/>
+        <p14:creationId xmlns:p14="http://schemas.microsoft.com/office/powerpoint/2010/main" val="3189742200"/>
       </p:ext>
     </p:extLst>
   </p:cSld>
@@ -7319,7 +8160,7 @@
           <p:cNvPr id="2" name="Title 1">
             <a:extLst>
               <a:ext uri="{FF2B5EF4-FFF2-40B4-BE49-F238E27FC236}">
-                <a16:creationId xmlns:a16="http://schemas.microsoft.com/office/drawing/2014/main" id="{C0016DF1-4D43-4FBF-8D9F-5CD30271F800}"/>
+                <a16:creationId xmlns:a16="http://schemas.microsoft.com/office/drawing/2014/main" id="{19CD08C8-D4A6-4EC2-9C36-5C60792206C3}"/>
               </a:ext>
             </a:extLst>
           </p:cNvPr>
@@ -7344,42 +8185,10 @@
       </p:sp>
       <p:pic>
         <p:nvPicPr>
-          <p:cNvPr id="4" name="Content Placeholder 3">
+          <p:cNvPr id="3" name="Picture 2">
             <a:extLst>
               <a:ext uri="{FF2B5EF4-FFF2-40B4-BE49-F238E27FC236}">
-                <a16:creationId xmlns:a16="http://schemas.microsoft.com/office/drawing/2014/main" id="{5D7FB06B-F50D-4FC2-B577-FA36B058F27C}"/>
-              </a:ext>
-            </a:extLst>
-          </p:cNvPr>
-          <p:cNvPicPr>
-            <a:picLocks noGrp="1" noChangeAspect="1"/>
-          </p:cNvPicPr>
-          <p:nvPr>
-            <p:ph idx="1"/>
-          </p:nvPr>
-        </p:nvPicPr>
-        <p:blipFill>
-          <a:blip r:embed="rId2"/>
-          <a:stretch>
-            <a:fillRect/>
-          </a:stretch>
-        </p:blipFill>
-        <p:spPr>
-          <a:xfrm>
-            <a:off x="4255068" y="2057401"/>
-            <a:ext cx="7791675" cy="3895838"/>
-          </a:xfrm>
-          <a:prstGeom prst="rect">
-            <a:avLst/>
-          </a:prstGeom>
-        </p:spPr>
-      </p:pic>
-      <p:pic>
-        <p:nvPicPr>
-          <p:cNvPr id="5" name="Picture 4">
-            <a:extLst>
-              <a:ext uri="{FF2B5EF4-FFF2-40B4-BE49-F238E27FC236}">
-                <a16:creationId xmlns:a16="http://schemas.microsoft.com/office/drawing/2014/main" id="{673118E6-9FA8-44E2-BC01-6DEE144DC473}"/>
+                <a16:creationId xmlns:a16="http://schemas.microsoft.com/office/drawing/2014/main" id="{18B07742-D8AA-4997-85C4-57378BF1DEF9}"/>
               </a:ext>
             </a:extLst>
           </p:cNvPr>
@@ -7388,15 +8197,46 @@
           </p:cNvPicPr>
           <p:nvPr/>
         </p:nvPicPr>
-        <p:blipFill rotWithShape="1">
+        <p:blipFill>
           <a:blip r:embed="rId3"/>
-          <a:srcRect l="18119" t="4856"/>
-          <a:stretch/>
+          <a:stretch>
+            <a:fillRect/>
+          </a:stretch>
         </p:blipFill>
         <p:spPr>
           <a:xfrm>
-            <a:off x="111354" y="2416629"/>
-            <a:ext cx="3929742" cy="2908526"/>
+            <a:off x="1157287" y="3429000"/>
+            <a:ext cx="3476625" cy="1752600"/>
+          </a:xfrm>
+          <a:prstGeom prst="rect">
+            <a:avLst/>
+          </a:prstGeom>
+        </p:spPr>
+      </p:pic>
+      <p:pic>
+        <p:nvPicPr>
+          <p:cNvPr id="5" name="Picture 4">
+            <a:extLst>
+              <a:ext uri="{FF2B5EF4-FFF2-40B4-BE49-F238E27FC236}">
+                <a16:creationId xmlns:a16="http://schemas.microsoft.com/office/drawing/2014/main" id="{82FFAC81-33EA-485B-AF84-7BE3E2CA9648}"/>
+              </a:ext>
+            </a:extLst>
+          </p:cNvPr>
+          <p:cNvPicPr>
+            <a:picLocks noChangeAspect="1"/>
+          </p:cNvPicPr>
+          <p:nvPr/>
+        </p:nvPicPr>
+        <p:blipFill>
+          <a:blip r:embed="rId4"/>
+          <a:stretch>
+            <a:fillRect/>
+          </a:stretch>
+        </p:blipFill>
+        <p:spPr>
+          <a:xfrm>
+            <a:off x="5968773" y="2572654"/>
+            <a:ext cx="5896656" cy="3931104"/>
           </a:xfrm>
           <a:prstGeom prst="rect">
             <a:avLst/>
@@ -7406,7 +8246,7 @@
     </p:spTree>
     <p:extLst>
       <p:ext uri="{BB962C8B-B14F-4D97-AF65-F5344CB8AC3E}">
-        <p14:creationId xmlns:p14="http://schemas.microsoft.com/office/powerpoint/2010/main" val="2755994038"/>
+        <p14:creationId xmlns:p14="http://schemas.microsoft.com/office/powerpoint/2010/main" val="3758669070"/>
       </p:ext>
     </p:extLst>
   </p:cSld>
@@ -7438,7 +8278,7 @@
           <p:cNvPr id="2" name="Title 1">
             <a:extLst>
               <a:ext uri="{FF2B5EF4-FFF2-40B4-BE49-F238E27FC236}">
-                <a16:creationId xmlns:a16="http://schemas.microsoft.com/office/drawing/2014/main" id="{FF6EDBB6-D931-4711-B91E-6A4C7FFD5BEC}"/>
+                <a16:creationId xmlns:a16="http://schemas.microsoft.com/office/drawing/2014/main" id="{48BBDA52-5DBD-4270-A388-ABBD364887AC}"/>
               </a:ext>
             </a:extLst>
           </p:cNvPr>
@@ -7449,12 +8289,7 @@
             <p:ph type="title"/>
           </p:nvPr>
         </p:nvSpPr>
-        <p:spPr>
-          <a:xfrm>
-            <a:off x="2974527" y="797030"/>
-            <a:ext cx="8610600" cy="1293028"/>
-          </a:xfrm>
-        </p:spPr>
+        <p:spPr/>
         <p:txBody>
           <a:bodyPr/>
           <a:lstStyle/>
@@ -7468,39 +8303,39 @@
       </p:sp>
       <p:pic>
         <p:nvPicPr>
-          <p:cNvPr id="5" name="Picture 4">
+          <p:cNvPr id="5" name="Content Placeholder 4">
             <a:extLst>
               <a:ext uri="{FF2B5EF4-FFF2-40B4-BE49-F238E27FC236}">
-                <a16:creationId xmlns:a16="http://schemas.microsoft.com/office/drawing/2014/main" id="{5BCE6CFD-A2E2-4A3C-A5AE-5BF174924CF5}"/>
+                <a16:creationId xmlns:a16="http://schemas.microsoft.com/office/drawing/2014/main" id="{A64F2B58-5CA1-426B-A747-A92BE8D5B21E}"/>
               </a:ext>
             </a:extLst>
           </p:cNvPr>
           <p:cNvPicPr>
-            <a:picLocks noChangeAspect="1"/>
+            <a:picLocks noGrp="1" noChangeAspect="1"/>
           </p:cNvPicPr>
-          <p:nvPr/>
+          <p:nvPr>
+            <p:ph idx="1"/>
+          </p:nvPr>
         </p:nvPicPr>
-        <p:blipFill rotWithShape="1">
+        <p:blipFill>
           <a:blip r:embed="rId3"/>
-          <a:srcRect l="8821"/>
-          <a:stretch/>
+          <a:stretch>
+            <a:fillRect/>
+          </a:stretch>
         </p:blipFill>
         <p:spPr>
           <a:xfrm>
-            <a:off x="106141" y="398115"/>
-            <a:ext cx="6272888" cy="1312990"/>
-          </a:xfrm>
-          <a:prstGeom prst="rect">
-            <a:avLst/>
-          </a:prstGeom>
+            <a:off x="6455235" y="2986097"/>
+            <a:ext cx="5681237" cy="3550773"/>
+          </a:xfrm>
         </p:spPr>
       </p:pic>
       <p:pic>
         <p:nvPicPr>
-          <p:cNvPr id="6" name="Picture 5" descr="A picture containing accessory, umbrella, clock&#10;&#10;Description automatically generated">
+          <p:cNvPr id="4" name="Picture 3">
             <a:extLst>
               <a:ext uri="{FF2B5EF4-FFF2-40B4-BE49-F238E27FC236}">
-                <a16:creationId xmlns:a16="http://schemas.microsoft.com/office/drawing/2014/main" id="{96918972-B59D-4872-A06A-E819018B38F1}"/>
+                <a16:creationId xmlns:a16="http://schemas.microsoft.com/office/drawing/2014/main" id="{661D2AEA-AC82-4BB8-9B2F-606260AFD96D}"/>
               </a:ext>
             </a:extLst>
           </p:cNvPr>
@@ -7517,8 +8352,38 @@
         </p:blipFill>
         <p:spPr>
           <a:xfrm>
-            <a:off x="2747976" y="1997804"/>
-            <a:ext cx="6189872" cy="4702627"/>
+            <a:off x="38098" y="764373"/>
+            <a:ext cx="7472591" cy="1293028"/>
+          </a:xfrm>
+          <a:prstGeom prst="rect">
+            <a:avLst/>
+          </a:prstGeom>
+        </p:spPr>
+      </p:pic>
+      <p:pic>
+        <p:nvPicPr>
+          <p:cNvPr id="7" name="Picture 6">
+            <a:extLst>
+              <a:ext uri="{FF2B5EF4-FFF2-40B4-BE49-F238E27FC236}">
+                <a16:creationId xmlns:a16="http://schemas.microsoft.com/office/drawing/2014/main" id="{2574CF1D-72EB-44B0-B6A6-92C719FD0519}"/>
+              </a:ext>
+            </a:extLst>
+          </p:cNvPr>
+          <p:cNvPicPr>
+            <a:picLocks noChangeAspect="1"/>
+          </p:cNvPicPr>
+          <p:nvPr/>
+        </p:nvPicPr>
+        <p:blipFill>
+          <a:blip r:embed="rId5"/>
+          <a:stretch>
+            <a:fillRect/>
+          </a:stretch>
+        </p:blipFill>
+        <p:spPr>
+          <a:xfrm>
+            <a:off x="78919" y="2986097"/>
+            <a:ext cx="6036312" cy="3550772"/>
           </a:xfrm>
           <a:prstGeom prst="rect">
             <a:avLst/>
@@ -7528,7 +8393,7 @@
     </p:spTree>
     <p:extLst>
       <p:ext uri="{BB962C8B-B14F-4D97-AF65-F5344CB8AC3E}">
-        <p14:creationId xmlns:p14="http://schemas.microsoft.com/office/powerpoint/2010/main" val="2482300198"/>
+        <p14:creationId xmlns:p14="http://schemas.microsoft.com/office/powerpoint/2010/main" val="3255844021"/>
       </p:ext>
     </p:extLst>
   </p:cSld>
@@ -7560,7 +8425,7 @@
           <p:cNvPr id="2" name="Title 1">
             <a:extLst>
               <a:ext uri="{FF2B5EF4-FFF2-40B4-BE49-F238E27FC236}">
-                <a16:creationId xmlns:a16="http://schemas.microsoft.com/office/drawing/2014/main" id="{19CD08C8-D4A6-4EC2-9C36-5C60792206C3}"/>
+                <a16:creationId xmlns:a16="http://schemas.microsoft.com/office/drawing/2014/main" id="{FF6EDBB6-D931-4711-B91E-6A4C7FFD5BEC}"/>
               </a:ext>
             </a:extLst>
           </p:cNvPr>
@@ -7571,7 +8436,12 @@
             <p:ph type="title"/>
           </p:nvPr>
         </p:nvSpPr>
-        <p:spPr/>
+        <p:spPr>
+          <a:xfrm>
+            <a:off x="2974527" y="797030"/>
+            <a:ext cx="8610600" cy="1293028"/>
+          </a:xfrm>
+        </p:spPr>
         <p:txBody>
           <a:bodyPr/>
           <a:lstStyle/>
@@ -7585,10 +8455,10 @@
       </p:sp>
       <p:pic>
         <p:nvPicPr>
-          <p:cNvPr id="7" name="Picture 6" descr="A screenshot of a cell phone&#10;&#10;Description automatically generated">
+          <p:cNvPr id="5" name="Picture 4">
             <a:extLst>
               <a:ext uri="{FF2B5EF4-FFF2-40B4-BE49-F238E27FC236}">
-                <a16:creationId xmlns:a16="http://schemas.microsoft.com/office/drawing/2014/main" id="{52A0C2FC-B938-4DFB-8071-DD5C2388041C}"/>
+                <a16:creationId xmlns:a16="http://schemas.microsoft.com/office/drawing/2014/main" id="{5BCE6CFD-A2E2-4A3C-A5AE-5BF174924CF5}"/>
               </a:ext>
             </a:extLst>
           </p:cNvPr>
@@ -7597,16 +8467,15 @@
           </p:cNvPicPr>
           <p:nvPr/>
         </p:nvPicPr>
-        <p:blipFill>
-          <a:blip r:embed="rId2"/>
-          <a:stretch>
-            <a:fillRect/>
-          </a:stretch>
+        <p:blipFill rotWithShape="1">
+          <a:blip r:embed="rId3"/>
+          <a:srcRect l="8821"/>
+          <a:stretch/>
         </p:blipFill>
         <p:spPr>
           <a:xfrm>
-            <a:off x="304175" y="2861669"/>
-            <a:ext cx="5487650" cy="3658433"/>
+            <a:off x="106141" y="398115"/>
+            <a:ext cx="6272888" cy="1312990"/>
           </a:xfrm>
           <a:prstGeom prst="rect">
             <a:avLst/>
@@ -7615,39 +8484,10 @@
       </p:pic>
       <p:pic>
         <p:nvPicPr>
-          <p:cNvPr id="11" name="Content Placeholder 10" descr="A screenshot of a cell phone&#10;&#10;Description automatically generated">
+          <p:cNvPr id="6" name="Picture 5" descr="A picture containing accessory, umbrella, clock&#10;&#10;Description automatically generated">
             <a:extLst>
               <a:ext uri="{FF2B5EF4-FFF2-40B4-BE49-F238E27FC236}">
-                <a16:creationId xmlns:a16="http://schemas.microsoft.com/office/drawing/2014/main" id="{D7089094-FB63-4278-92AA-B5253A756850}"/>
-              </a:ext>
-            </a:extLst>
-          </p:cNvPr>
-          <p:cNvPicPr>
-            <a:picLocks noGrp="1" noChangeAspect="1"/>
-          </p:cNvPicPr>
-          <p:nvPr>
-            <p:ph idx="1"/>
-          </p:nvPr>
-        </p:nvPicPr>
-        <p:blipFill>
-          <a:blip r:embed="rId3"/>
-          <a:stretch>
-            <a:fillRect/>
-          </a:stretch>
-        </p:blipFill>
-        <p:spPr>
-          <a:xfrm>
-            <a:off x="6400175" y="2861669"/>
-            <a:ext cx="5487650" cy="3658433"/>
-          </a:xfrm>
-        </p:spPr>
-      </p:pic>
-      <p:pic>
-        <p:nvPicPr>
-          <p:cNvPr id="3" name="Picture 2">
-            <a:extLst>
-              <a:ext uri="{FF2B5EF4-FFF2-40B4-BE49-F238E27FC236}">
-                <a16:creationId xmlns:a16="http://schemas.microsoft.com/office/drawing/2014/main" id="{DBD354B3-5182-4A5C-8643-C862C4D6A5E1}"/>
+                <a16:creationId xmlns:a16="http://schemas.microsoft.com/office/drawing/2014/main" id="{96918972-B59D-4872-A06A-E819018B38F1}"/>
               </a:ext>
             </a:extLst>
           </p:cNvPr>
@@ -7664,8 +8504,8 @@
         </p:blipFill>
         <p:spPr>
           <a:xfrm>
-            <a:off x="719139" y="307415"/>
-            <a:ext cx="4352921" cy="2206943"/>
+            <a:off x="2747976" y="1997804"/>
+            <a:ext cx="6189872" cy="4702627"/>
           </a:xfrm>
           <a:prstGeom prst="rect">
             <a:avLst/>
@@ -7675,7 +8515,7 @@
     </p:spTree>
     <p:extLst>
       <p:ext uri="{BB962C8B-B14F-4D97-AF65-F5344CB8AC3E}">
-        <p14:creationId xmlns:p14="http://schemas.microsoft.com/office/powerpoint/2010/main" val="3189742200"/>
+        <p14:creationId xmlns:p14="http://schemas.microsoft.com/office/powerpoint/2010/main" val="2482300198"/>
       </p:ext>
     </p:extLst>
   </p:cSld>
@@ -7707,7 +8547,7 @@
           <p:cNvPr id="2" name="Title 1">
             <a:extLst>
               <a:ext uri="{FF2B5EF4-FFF2-40B4-BE49-F238E27FC236}">
-                <a16:creationId xmlns:a16="http://schemas.microsoft.com/office/drawing/2014/main" id="{19CD08C8-D4A6-4EC2-9C36-5C60792206C3}"/>
+                <a16:creationId xmlns:a16="http://schemas.microsoft.com/office/drawing/2014/main" id="{C0016DF1-4D43-4FBF-8D9F-5CD30271F800}"/>
               </a:ext>
             </a:extLst>
           </p:cNvPr>
@@ -7732,10 +8572,10 @@
       </p:sp>
       <p:pic>
         <p:nvPicPr>
-          <p:cNvPr id="6" name="Content Placeholder 5">
+          <p:cNvPr id="4" name="Content Placeholder 3">
             <a:extLst>
               <a:ext uri="{FF2B5EF4-FFF2-40B4-BE49-F238E27FC236}">
-                <a16:creationId xmlns:a16="http://schemas.microsoft.com/office/drawing/2014/main" id="{1ACD8209-20EA-45C1-960A-9E0F0941FBEC}"/>
+                <a16:creationId xmlns:a16="http://schemas.microsoft.com/office/drawing/2014/main" id="{5D7FB06B-F50D-4FC2-B577-FA36B058F27C}"/>
               </a:ext>
             </a:extLst>
           </p:cNvPr>
@@ -7747,15 +8587,15 @@
           </p:nvPr>
         </p:nvPicPr>
         <p:blipFill>
-          <a:blip r:embed="rId2"/>
+          <a:blip r:embed="rId3"/>
           <a:stretch>
             <a:fillRect/>
           </a:stretch>
         </p:blipFill>
         <p:spPr>
           <a:xfrm>
-            <a:off x="6411685" y="2888341"/>
-            <a:ext cx="5529944" cy="3686629"/>
+            <a:off x="4255068" y="2057401"/>
+            <a:ext cx="7791675" cy="3895838"/>
           </a:xfrm>
           <a:prstGeom prst="rect">
             <a:avLst/>
@@ -7764,10 +8604,10 @@
       </p:pic>
       <p:pic>
         <p:nvPicPr>
-          <p:cNvPr id="8" name="Picture 7">
+          <p:cNvPr id="5" name="Picture 4">
             <a:extLst>
               <a:ext uri="{FF2B5EF4-FFF2-40B4-BE49-F238E27FC236}">
-                <a16:creationId xmlns:a16="http://schemas.microsoft.com/office/drawing/2014/main" id="{6A9247FD-522C-40A1-9F88-941A37B17A2A}"/>
+                <a16:creationId xmlns:a16="http://schemas.microsoft.com/office/drawing/2014/main" id="{673118E6-9FA8-44E2-BC01-6DEE144DC473}"/>
               </a:ext>
             </a:extLst>
           </p:cNvPr>
@@ -7776,46 +8616,15 @@
           </p:cNvPicPr>
           <p:nvPr/>
         </p:nvPicPr>
-        <p:blipFill>
-          <a:blip r:embed="rId3"/>
-          <a:stretch>
-            <a:fillRect/>
-          </a:stretch>
+        <p:blipFill rotWithShape="1">
+          <a:blip r:embed="rId4"/>
+          <a:srcRect l="18119" t="4856"/>
+          <a:stretch/>
         </p:blipFill>
         <p:spPr>
           <a:xfrm>
-            <a:off x="250371" y="2888341"/>
-            <a:ext cx="5529944" cy="3686629"/>
-          </a:xfrm>
-          <a:prstGeom prst="rect">
-            <a:avLst/>
-          </a:prstGeom>
-        </p:spPr>
-      </p:pic>
-      <p:pic>
-        <p:nvPicPr>
-          <p:cNvPr id="3" name="Picture 2">
-            <a:extLst>
-              <a:ext uri="{FF2B5EF4-FFF2-40B4-BE49-F238E27FC236}">
-                <a16:creationId xmlns:a16="http://schemas.microsoft.com/office/drawing/2014/main" id="{18B07742-D8AA-4997-85C4-57378BF1DEF9}"/>
-              </a:ext>
-            </a:extLst>
-          </p:cNvPr>
-          <p:cNvPicPr>
-            <a:picLocks noChangeAspect="1"/>
-          </p:cNvPicPr>
-          <p:nvPr/>
-        </p:nvPicPr>
-        <p:blipFill>
-          <a:blip r:embed="rId4"/>
-          <a:stretch>
-            <a:fillRect/>
-          </a:stretch>
-        </p:blipFill>
-        <p:spPr>
-          <a:xfrm>
-            <a:off x="1157287" y="534587"/>
-            <a:ext cx="3476625" cy="1752600"/>
+            <a:off x="111354" y="2416629"/>
+            <a:ext cx="3929742" cy="2908526"/>
           </a:xfrm>
           <a:prstGeom prst="rect">
             <a:avLst/>
@@ -7825,7 +8634,7 @@
     </p:spTree>
     <p:extLst>
       <p:ext uri="{BB962C8B-B14F-4D97-AF65-F5344CB8AC3E}">
-        <p14:creationId xmlns:p14="http://schemas.microsoft.com/office/powerpoint/2010/main" val="3758669070"/>
+        <p14:creationId xmlns:p14="http://schemas.microsoft.com/office/powerpoint/2010/main" val="2755994038"/>
       </p:ext>
     </p:extLst>
   </p:cSld>

</xml_diff>

<commit_message>
updated black pptx and created white version
</commit_message>
<xml_diff>
--- a/Presentation - Project 1.pptx
+++ b/Presentation - Project 1.pptx
@@ -5,22 +5,21 @@
     <p:sldMasterId id="2147483648" r:id="rId1"/>
   </p:sldMasterIdLst>
   <p:notesMasterIdLst>
-    <p:notesMasterId r:id="rId15"/>
+    <p:notesMasterId r:id="rId14"/>
   </p:notesMasterIdLst>
   <p:sldIdLst>
     <p:sldId id="256" r:id="rId2"/>
     <p:sldId id="258" r:id="rId3"/>
     <p:sldId id="259" r:id="rId4"/>
     <p:sldId id="260" r:id="rId5"/>
-    <p:sldId id="268" r:id="rId6"/>
-    <p:sldId id="270" r:id="rId7"/>
-    <p:sldId id="269" r:id="rId8"/>
-    <p:sldId id="257" r:id="rId9"/>
-    <p:sldId id="265" r:id="rId10"/>
+    <p:sldId id="257" r:id="rId6"/>
+    <p:sldId id="265" r:id="rId7"/>
+    <p:sldId id="268" r:id="rId8"/>
+    <p:sldId id="269" r:id="rId9"/>
+    <p:sldId id="270" r:id="rId10"/>
     <p:sldId id="266" r:id="rId11"/>
     <p:sldId id="262" r:id="rId12"/>
-    <p:sldId id="263" r:id="rId13"/>
-    <p:sldId id="264" r:id="rId14"/>
+    <p:sldId id="264" r:id="rId13"/>
   </p:sldIdLst>
   <p:sldSz cx="12192000" cy="6858000"/>
   <p:notesSz cx="6858000" cy="9144000"/>
@@ -221,7 +220,7 @@
           <a:p>
             <a:fld id="{DE6CF32A-27F4-4172-9B0D-B765DA71D8C8}" type="datetimeFigureOut">
               <a:rPr lang="en-US" smtClean="0"/>
-              <a:t>1/21/2020</a:t>
+              <a:t>1/23/2020</a:t>
             </a:fld>
             <a:endParaRPr lang="en-US"/>
           </a:p>
@@ -532,6 +531,212 @@
           <a:bodyPr/>
           <a:lstStyle/>
           <a:p>
+            <a:r>
+              <a:rPr lang="en-US" dirty="0"/>
+              <a:t>Queue </a:t>
+            </a:r>
+            <a:r>
+              <a:rPr lang="en-US" dirty="0" err="1"/>
+              <a:t>gordan</a:t>
+            </a:r>
+            <a:r>
+              <a:rPr lang="en-US" dirty="0"/>
+              <a:t> </a:t>
+            </a:r>
+            <a:r>
+              <a:rPr lang="en-US" dirty="0" err="1"/>
+              <a:t>ramsey</a:t>
+            </a:r>
+            <a:r>
+              <a:rPr lang="en-US" dirty="0"/>
+              <a:t> fire song</a:t>
+            </a:r>
+          </a:p>
+        </p:txBody>
+      </p:sp>
+      <p:sp>
+        <p:nvSpPr>
+          <p:cNvPr id="4" name="Slide Number Placeholder 3"/>
+          <p:cNvSpPr>
+            <a:spLocks noGrp="1"/>
+          </p:cNvSpPr>
+          <p:nvPr>
+            <p:ph type="sldNum" sz="quarter" idx="5"/>
+          </p:nvPr>
+        </p:nvSpPr>
+        <p:spPr/>
+        <p:txBody>
+          <a:bodyPr/>
+          <a:lstStyle/>
+          <a:p>
+            <a:fld id="{76EE7F15-8406-4641-8D67-25DB3BF862B4}" type="slidenum">
+              <a:rPr lang="en-US" smtClean="0"/>
+              <a:t>1</a:t>
+            </a:fld>
+            <a:endParaRPr lang="en-US"/>
+          </a:p>
+        </p:txBody>
+      </p:sp>
+    </p:spTree>
+    <p:extLst>
+      <p:ext uri="{BB962C8B-B14F-4D97-AF65-F5344CB8AC3E}">
+        <p14:creationId xmlns:p14="http://schemas.microsoft.com/office/powerpoint/2010/main" val="2747987997"/>
+      </p:ext>
+    </p:extLst>
+  </p:cSld>
+  <p:clrMapOvr>
+    <a:masterClrMapping/>
+  </p:clrMapOvr>
+</p:notes>
+</file>
+
+<file path=ppt/notesSlides/notesSlide10.xml><?xml version="1.0" encoding="utf-8"?>
+<p:notes xmlns:a="http://schemas.openxmlformats.org/drawingml/2006/main" xmlns:r="http://schemas.openxmlformats.org/officeDocument/2006/relationships" xmlns:p="http://schemas.openxmlformats.org/presentationml/2006/main">
+  <p:cSld>
+    <p:spTree>
+      <p:nvGrpSpPr>
+        <p:cNvPr id="1" name=""/>
+        <p:cNvGrpSpPr/>
+        <p:nvPr/>
+      </p:nvGrpSpPr>
+      <p:grpSpPr>
+        <a:xfrm>
+          <a:off x="0" y="0"/>
+          <a:ext cx="0" cy="0"/>
+          <a:chOff x="0" y="0"/>
+          <a:chExt cx="0" cy="0"/>
+        </a:xfrm>
+      </p:grpSpPr>
+      <p:sp>
+        <p:nvSpPr>
+          <p:cNvPr id="2" name="Slide Image Placeholder 1"/>
+          <p:cNvSpPr>
+            <a:spLocks noGrp="1" noRot="1" noChangeAspect="1"/>
+          </p:cNvSpPr>
+          <p:nvPr>
+            <p:ph type="sldImg"/>
+          </p:nvPr>
+        </p:nvSpPr>
+        <p:spPr/>
+      </p:sp>
+      <p:sp>
+        <p:nvSpPr>
+          <p:cNvPr id="3" name="Notes Placeholder 2"/>
+          <p:cNvSpPr>
+            <a:spLocks noGrp="1"/>
+          </p:cNvSpPr>
+          <p:nvPr>
+            <p:ph type="body" idx="1"/>
+          </p:nvPr>
+        </p:nvSpPr>
+        <p:spPr/>
+        <p:txBody>
+          <a:bodyPr/>
+          <a:lstStyle/>
+          <a:p>
+            <a:r>
+              <a:rPr lang="en-US" dirty="0"/>
+              <a:t>Bassam</a:t>
+            </a:r>
+          </a:p>
+        </p:txBody>
+      </p:sp>
+      <p:sp>
+        <p:nvSpPr>
+          <p:cNvPr id="4" name="Slide Number Placeholder 3"/>
+          <p:cNvSpPr>
+            <a:spLocks noGrp="1"/>
+          </p:cNvSpPr>
+          <p:nvPr>
+            <p:ph type="sldNum" sz="quarter" idx="5"/>
+          </p:nvPr>
+        </p:nvSpPr>
+        <p:spPr/>
+        <p:txBody>
+          <a:bodyPr/>
+          <a:lstStyle/>
+          <a:p>
+            <a:fld id="{76EE7F15-8406-4641-8D67-25DB3BF862B4}" type="slidenum">
+              <a:rPr lang="en-US" smtClean="0"/>
+              <a:t>10</a:t>
+            </a:fld>
+            <a:endParaRPr lang="en-US"/>
+          </a:p>
+        </p:txBody>
+      </p:sp>
+    </p:spTree>
+    <p:extLst>
+      <p:ext uri="{BB962C8B-B14F-4D97-AF65-F5344CB8AC3E}">
+        <p14:creationId xmlns:p14="http://schemas.microsoft.com/office/powerpoint/2010/main" val="3416750728"/>
+      </p:ext>
+    </p:extLst>
+  </p:cSld>
+  <p:clrMapOvr>
+    <a:masterClrMapping/>
+  </p:clrMapOvr>
+</p:notes>
+</file>
+
+<file path=ppt/notesSlides/notesSlide11.xml><?xml version="1.0" encoding="utf-8"?>
+<p:notes xmlns:a="http://schemas.openxmlformats.org/drawingml/2006/main" xmlns:r="http://schemas.openxmlformats.org/officeDocument/2006/relationships" xmlns:p="http://schemas.openxmlformats.org/presentationml/2006/main">
+  <p:cSld>
+    <p:spTree>
+      <p:nvGrpSpPr>
+        <p:cNvPr id="1" name=""/>
+        <p:cNvGrpSpPr/>
+        <p:nvPr/>
+      </p:nvGrpSpPr>
+      <p:grpSpPr>
+        <a:xfrm>
+          <a:off x="0" y="0"/>
+          <a:ext cx="0" cy="0"/>
+          <a:chOff x="0" y="0"/>
+          <a:chExt cx="0" cy="0"/>
+        </a:xfrm>
+      </p:grpSpPr>
+      <p:sp>
+        <p:nvSpPr>
+          <p:cNvPr id="2" name="Slide Image Placeholder 1"/>
+          <p:cNvSpPr>
+            <a:spLocks noGrp="1" noRot="1" noChangeAspect="1"/>
+          </p:cNvSpPr>
+          <p:nvPr>
+            <p:ph type="sldImg"/>
+          </p:nvPr>
+        </p:nvSpPr>
+        <p:spPr/>
+      </p:sp>
+      <p:sp>
+        <p:nvSpPr>
+          <p:cNvPr id="3" name="Notes Placeholder 2"/>
+          <p:cNvSpPr>
+            <a:spLocks noGrp="1"/>
+          </p:cNvSpPr>
+          <p:nvPr>
+            <p:ph type="body" idx="1"/>
+          </p:nvPr>
+        </p:nvSpPr>
+        <p:spPr/>
+        <p:txBody>
+          <a:bodyPr/>
+          <a:lstStyle/>
+          <a:p>
+            <a:r>
+              <a:rPr lang="en-US" dirty="0"/>
+              <a:t>Noor – </a:t>
+            </a:r>
+          </a:p>
+          <a:p>
+            <a:r>
+              <a:rPr lang="en-US"/>
+              <a:t>Data </a:t>
+            </a:r>
+            <a:r>
+              <a:rPr lang="en-US" dirty="0"/>
+              <a:t>limitations within data set</a:t>
+            </a:r>
+          </a:p>
+          <a:p>
             <a:pPr marL="0" marR="0" lvl="0" indent="0" algn="l" defTabSz="914400" rtl="0" eaLnBrk="1" fontAlgn="auto" latinLnBrk="0" hangingPunct="1">
               <a:lnSpc>
                 <a:spcPct val="100000"/>
@@ -550,37 +755,8 @@
               <a:defRPr/>
             </a:pPr>
             <a:r>
-              <a:rPr lang="en-US" sz="1200" kern="1200" dirty="0">
-                <a:solidFill>
-                  <a:schemeClr val="tx1"/>
-                </a:solidFill>
-                <a:latin typeface="+mn-lt"/>
-                <a:ea typeface="+mn-ea"/>
-                <a:cs typeface="+mn-cs"/>
-              </a:rPr>
-              <a:t>15K acres - </a:t>
-            </a:r>
-            <a:r>
-              <a:rPr lang="en-US" sz="1200" kern="1200" dirty="0" err="1">
-                <a:solidFill>
-                  <a:schemeClr val="tx1"/>
-                </a:solidFill>
-                <a:latin typeface="+mn-lt"/>
-                <a:ea typeface="+mn-ea"/>
-                <a:cs typeface="+mn-cs"/>
-              </a:rPr>
-              <a:t>limitor</a:t>
-            </a:r>
-            <a:r>
-              <a:rPr lang="en-US" sz="1200" kern="1200" dirty="0">
-                <a:solidFill>
-                  <a:schemeClr val="tx1"/>
-                </a:solidFill>
-                <a:latin typeface="+mn-lt"/>
-                <a:ea typeface="+mn-ea"/>
-                <a:cs typeface="+mn-cs"/>
-              </a:rPr>
-              <a:t> for relatively insignificant fires</a:t>
+              <a:rPr lang="en-US" dirty="0"/>
+              <a:t>Limitations on data – exploration – wish list</a:t>
             </a:r>
           </a:p>
           <a:p>
@@ -605,7 +781,7 @@
           <a:p>
             <a:fld id="{76EE7F15-8406-4641-8D67-25DB3BF862B4}" type="slidenum">
               <a:rPr lang="en-US" smtClean="0"/>
-              <a:t>2</a:t>
+              <a:t>11</a:t>
             </a:fld>
             <a:endParaRPr lang="en-US"/>
           </a:p>
@@ -614,7 +790,7 @@
     </p:spTree>
     <p:extLst>
       <p:ext uri="{BB962C8B-B14F-4D97-AF65-F5344CB8AC3E}">
-        <p14:creationId xmlns:p14="http://schemas.microsoft.com/office/powerpoint/2010/main" val="3515847930"/>
+        <p14:creationId xmlns:p14="http://schemas.microsoft.com/office/powerpoint/2010/main" val="2926178902"/>
       </p:ext>
     </p:extLst>
   </p:cSld>
@@ -668,7 +844,512 @@
           <a:bodyPr/>
           <a:lstStyle/>
           <a:p>
-            <a:endParaRPr lang="en-US" dirty="0"/>
+            <a:r>
+              <a:rPr lang="en-US" dirty="0"/>
+              <a:t>Sam</a:t>
+            </a:r>
+          </a:p>
+          <a:p>
+            <a:r>
+              <a:rPr lang="en-US" dirty="0"/>
+              <a:t>Increase in average size of fires YOY</a:t>
+            </a:r>
+          </a:p>
+          <a:p>
+            <a:r>
+              <a:rPr lang="en-US" dirty="0"/>
+              <a:t>Lightning is biggest contributor to fire size</a:t>
+            </a:r>
+          </a:p>
+          <a:p>
+            <a:r>
+              <a:rPr lang="en-US" dirty="0"/>
+              <a:t>West Coast has the most notable fires over 15K acres</a:t>
+            </a:r>
+          </a:p>
+          <a:p>
+            <a:r>
+              <a:rPr lang="en-US" dirty="0"/>
+              <a:t>2015 is the most recent year of data - limiter</a:t>
+            </a:r>
+          </a:p>
+          <a:p>
+            <a:endParaRPr lang="en-US" dirty="0"/>
+          </a:p>
+        </p:txBody>
+      </p:sp>
+      <p:sp>
+        <p:nvSpPr>
+          <p:cNvPr id="4" name="Slide Number Placeholder 3"/>
+          <p:cNvSpPr>
+            <a:spLocks noGrp="1"/>
+          </p:cNvSpPr>
+          <p:nvPr>
+            <p:ph type="sldNum" sz="quarter" idx="5"/>
+          </p:nvPr>
+        </p:nvSpPr>
+        <p:spPr/>
+        <p:txBody>
+          <a:bodyPr/>
+          <a:lstStyle/>
+          <a:p>
+            <a:fld id="{76EE7F15-8406-4641-8D67-25DB3BF862B4}" type="slidenum">
+              <a:rPr lang="en-US" smtClean="0"/>
+              <a:t>2</a:t>
+            </a:fld>
+            <a:endParaRPr lang="en-US"/>
+          </a:p>
+        </p:txBody>
+      </p:sp>
+    </p:spTree>
+    <p:extLst>
+      <p:ext uri="{BB962C8B-B14F-4D97-AF65-F5344CB8AC3E}">
+        <p14:creationId xmlns:p14="http://schemas.microsoft.com/office/powerpoint/2010/main" val="3515847930"/>
+      </p:ext>
+    </p:extLst>
+  </p:cSld>
+  <p:clrMapOvr>
+    <a:masterClrMapping/>
+  </p:clrMapOvr>
+</p:notes>
+</file>
+
+<file path=ppt/notesSlides/notesSlide3.xml><?xml version="1.0" encoding="utf-8"?>
+<p:notes xmlns:a="http://schemas.openxmlformats.org/drawingml/2006/main" xmlns:r="http://schemas.openxmlformats.org/officeDocument/2006/relationships" xmlns:p="http://schemas.openxmlformats.org/presentationml/2006/main">
+  <p:cSld>
+    <p:spTree>
+      <p:nvGrpSpPr>
+        <p:cNvPr id="1" name=""/>
+        <p:cNvGrpSpPr/>
+        <p:nvPr/>
+      </p:nvGrpSpPr>
+      <p:grpSpPr>
+        <a:xfrm>
+          <a:off x="0" y="0"/>
+          <a:ext cx="0" cy="0"/>
+          <a:chOff x="0" y="0"/>
+          <a:chExt cx="0" cy="0"/>
+        </a:xfrm>
+      </p:grpSpPr>
+      <p:sp>
+        <p:nvSpPr>
+          <p:cNvPr id="2" name="Slide Image Placeholder 1"/>
+          <p:cNvSpPr>
+            <a:spLocks noGrp="1" noRot="1" noChangeAspect="1"/>
+          </p:cNvSpPr>
+          <p:nvPr>
+            <p:ph type="sldImg"/>
+          </p:nvPr>
+        </p:nvSpPr>
+        <p:spPr/>
+      </p:sp>
+      <p:sp>
+        <p:nvSpPr>
+          <p:cNvPr id="3" name="Notes Placeholder 2"/>
+          <p:cNvSpPr>
+            <a:spLocks noGrp="1"/>
+          </p:cNvSpPr>
+          <p:nvPr>
+            <p:ph type="body" idx="1"/>
+          </p:nvPr>
+        </p:nvSpPr>
+        <p:spPr/>
+        <p:txBody>
+          <a:bodyPr/>
+          <a:lstStyle/>
+          <a:p>
+            <a:r>
+              <a:rPr lang="en-US" dirty="0"/>
+              <a:t>Noor – </a:t>
+            </a:r>
+          </a:p>
+          <a:p>
+            <a:pPr marL="171450" indent="-171450">
+              <a:buFontTx/>
+              <a:buChar char="-"/>
+            </a:pPr>
+            <a:r>
+              <a:rPr lang="en-US" dirty="0"/>
+              <a:t>We only kept 9 columns of data our of 39 in the file to actually analyze</a:t>
+            </a:r>
+          </a:p>
+          <a:p>
+            <a:pPr marL="171450" indent="-171450">
+              <a:buFontTx/>
+              <a:buChar char="-"/>
+            </a:pPr>
+            <a:r>
+              <a:rPr lang="en-US" dirty="0"/>
+              <a:t>While the count of fires decreased, their size increased as a US average YOY – our next slide visualizes this</a:t>
+            </a:r>
+          </a:p>
+          <a:p>
+            <a:pPr marL="171450" indent="-171450">
+              <a:buFontTx/>
+              <a:buChar char="-"/>
+            </a:pPr>
+            <a:r>
+              <a:rPr lang="en-US" dirty="0"/>
+              <a:t>There was a main contributor to both fire size AND frequency</a:t>
+            </a:r>
+          </a:p>
+          <a:p>
+            <a:pPr marL="171450" indent="-171450">
+              <a:buFontTx/>
+              <a:buChar char="-"/>
+            </a:pPr>
+            <a:r>
+              <a:rPr lang="en-US" dirty="0"/>
+              <a:t>there are states that have stronger YOY trends</a:t>
+            </a:r>
+          </a:p>
+        </p:txBody>
+      </p:sp>
+      <p:sp>
+        <p:nvSpPr>
+          <p:cNvPr id="4" name="Slide Number Placeholder 3"/>
+          <p:cNvSpPr>
+            <a:spLocks noGrp="1"/>
+          </p:cNvSpPr>
+          <p:nvPr>
+            <p:ph type="sldNum" sz="quarter" idx="5"/>
+          </p:nvPr>
+        </p:nvSpPr>
+        <p:spPr/>
+        <p:txBody>
+          <a:bodyPr/>
+          <a:lstStyle/>
+          <a:p>
+            <a:fld id="{76EE7F15-8406-4641-8D67-25DB3BF862B4}" type="slidenum">
+              <a:rPr lang="en-US" smtClean="0"/>
+              <a:t>3</a:t>
+            </a:fld>
+            <a:endParaRPr lang="en-US"/>
+          </a:p>
+        </p:txBody>
+      </p:sp>
+    </p:spTree>
+    <p:extLst>
+      <p:ext uri="{BB962C8B-B14F-4D97-AF65-F5344CB8AC3E}">
+        <p14:creationId xmlns:p14="http://schemas.microsoft.com/office/powerpoint/2010/main" val="2669078229"/>
+      </p:ext>
+    </p:extLst>
+  </p:cSld>
+  <p:clrMapOvr>
+    <a:masterClrMapping/>
+  </p:clrMapOvr>
+</p:notes>
+</file>
+
+<file path=ppt/notesSlides/notesSlide4.xml><?xml version="1.0" encoding="utf-8"?>
+<p:notes xmlns:a="http://schemas.openxmlformats.org/drawingml/2006/main" xmlns:r="http://schemas.openxmlformats.org/officeDocument/2006/relationships" xmlns:p="http://schemas.openxmlformats.org/presentationml/2006/main">
+  <p:cSld>
+    <p:spTree>
+      <p:nvGrpSpPr>
+        <p:cNvPr id="1" name=""/>
+        <p:cNvGrpSpPr/>
+        <p:nvPr/>
+      </p:nvGrpSpPr>
+      <p:grpSpPr>
+        <a:xfrm>
+          <a:off x="0" y="0"/>
+          <a:ext cx="0" cy="0"/>
+          <a:chOff x="0" y="0"/>
+          <a:chExt cx="0" cy="0"/>
+        </a:xfrm>
+      </p:grpSpPr>
+      <p:sp>
+        <p:nvSpPr>
+          <p:cNvPr id="2" name="Slide Image Placeholder 1"/>
+          <p:cNvSpPr>
+            <a:spLocks noGrp="1" noRot="1" noChangeAspect="1"/>
+          </p:cNvSpPr>
+          <p:nvPr>
+            <p:ph type="sldImg"/>
+          </p:nvPr>
+        </p:nvSpPr>
+        <p:spPr/>
+      </p:sp>
+      <p:sp>
+        <p:nvSpPr>
+          <p:cNvPr id="3" name="Notes Placeholder 2"/>
+          <p:cNvSpPr>
+            <a:spLocks noGrp="1"/>
+          </p:cNvSpPr>
+          <p:nvPr>
+            <p:ph type="body" idx="1"/>
+          </p:nvPr>
+        </p:nvSpPr>
+        <p:spPr/>
+        <p:txBody>
+          <a:bodyPr/>
+          <a:lstStyle/>
+          <a:p>
+            <a:r>
+              <a:rPr lang="en-US" dirty="0"/>
+              <a:t>Sam</a:t>
+            </a:r>
+          </a:p>
+        </p:txBody>
+      </p:sp>
+      <p:sp>
+        <p:nvSpPr>
+          <p:cNvPr id="4" name="Slide Number Placeholder 3"/>
+          <p:cNvSpPr>
+            <a:spLocks noGrp="1"/>
+          </p:cNvSpPr>
+          <p:nvPr>
+            <p:ph type="sldNum" sz="quarter" idx="5"/>
+          </p:nvPr>
+        </p:nvSpPr>
+        <p:spPr/>
+        <p:txBody>
+          <a:bodyPr/>
+          <a:lstStyle/>
+          <a:p>
+            <a:fld id="{76EE7F15-8406-4641-8D67-25DB3BF862B4}" type="slidenum">
+              <a:rPr lang="en-US" smtClean="0"/>
+              <a:t>4</a:t>
+            </a:fld>
+            <a:endParaRPr lang="en-US"/>
+          </a:p>
+        </p:txBody>
+      </p:sp>
+    </p:spTree>
+    <p:extLst>
+      <p:ext uri="{BB962C8B-B14F-4D97-AF65-F5344CB8AC3E}">
+        <p14:creationId xmlns:p14="http://schemas.microsoft.com/office/powerpoint/2010/main" val="620736697"/>
+      </p:ext>
+    </p:extLst>
+  </p:cSld>
+  <p:clrMapOvr>
+    <a:masterClrMapping/>
+  </p:clrMapOvr>
+</p:notes>
+</file>
+
+<file path=ppt/notesSlides/notesSlide5.xml><?xml version="1.0" encoding="utf-8"?>
+<p:notes xmlns:a="http://schemas.openxmlformats.org/drawingml/2006/main" xmlns:r="http://schemas.openxmlformats.org/officeDocument/2006/relationships" xmlns:p="http://schemas.openxmlformats.org/presentationml/2006/main">
+  <p:cSld>
+    <p:spTree>
+      <p:nvGrpSpPr>
+        <p:cNvPr id="1" name=""/>
+        <p:cNvGrpSpPr/>
+        <p:nvPr/>
+      </p:nvGrpSpPr>
+      <p:grpSpPr>
+        <a:xfrm>
+          <a:off x="0" y="0"/>
+          <a:ext cx="0" cy="0"/>
+          <a:chOff x="0" y="0"/>
+          <a:chExt cx="0" cy="0"/>
+        </a:xfrm>
+      </p:grpSpPr>
+      <p:sp>
+        <p:nvSpPr>
+          <p:cNvPr id="2" name="Slide Image Placeholder 1"/>
+          <p:cNvSpPr>
+            <a:spLocks noGrp="1" noRot="1" noChangeAspect="1"/>
+          </p:cNvSpPr>
+          <p:nvPr>
+            <p:ph type="sldImg"/>
+          </p:nvPr>
+        </p:nvSpPr>
+        <p:spPr/>
+      </p:sp>
+      <p:sp>
+        <p:nvSpPr>
+          <p:cNvPr id="3" name="Notes Placeholder 2"/>
+          <p:cNvSpPr>
+            <a:spLocks noGrp="1"/>
+          </p:cNvSpPr>
+          <p:nvPr>
+            <p:ph type="body" idx="1"/>
+          </p:nvPr>
+        </p:nvSpPr>
+        <p:spPr/>
+        <p:txBody>
+          <a:bodyPr/>
+          <a:lstStyle/>
+          <a:p>
+            <a:r>
+              <a:rPr lang="en-US" dirty="0"/>
+              <a:t>Sam</a:t>
+            </a:r>
+          </a:p>
+        </p:txBody>
+      </p:sp>
+      <p:sp>
+        <p:nvSpPr>
+          <p:cNvPr id="4" name="Slide Number Placeholder 3"/>
+          <p:cNvSpPr>
+            <a:spLocks noGrp="1"/>
+          </p:cNvSpPr>
+          <p:nvPr>
+            <p:ph type="sldNum" sz="quarter" idx="5"/>
+          </p:nvPr>
+        </p:nvSpPr>
+        <p:spPr/>
+        <p:txBody>
+          <a:bodyPr/>
+          <a:lstStyle/>
+          <a:p>
+            <a:fld id="{76EE7F15-8406-4641-8D67-25DB3BF862B4}" type="slidenum">
+              <a:rPr lang="en-US" smtClean="0"/>
+              <a:t>5</a:t>
+            </a:fld>
+            <a:endParaRPr lang="en-US"/>
+          </a:p>
+        </p:txBody>
+      </p:sp>
+    </p:spTree>
+    <p:extLst>
+      <p:ext uri="{BB962C8B-B14F-4D97-AF65-F5344CB8AC3E}">
+        <p14:creationId xmlns:p14="http://schemas.microsoft.com/office/powerpoint/2010/main" val="3753655465"/>
+      </p:ext>
+    </p:extLst>
+  </p:cSld>
+  <p:clrMapOvr>
+    <a:masterClrMapping/>
+  </p:clrMapOvr>
+</p:notes>
+</file>
+
+<file path=ppt/notesSlides/notesSlide6.xml><?xml version="1.0" encoding="utf-8"?>
+<p:notes xmlns:a="http://schemas.openxmlformats.org/drawingml/2006/main" xmlns:r="http://schemas.openxmlformats.org/officeDocument/2006/relationships" xmlns:p="http://schemas.openxmlformats.org/presentationml/2006/main">
+  <p:cSld>
+    <p:spTree>
+      <p:nvGrpSpPr>
+        <p:cNvPr id="1" name=""/>
+        <p:cNvGrpSpPr/>
+        <p:nvPr/>
+      </p:nvGrpSpPr>
+      <p:grpSpPr>
+        <a:xfrm>
+          <a:off x="0" y="0"/>
+          <a:ext cx="0" cy="0"/>
+          <a:chOff x="0" y="0"/>
+          <a:chExt cx="0" cy="0"/>
+        </a:xfrm>
+      </p:grpSpPr>
+      <p:sp>
+        <p:nvSpPr>
+          <p:cNvPr id="2" name="Slide Image Placeholder 1"/>
+          <p:cNvSpPr>
+            <a:spLocks noGrp="1" noRot="1" noChangeAspect="1"/>
+          </p:cNvSpPr>
+          <p:nvPr>
+            <p:ph type="sldImg"/>
+          </p:nvPr>
+        </p:nvSpPr>
+        <p:spPr/>
+      </p:sp>
+      <p:sp>
+        <p:nvSpPr>
+          <p:cNvPr id="3" name="Notes Placeholder 2"/>
+          <p:cNvSpPr>
+            <a:spLocks noGrp="1"/>
+          </p:cNvSpPr>
+          <p:nvPr>
+            <p:ph type="body" idx="1"/>
+          </p:nvPr>
+        </p:nvSpPr>
+        <p:spPr/>
+        <p:txBody>
+          <a:bodyPr/>
+          <a:lstStyle/>
+          <a:p>
+            <a:r>
+              <a:rPr lang="en-US" dirty="0"/>
+              <a:t>Sam</a:t>
+            </a:r>
+          </a:p>
+        </p:txBody>
+      </p:sp>
+      <p:sp>
+        <p:nvSpPr>
+          <p:cNvPr id="4" name="Slide Number Placeholder 3"/>
+          <p:cNvSpPr>
+            <a:spLocks noGrp="1"/>
+          </p:cNvSpPr>
+          <p:nvPr>
+            <p:ph type="sldNum" sz="quarter" idx="5"/>
+          </p:nvPr>
+        </p:nvSpPr>
+        <p:spPr/>
+        <p:txBody>
+          <a:bodyPr/>
+          <a:lstStyle/>
+          <a:p>
+            <a:fld id="{76EE7F15-8406-4641-8D67-25DB3BF862B4}" type="slidenum">
+              <a:rPr lang="en-US" smtClean="0"/>
+              <a:t>6</a:t>
+            </a:fld>
+            <a:endParaRPr lang="en-US"/>
+          </a:p>
+        </p:txBody>
+      </p:sp>
+    </p:spTree>
+    <p:extLst>
+      <p:ext uri="{BB962C8B-B14F-4D97-AF65-F5344CB8AC3E}">
+        <p14:creationId xmlns:p14="http://schemas.microsoft.com/office/powerpoint/2010/main" val="2882463063"/>
+      </p:ext>
+    </p:extLst>
+  </p:cSld>
+  <p:clrMapOvr>
+    <a:masterClrMapping/>
+  </p:clrMapOvr>
+</p:notes>
+</file>
+
+<file path=ppt/notesSlides/notesSlide7.xml><?xml version="1.0" encoding="utf-8"?>
+<p:notes xmlns:a="http://schemas.openxmlformats.org/drawingml/2006/main" xmlns:r="http://schemas.openxmlformats.org/officeDocument/2006/relationships" xmlns:p="http://schemas.openxmlformats.org/presentationml/2006/main">
+  <p:cSld>
+    <p:spTree>
+      <p:nvGrpSpPr>
+        <p:cNvPr id="1" name=""/>
+        <p:cNvGrpSpPr/>
+        <p:nvPr/>
+      </p:nvGrpSpPr>
+      <p:grpSpPr>
+        <a:xfrm>
+          <a:off x="0" y="0"/>
+          <a:ext cx="0" cy="0"/>
+          <a:chOff x="0" y="0"/>
+          <a:chExt cx="0" cy="0"/>
+        </a:xfrm>
+      </p:grpSpPr>
+      <p:sp>
+        <p:nvSpPr>
+          <p:cNvPr id="2" name="Slide Image Placeholder 1"/>
+          <p:cNvSpPr>
+            <a:spLocks noGrp="1" noRot="1" noChangeAspect="1"/>
+          </p:cNvSpPr>
+          <p:nvPr>
+            <p:ph type="sldImg"/>
+          </p:nvPr>
+        </p:nvSpPr>
+        <p:spPr/>
+      </p:sp>
+      <p:sp>
+        <p:nvSpPr>
+          <p:cNvPr id="3" name="Notes Placeholder 2"/>
+          <p:cNvSpPr>
+            <a:spLocks noGrp="1"/>
+          </p:cNvSpPr>
+          <p:nvPr>
+            <p:ph type="body" idx="1"/>
+          </p:nvPr>
+        </p:nvSpPr>
+        <p:spPr/>
+        <p:txBody>
+          <a:bodyPr/>
+          <a:lstStyle/>
+          <a:p>
+            <a:r>
+              <a:rPr lang="en-US" dirty="0"/>
+              <a:t>Bassam</a:t>
+            </a:r>
           </a:p>
         </p:txBody>
       </p:sp>
@@ -698,7 +1379,181 @@
     </p:spTree>
     <p:extLst>
       <p:ext uri="{BB962C8B-B14F-4D97-AF65-F5344CB8AC3E}">
+        <p14:creationId xmlns:p14="http://schemas.microsoft.com/office/powerpoint/2010/main" val="1758311368"/>
+      </p:ext>
+    </p:extLst>
+  </p:cSld>
+  <p:clrMapOvr>
+    <a:masterClrMapping/>
+  </p:clrMapOvr>
+</p:notes>
+</file>
+
+<file path=ppt/notesSlides/notesSlide8.xml><?xml version="1.0" encoding="utf-8"?>
+<p:notes xmlns:a="http://schemas.openxmlformats.org/drawingml/2006/main" xmlns:r="http://schemas.openxmlformats.org/officeDocument/2006/relationships" xmlns:p="http://schemas.openxmlformats.org/presentationml/2006/main">
+  <p:cSld>
+    <p:spTree>
+      <p:nvGrpSpPr>
+        <p:cNvPr id="1" name=""/>
+        <p:cNvGrpSpPr/>
+        <p:nvPr/>
+      </p:nvGrpSpPr>
+      <p:grpSpPr>
+        <a:xfrm>
+          <a:off x="0" y="0"/>
+          <a:ext cx="0" cy="0"/>
+          <a:chOff x="0" y="0"/>
+          <a:chExt cx="0" cy="0"/>
+        </a:xfrm>
+      </p:grpSpPr>
+      <p:sp>
+        <p:nvSpPr>
+          <p:cNvPr id="2" name="Slide Image Placeholder 1"/>
+          <p:cNvSpPr>
+            <a:spLocks noGrp="1" noRot="1" noChangeAspect="1"/>
+          </p:cNvSpPr>
+          <p:nvPr>
+            <p:ph type="sldImg"/>
+          </p:nvPr>
+        </p:nvSpPr>
+        <p:spPr/>
+      </p:sp>
+      <p:sp>
+        <p:nvSpPr>
+          <p:cNvPr id="3" name="Notes Placeholder 2"/>
+          <p:cNvSpPr>
+            <a:spLocks noGrp="1"/>
+          </p:cNvSpPr>
+          <p:nvPr>
+            <p:ph type="body" idx="1"/>
+          </p:nvPr>
+        </p:nvSpPr>
+        <p:spPr/>
+        <p:txBody>
+          <a:bodyPr/>
+          <a:lstStyle/>
+          <a:p>
+            <a:r>
+              <a:rPr lang="en-US" dirty="0"/>
+              <a:t>Lei</a:t>
+            </a:r>
+          </a:p>
+        </p:txBody>
+      </p:sp>
+      <p:sp>
+        <p:nvSpPr>
+          <p:cNvPr id="4" name="Slide Number Placeholder 3"/>
+          <p:cNvSpPr>
+            <a:spLocks noGrp="1"/>
+          </p:cNvSpPr>
+          <p:nvPr>
+            <p:ph type="sldNum" sz="quarter" idx="5"/>
+          </p:nvPr>
+        </p:nvSpPr>
+        <p:spPr/>
+        <p:txBody>
+          <a:bodyPr/>
+          <a:lstStyle/>
+          <a:p>
+            <a:fld id="{76EE7F15-8406-4641-8D67-25DB3BF862B4}" type="slidenum">
+              <a:rPr lang="en-US" smtClean="0"/>
+              <a:t>8</a:t>
+            </a:fld>
+            <a:endParaRPr lang="en-US"/>
+          </a:p>
+        </p:txBody>
+      </p:sp>
+    </p:spTree>
+    <p:extLst>
+      <p:ext uri="{BB962C8B-B14F-4D97-AF65-F5344CB8AC3E}">
         <p14:creationId xmlns:p14="http://schemas.microsoft.com/office/powerpoint/2010/main" val="3989648659"/>
+      </p:ext>
+    </p:extLst>
+  </p:cSld>
+  <p:clrMapOvr>
+    <a:masterClrMapping/>
+  </p:clrMapOvr>
+</p:notes>
+</file>
+
+<file path=ppt/notesSlides/notesSlide9.xml><?xml version="1.0" encoding="utf-8"?>
+<p:notes xmlns:a="http://schemas.openxmlformats.org/drawingml/2006/main" xmlns:r="http://schemas.openxmlformats.org/officeDocument/2006/relationships" xmlns:p="http://schemas.openxmlformats.org/presentationml/2006/main">
+  <p:cSld>
+    <p:spTree>
+      <p:nvGrpSpPr>
+        <p:cNvPr id="1" name=""/>
+        <p:cNvGrpSpPr/>
+        <p:nvPr/>
+      </p:nvGrpSpPr>
+      <p:grpSpPr>
+        <a:xfrm>
+          <a:off x="0" y="0"/>
+          <a:ext cx="0" cy="0"/>
+          <a:chOff x="0" y="0"/>
+          <a:chExt cx="0" cy="0"/>
+        </a:xfrm>
+      </p:grpSpPr>
+      <p:sp>
+        <p:nvSpPr>
+          <p:cNvPr id="2" name="Slide Image Placeholder 1"/>
+          <p:cNvSpPr>
+            <a:spLocks noGrp="1" noRot="1" noChangeAspect="1"/>
+          </p:cNvSpPr>
+          <p:nvPr>
+            <p:ph type="sldImg"/>
+          </p:nvPr>
+        </p:nvSpPr>
+        <p:spPr/>
+      </p:sp>
+      <p:sp>
+        <p:nvSpPr>
+          <p:cNvPr id="3" name="Notes Placeholder 2"/>
+          <p:cNvSpPr>
+            <a:spLocks noGrp="1"/>
+          </p:cNvSpPr>
+          <p:nvPr>
+            <p:ph type="body" idx="1"/>
+          </p:nvPr>
+        </p:nvSpPr>
+        <p:spPr/>
+        <p:txBody>
+          <a:bodyPr/>
+          <a:lstStyle/>
+          <a:p>
+            <a:r>
+              <a:rPr lang="en-US" dirty="0"/>
+              <a:t>Lei</a:t>
+            </a:r>
+          </a:p>
+        </p:txBody>
+      </p:sp>
+      <p:sp>
+        <p:nvSpPr>
+          <p:cNvPr id="4" name="Slide Number Placeholder 3"/>
+          <p:cNvSpPr>
+            <a:spLocks noGrp="1"/>
+          </p:cNvSpPr>
+          <p:nvPr>
+            <p:ph type="sldNum" sz="quarter" idx="5"/>
+          </p:nvPr>
+        </p:nvSpPr>
+        <p:spPr/>
+        <p:txBody>
+          <a:bodyPr/>
+          <a:lstStyle/>
+          <a:p>
+            <a:fld id="{76EE7F15-8406-4641-8D67-25DB3BF862B4}" type="slidenum">
+              <a:rPr lang="en-US" smtClean="0"/>
+              <a:t>9</a:t>
+            </a:fld>
+            <a:endParaRPr lang="en-US"/>
+          </a:p>
+        </p:txBody>
+      </p:sp>
+    </p:spTree>
+    <p:extLst>
+      <p:ext uri="{BB962C8B-B14F-4D97-AF65-F5344CB8AC3E}">
+        <p14:creationId xmlns:p14="http://schemas.microsoft.com/office/powerpoint/2010/main" val="2272867888"/>
       </p:ext>
     </p:extLst>
   </p:cSld>
@@ -878,7 +1733,7 @@
           <a:p>
             <a:fld id="{48A87A34-81AB-432B-8DAE-1953F412C126}" type="datetimeFigureOut">
               <a:rPr lang="en-US" dirty="0"/>
-              <a:t>1/21/2020</a:t>
+              <a:t>1/23/2020</a:t>
             </a:fld>
             <a:endParaRPr lang="en-US" dirty="0"/>
           </a:p>
@@ -1140,7 +1995,7 @@
           <a:p>
             <a:fld id="{48A87A34-81AB-432B-8DAE-1953F412C126}" type="datetimeFigureOut">
               <a:rPr lang="en-US" dirty="0"/>
-              <a:t>1/21/2020</a:t>
+              <a:t>1/23/2020</a:t>
             </a:fld>
             <a:endParaRPr lang="en-US" dirty="0"/>
           </a:p>
@@ -1367,7 +2222,7 @@
             <a:fld id="{48A87A34-81AB-432B-8DAE-1953F412C126}" type="datetimeFigureOut">
               <a:rPr lang="en-US" dirty="0"/>
               <a:pPr/>
-              <a:t>1/21/2020</a:t>
+              <a:t>1/23/2020</a:t>
             </a:fld>
             <a:endParaRPr lang="en-US" dirty="0"/>
           </a:p>
@@ -1673,7 +2528,7 @@
             <a:fld id="{48A87A34-81AB-432B-8DAE-1953F412C126}" type="datetimeFigureOut">
               <a:rPr lang="en-US" dirty="0"/>
               <a:pPr/>
-              <a:t>1/21/2020</a:t>
+              <a:t>1/23/2020</a:t>
             </a:fld>
             <a:endParaRPr lang="en-US" dirty="0"/>
           </a:p>
@@ -2142,7 +2997,7 @@
             <a:fld id="{48A87A34-81AB-432B-8DAE-1953F412C126}" type="datetimeFigureOut">
               <a:rPr lang="en-US" dirty="0"/>
               <a:pPr/>
-              <a:t>1/21/2020</a:t>
+              <a:t>1/23/2020</a:t>
             </a:fld>
             <a:endParaRPr lang="en-US" dirty="0"/>
           </a:p>
@@ -2684,7 +3539,7 @@
           <a:p>
             <a:fld id="{48A87A34-81AB-432B-8DAE-1953F412C126}" type="datetimeFigureOut">
               <a:rPr lang="en-US" dirty="0"/>
-              <a:t>1/21/2020</a:t>
+              <a:t>1/23/2020</a:t>
             </a:fld>
             <a:endParaRPr lang="en-US" dirty="0"/>
           </a:p>
@@ -3453,7 +4308,7 @@
           <a:p>
             <a:fld id="{48A87A34-81AB-432B-8DAE-1953F412C126}" type="datetimeFigureOut">
               <a:rPr lang="en-US" dirty="0"/>
-              <a:t>1/21/2020</a:t>
+              <a:t>1/23/2020</a:t>
             </a:fld>
             <a:endParaRPr lang="en-US" dirty="0"/>
           </a:p>
@@ -3623,7 +4478,7 @@
           <a:p>
             <a:fld id="{48A87A34-81AB-432B-8DAE-1953F412C126}" type="datetimeFigureOut">
               <a:rPr lang="en-US" dirty="0"/>
-              <a:t>1/21/2020</a:t>
+              <a:t>1/23/2020</a:t>
             </a:fld>
             <a:endParaRPr lang="en-US" dirty="0"/>
           </a:p>
@@ -3842,7 +4697,7 @@
             <a:fld id="{48A87A34-81AB-432B-8DAE-1953F412C126}" type="datetimeFigureOut">
               <a:rPr lang="en-US" dirty="0"/>
               <a:pPr/>
-              <a:t>1/21/2020</a:t>
+              <a:t>1/23/2020</a:t>
             </a:fld>
             <a:endParaRPr lang="en-US" dirty="0"/>
           </a:p>
@@ -4017,7 +4872,7 @@
           <a:p>
             <a:fld id="{48A87A34-81AB-432B-8DAE-1953F412C126}" type="datetimeFigureOut">
               <a:rPr lang="en-US" dirty="0"/>
-              <a:t>1/21/2020</a:t>
+              <a:t>1/23/2020</a:t>
             </a:fld>
             <a:endParaRPr lang="en-US" dirty="0"/>
           </a:p>
@@ -4302,7 +5157,7 @@
             <a:fld id="{48A87A34-81AB-432B-8DAE-1953F412C126}" type="datetimeFigureOut">
               <a:rPr lang="en-US" dirty="0"/>
               <a:pPr/>
-              <a:t>1/21/2020</a:t>
+              <a:t>1/23/2020</a:t>
             </a:fld>
             <a:endParaRPr lang="en-US" dirty="0"/>
           </a:p>
@@ -4539,7 +5394,7 @@
           <a:p>
             <a:fld id="{48A87A34-81AB-432B-8DAE-1953F412C126}" type="datetimeFigureOut">
               <a:rPr lang="en-US" dirty="0"/>
-              <a:t>1/21/2020</a:t>
+              <a:t>1/23/2020</a:t>
             </a:fld>
             <a:endParaRPr lang="en-US" dirty="0"/>
           </a:p>
@@ -4913,7 +5768,7 @@
           <a:p>
             <a:fld id="{48A87A34-81AB-432B-8DAE-1953F412C126}" type="datetimeFigureOut">
               <a:rPr lang="en-US" dirty="0"/>
-              <a:t>1/21/2020</a:t>
+              <a:t>1/23/2020</a:t>
             </a:fld>
             <a:endParaRPr lang="en-US" dirty="0"/>
           </a:p>
@@ -5026,7 +5881,7 @@
           <a:p>
             <a:fld id="{48A87A34-81AB-432B-8DAE-1953F412C126}" type="datetimeFigureOut">
               <a:rPr lang="en-US" dirty="0"/>
-              <a:t>1/21/2020</a:t>
+              <a:t>1/23/2020</a:t>
             </a:fld>
             <a:endParaRPr lang="en-US" dirty="0"/>
           </a:p>
@@ -5116,7 +5971,7 @@
           <a:p>
             <a:fld id="{48A87A34-81AB-432B-8DAE-1953F412C126}" type="datetimeFigureOut">
               <a:rPr lang="en-US" dirty="0"/>
-              <a:t>1/21/2020</a:t>
+              <a:t>1/23/2020</a:t>
             </a:fld>
             <a:endParaRPr lang="en-US" dirty="0"/>
           </a:p>
@@ -5360,7 +6215,7 @@
           <a:p>
             <a:fld id="{48A87A34-81AB-432B-8DAE-1953F412C126}" type="datetimeFigureOut">
               <a:rPr lang="en-US" dirty="0"/>
-              <a:t>1/21/2020</a:t>
+              <a:t>1/23/2020</a:t>
             </a:fld>
             <a:endParaRPr lang="en-US" dirty="0"/>
           </a:p>
@@ -5612,7 +6467,7 @@
           <a:p>
             <a:fld id="{48A87A34-81AB-432B-8DAE-1953F412C126}" type="datetimeFigureOut">
               <a:rPr lang="en-US" dirty="0"/>
-              <a:t>1/21/2020</a:t>
+              <a:t>1/23/2020</a:t>
             </a:fld>
             <a:endParaRPr lang="en-US" dirty="0"/>
           </a:p>
@@ -5851,7 +6706,7 @@
             <a:fld id="{48A87A34-81AB-432B-8DAE-1953F412C126}" type="datetimeFigureOut">
               <a:rPr lang="en-US" dirty="0"/>
               <a:pPr/>
-              <a:t>1/21/2020</a:t>
+              <a:t>1/23/2020</a:t>
             </a:fld>
             <a:endParaRPr lang="en-US" dirty="0"/>
           </a:p>
@@ -6281,7 +7136,15 @@
           <a:p>
             <a:r>
               <a:rPr lang="en-US" dirty="0"/>
-              <a:t>US Fires </a:t>
+              <a:t>US </a:t>
+            </a:r>
+            <a:r>
+              <a:rPr lang="en-US" dirty="0" err="1"/>
+              <a:t>WildFires</a:t>
+            </a:r>
+            <a:r>
+              <a:rPr lang="en-US" dirty="0"/>
+              <a:t> </a:t>
             </a:r>
             <a:r>
               <a:rPr lang="en-US" sz="2000" dirty="0"/>
@@ -6401,7 +7264,7 @@
           </p:nvPr>
         </p:nvPicPr>
         <p:blipFill rotWithShape="1">
-          <a:blip r:embed="rId2"/>
+          <a:blip r:embed="rId3"/>
           <a:srcRect l="17389" r="12867"/>
           <a:stretch/>
         </p:blipFill>
@@ -6430,7 +7293,7 @@
           <p:nvPr/>
         </p:nvPicPr>
         <p:blipFill rotWithShape="1">
-          <a:blip r:embed="rId3"/>
+          <a:blip r:embed="rId4"/>
           <a:srcRect r="46867"/>
           <a:stretch/>
         </p:blipFill>
@@ -6497,7 +7360,7 @@
           <a:p>
             <a:r>
               <a:rPr lang="en-US" dirty="0"/>
-              <a:t>Discussion</a:t>
+              <a:t>Discussion/Post Mortem</a:t>
             </a:r>
           </a:p>
         </p:txBody>
@@ -6525,20 +7388,50 @@
           <a:p>
             <a:r>
               <a:rPr lang="en-US" dirty="0"/>
-              <a:t>States with low stats decrease the trends YOY/State to State</a:t>
-            </a:r>
-          </a:p>
-          <a:p>
-            <a:r>
-              <a:rPr lang="en-US" dirty="0"/>
-              <a:t>There are correlations between types of fire and fire size</a:t>
-            </a:r>
-          </a:p>
-          <a:p>
-            <a:r>
-              <a:rPr lang="en-US" dirty="0"/>
-              <a:t>There is an obvious concentration of fires on the West Coast from California up to Alaska</a:t>
-            </a:r>
+              <a:t>The data needed special encoding</a:t>
+            </a:r>
+          </a:p>
+          <a:p>
+            <a:endParaRPr lang="en-US" dirty="0"/>
+          </a:p>
+          <a:p>
+            <a:r>
+              <a:rPr lang="en-US" dirty="0"/>
+              <a:t>Exploration</a:t>
+            </a:r>
+          </a:p>
+          <a:p>
+            <a:pPr marL="0" indent="0">
+              <a:buNone/>
+            </a:pPr>
+            <a:endParaRPr lang="en-US" dirty="0"/>
+          </a:p>
+          <a:p>
+            <a:r>
+              <a:rPr lang="en-US" dirty="0"/>
+              <a:t>Limitations in the dataset</a:t>
+            </a:r>
+          </a:p>
+          <a:p>
+            <a:endParaRPr lang="en-US" dirty="0"/>
+          </a:p>
+          <a:p>
+            <a:r>
+              <a:rPr lang="en-US" dirty="0"/>
+              <a:t>Wish list</a:t>
+            </a:r>
+          </a:p>
+          <a:p>
+            <a:endParaRPr lang="en-US" dirty="0"/>
+          </a:p>
+          <a:p>
+            <a:endParaRPr lang="en-US" dirty="0"/>
+          </a:p>
+          <a:p>
+            <a:endParaRPr lang="en-US" dirty="0"/>
+          </a:p>
+          <a:p>
+            <a:endParaRPr lang="en-US" dirty="0"/>
           </a:p>
           <a:p>
             <a:endParaRPr lang="en-US" dirty="0"/>
@@ -6580,101 +7473,6 @@
           <p:cNvPr id="2" name="Title 1">
             <a:extLst>
               <a:ext uri="{FF2B5EF4-FFF2-40B4-BE49-F238E27FC236}">
-                <a16:creationId xmlns:a16="http://schemas.microsoft.com/office/drawing/2014/main" id="{98387A69-2263-46AA-8AC5-1C27CAA82C3A}"/>
-              </a:ext>
-            </a:extLst>
-          </p:cNvPr>
-          <p:cNvSpPr>
-            <a:spLocks noGrp="1"/>
-          </p:cNvSpPr>
-          <p:nvPr>
-            <p:ph type="title"/>
-          </p:nvPr>
-        </p:nvSpPr>
-        <p:spPr/>
-        <p:txBody>
-          <a:bodyPr/>
-          <a:lstStyle/>
-          <a:p>
-            <a:r>
-              <a:rPr lang="en-US" dirty="0"/>
-              <a:t>Post Mortem</a:t>
-            </a:r>
-          </a:p>
-        </p:txBody>
-      </p:sp>
-      <p:sp>
-        <p:nvSpPr>
-          <p:cNvPr id="3" name="Content Placeholder 2">
-            <a:extLst>
-              <a:ext uri="{FF2B5EF4-FFF2-40B4-BE49-F238E27FC236}">
-                <a16:creationId xmlns:a16="http://schemas.microsoft.com/office/drawing/2014/main" id="{70CA401D-F4E8-4FF1-88EE-CE6B70190D2C}"/>
-              </a:ext>
-            </a:extLst>
-          </p:cNvPr>
-          <p:cNvSpPr>
-            <a:spLocks noGrp="1"/>
-          </p:cNvSpPr>
-          <p:nvPr>
-            <p:ph idx="1"/>
-          </p:nvPr>
-        </p:nvSpPr>
-        <p:spPr/>
-        <p:txBody>
-          <a:bodyPr/>
-          <a:lstStyle/>
-          <a:p>
-            <a:r>
-              <a:rPr lang="en-US" dirty="0"/>
-              <a:t>The data needed special encoding</a:t>
-            </a:r>
-          </a:p>
-          <a:p>
-            <a:r>
-              <a:rPr lang="en-US" dirty="0"/>
-              <a:t>Filtering thru the full file and slicing and dicing states for more concise comparisons were tedious</a:t>
-            </a:r>
-          </a:p>
-          <a:p>
-            <a:endParaRPr lang="en-US" dirty="0"/>
-          </a:p>
-        </p:txBody>
-      </p:sp>
-    </p:spTree>
-    <p:extLst>
-      <p:ext uri="{BB962C8B-B14F-4D97-AF65-F5344CB8AC3E}">
-        <p14:creationId xmlns:p14="http://schemas.microsoft.com/office/powerpoint/2010/main" val="1655024986"/>
-      </p:ext>
-    </p:extLst>
-  </p:cSld>
-  <p:clrMapOvr>
-    <a:masterClrMapping/>
-  </p:clrMapOvr>
-</p:sld>
-</file>
-
-<file path=ppt/slides/slide13.xml><?xml version="1.0" encoding="utf-8"?>
-<p:sld xmlns:a="http://schemas.openxmlformats.org/drawingml/2006/main" xmlns:r="http://schemas.openxmlformats.org/officeDocument/2006/relationships" xmlns:p="http://schemas.openxmlformats.org/presentationml/2006/main">
-  <p:cSld>
-    <p:spTree>
-      <p:nvGrpSpPr>
-        <p:cNvPr id="1" name=""/>
-        <p:cNvGrpSpPr/>
-        <p:nvPr/>
-      </p:nvGrpSpPr>
-      <p:grpSpPr>
-        <a:xfrm>
-          <a:off x="0" y="0"/>
-          <a:ext cx="0" cy="0"/>
-          <a:chOff x="0" y="0"/>
-          <a:chExt cx="0" cy="0"/>
-        </a:xfrm>
-      </p:grpSpPr>
-      <p:sp>
-        <p:nvSpPr>
-          <p:cNvPr id="2" name="Title 1">
-            <a:extLst>
-              <a:ext uri="{FF2B5EF4-FFF2-40B4-BE49-F238E27FC236}">
                 <a16:creationId xmlns:a16="http://schemas.microsoft.com/office/drawing/2014/main" id="{5159D2E7-CEAC-46AF-86DD-878506A999F9}"/>
               </a:ext>
             </a:extLst>
@@ -6799,8 +7597,16 @@
         </p:nvSpPr>
         <p:spPr/>
         <p:txBody>
-          <a:bodyPr/>
-          <a:lstStyle/>
+          <a:bodyPr>
+            <a:normAutofit/>
+          </a:bodyPr>
+          <a:lstStyle/>
+          <a:p>
+            <a:r>
+              <a:rPr lang="en-US" dirty="0"/>
+              <a:t>Recent notable fires</a:t>
+            </a:r>
+          </a:p>
           <a:p>
             <a:r>
               <a:rPr lang="en-US" dirty="0"/>
@@ -6825,6 +7631,13 @@
             <a:pPr lvl="1"/>
             <a:r>
               <a:rPr lang="en-US" dirty="0"/>
+              <a:t>Trends in size/frequency YOY</a:t>
+            </a:r>
+          </a:p>
+          <a:p>
+            <a:pPr lvl="1"/>
+            <a:r>
+              <a:rPr lang="en-US" dirty="0"/>
               <a:t>Fire cause and size/frequency of fires</a:t>
             </a:r>
           </a:p>
@@ -6836,40 +7649,28 @@
             </a:r>
           </a:p>
           <a:p>
-            <a:pPr lvl="1"/>
-            <a:r>
-              <a:rPr lang="en-US" dirty="0"/>
-              <a:t>Trends in size/frequency YOY</a:t>
-            </a:r>
-          </a:p>
-          <a:p>
-            <a:r>
-              <a:rPr lang="en-US" dirty="0"/>
-              <a:t>Increase in average size of fires YOY</a:t>
-            </a:r>
-          </a:p>
-          <a:p>
-            <a:r>
-              <a:rPr lang="en-US" dirty="0"/>
-              <a:t>Lightning is biggest contributor to fire size</a:t>
-            </a:r>
-          </a:p>
-          <a:p>
-            <a:r>
-              <a:rPr lang="en-US" dirty="0"/>
-              <a:t>West Coast has the most fires (over 15K acres)</a:t>
-            </a:r>
-          </a:p>
-          <a:p>
-            <a:r>
-              <a:rPr lang="en-US" dirty="0"/>
-              <a:t>2015 is the most recent year of data - </a:t>
-            </a:r>
-            <a:r>
-              <a:rPr lang="en-US" dirty="0" err="1"/>
-              <a:t>limitor</a:t>
-            </a:r>
-            <a:endParaRPr lang="en-US" dirty="0"/>
+            <a:r>
+              <a:rPr lang="en-US" dirty="0"/>
+              <a:t>We found some strong correlations when </a:t>
+            </a:r>
+          </a:p>
+          <a:p>
+            <a:pPr marL="0" indent="0">
+              <a:buNone/>
+            </a:pPr>
+            <a:r>
+              <a:rPr lang="en-US" dirty="0"/>
+              <a:t>looking at sizes of fires but not strong enough</a:t>
+            </a:r>
+          </a:p>
+          <a:p>
+            <a:pPr marL="0" indent="0">
+              <a:buNone/>
+            </a:pPr>
+            <a:r>
+              <a:rPr lang="en-US" dirty="0"/>
+              <a:t>to prove causation</a:t>
+            </a:r>
           </a:p>
         </p:txBody>
       </p:sp>
@@ -6895,8 +7696,8 @@
         </p:blipFill>
         <p:spPr>
           <a:xfrm>
-            <a:off x="7731534" y="2613566"/>
-            <a:ext cx="3774666" cy="3186112"/>
+            <a:off x="7142725" y="2365065"/>
+            <a:ext cx="4363475" cy="3683113"/>
           </a:xfrm>
           <a:prstGeom prst="rect">
             <a:avLst/>
@@ -6979,13 +7780,21 @@
         </p:nvSpPr>
         <p:spPr/>
         <p:txBody>
-          <a:bodyPr/>
-          <a:lstStyle/>
-          <a:p>
-            <a:r>
-              <a:rPr lang="en-US" dirty="0"/>
-              <a:t>Is count or size of fires more significant?</a:t>
-            </a:r>
+          <a:bodyPr>
+            <a:normAutofit/>
+          </a:bodyPr>
+          <a:lstStyle/>
+          <a:p>
+            <a:r>
+              <a:rPr lang="en-US" dirty="0"/>
+              <a:t>Is count or size of fires more significant? </a:t>
+            </a:r>
+          </a:p>
+          <a:p>
+            <a:pPr marL="0" indent="0">
+              <a:buNone/>
+            </a:pPr>
+            <a:endParaRPr lang="en-US" dirty="0"/>
           </a:p>
           <a:p>
             <a:r>
@@ -6997,56 +7806,47 @@
             <a:pPr lvl="1"/>
             <a:r>
               <a:rPr lang="en-US" dirty="0"/>
-              <a:t>Is there a YOY trend in count of fires or size of fires?</a:t>
+              <a:t>Is there a consistent top cause of fire?</a:t>
             </a:r>
           </a:p>
           <a:p>
             <a:pPr lvl="1"/>
             <a:r>
               <a:rPr lang="en-US" dirty="0"/>
-              <a:t>Is there a consistent top cause of fire?</a:t>
+              <a:t>Are there causes that result primarily in the largest fires?</a:t>
+            </a:r>
+          </a:p>
+          <a:p>
+            <a:pPr marL="457200" lvl="1" indent="0">
+              <a:buNone/>
+            </a:pPr>
+            <a:endParaRPr lang="en-US" dirty="0"/>
+          </a:p>
+          <a:p>
+            <a:r>
+              <a:rPr lang="en-US" dirty="0"/>
+              <a:t>State data…?</a:t>
             </a:r>
           </a:p>
           <a:p>
             <a:pPr lvl="1"/>
             <a:r>
               <a:rPr lang="en-US" dirty="0"/>
-              <a:t>Are there causes that result primarily in the largest fires?</a:t>
+              <a:t>Are there any states that have trends YOY?</a:t>
             </a:r>
           </a:p>
           <a:p>
             <a:pPr lvl="1"/>
-            <a:r>
-              <a:rPr lang="en-US" dirty="0"/>
-              <a:t>Are fires avoidable for the most part? </a:t>
-            </a:r>
-          </a:p>
-          <a:p>
-            <a:pPr lvl="1"/>
-            <a:r>
-              <a:rPr lang="en-US" dirty="0"/>
-              <a:t>Are there correlations between cause of fire and fire size?</a:t>
-            </a:r>
-          </a:p>
-          <a:p>
-            <a:r>
-              <a:rPr lang="en-US" dirty="0"/>
-              <a:t>  State data…?</a:t>
-            </a:r>
-          </a:p>
-          <a:p>
-            <a:pPr lvl="1"/>
-            <a:r>
-              <a:rPr lang="en-US" dirty="0"/>
-              <a:t>Are there any states that have trends YOY?</a:t>
-            </a:r>
-          </a:p>
-          <a:p>
-            <a:pPr lvl="1"/>
-            <a:r>
-              <a:rPr lang="en-US" dirty="0"/>
-              <a:t>Are there correlations between weather and fire size by state?</a:t>
-            </a:r>
+            <a:endParaRPr lang="en-US" dirty="0"/>
+          </a:p>
+          <a:p>
+            <a:r>
+              <a:rPr lang="en-US" dirty="0"/>
+              <a:t>Which combinations of data have strong trends?</a:t>
+            </a:r>
+          </a:p>
+          <a:p>
+            <a:endParaRPr lang="en-US" dirty="0"/>
           </a:p>
         </p:txBody>
       </p:sp>
@@ -7131,7 +7931,7 @@
           <a:p>
             <a:r>
               <a:rPr lang="en-US" dirty="0"/>
-              <a:t>CSV file was found containing 23 years of fire data for the US</a:t>
+              <a:t>CSV file – 23 years of fire data for the US – missing data</a:t>
             </a:r>
           </a:p>
           <a:p>
@@ -7142,7 +7942,7 @@
             </a:r>
             <a:r>
               <a:rPr lang="en-US" dirty="0">
-                <a:hlinkClick r:id="rId2"/>
+                <a:hlinkClick r:id="rId3"/>
               </a:rPr>
               <a:t>https://doi.org/10.2737/RDS-2013-0009.4</a:t>
             </a:r>
@@ -7183,14 +7983,14 @@
           <p:nvPr/>
         </p:nvPicPr>
         <p:blipFill rotWithShape="1">
-          <a:blip r:embed="rId3"/>
+          <a:blip r:embed="rId4"/>
           <a:srcRect l="7434" t="4923"/>
           <a:stretch/>
         </p:blipFill>
         <p:spPr>
           <a:xfrm>
-            <a:off x="3026229" y="4963886"/>
-            <a:ext cx="6675664" cy="1730827"/>
+            <a:off x="2892199" y="4913644"/>
+            <a:ext cx="6407603" cy="1661326"/>
           </a:xfrm>
           <a:prstGeom prst="rect">
             <a:avLst/>
@@ -7232,7 +8032,7 @@
           <p:cNvPr id="2" name="Title 1">
             <a:extLst>
               <a:ext uri="{FF2B5EF4-FFF2-40B4-BE49-F238E27FC236}">
-                <a16:creationId xmlns:a16="http://schemas.microsoft.com/office/drawing/2014/main" id="{48BBDA52-5DBD-4270-A388-ABBD364887AC}"/>
+                <a16:creationId xmlns:a16="http://schemas.microsoft.com/office/drawing/2014/main" id="{19CD08C8-D4A6-4EC2-9C36-5C60792206C3}"/>
               </a:ext>
             </a:extLst>
           </p:cNvPr>
@@ -7257,10 +8057,40 @@
       </p:sp>
       <p:pic>
         <p:nvPicPr>
-          <p:cNvPr id="5" name="Content Placeholder 4">
+          <p:cNvPr id="7" name="Picture 6" descr="A screenshot of a cell phone&#10;&#10;Description automatically generated">
             <a:extLst>
               <a:ext uri="{FF2B5EF4-FFF2-40B4-BE49-F238E27FC236}">
-                <a16:creationId xmlns:a16="http://schemas.microsoft.com/office/drawing/2014/main" id="{A64F2B58-5CA1-426B-A747-A92BE8D5B21E}"/>
+                <a16:creationId xmlns:a16="http://schemas.microsoft.com/office/drawing/2014/main" id="{52A0C2FC-B938-4DFB-8071-DD5C2388041C}"/>
+              </a:ext>
+            </a:extLst>
+          </p:cNvPr>
+          <p:cNvPicPr>
+            <a:picLocks noChangeAspect="1"/>
+          </p:cNvPicPr>
+          <p:nvPr/>
+        </p:nvPicPr>
+        <p:blipFill>
+          <a:blip r:embed="rId3"/>
+          <a:stretch>
+            <a:fillRect/>
+          </a:stretch>
+        </p:blipFill>
+        <p:spPr>
+          <a:xfrm>
+            <a:off x="6411061" y="2861669"/>
+            <a:ext cx="5487650" cy="3658433"/>
+          </a:xfrm>
+          <a:prstGeom prst="rect">
+            <a:avLst/>
+          </a:prstGeom>
+        </p:spPr>
+      </p:pic>
+      <p:pic>
+        <p:nvPicPr>
+          <p:cNvPr id="11" name="Content Placeholder 10" descr="A screenshot of a cell phone&#10;&#10;Description automatically generated">
+            <a:extLst>
+              <a:ext uri="{FF2B5EF4-FFF2-40B4-BE49-F238E27FC236}">
+                <a16:creationId xmlns:a16="http://schemas.microsoft.com/office/drawing/2014/main" id="{D7089094-FB63-4278-92AA-B5253A756850}"/>
               </a:ext>
             </a:extLst>
           </p:cNvPr>
@@ -7272,22 +8102,52 @@
           </p:nvPr>
         </p:nvPicPr>
         <p:blipFill>
-          <a:blip r:embed="rId2"/>
+          <a:blip r:embed="rId4"/>
           <a:stretch>
             <a:fillRect/>
           </a:stretch>
         </p:blipFill>
         <p:spPr>
           <a:xfrm>
-            <a:off x="2876550" y="2193925"/>
-            <a:ext cx="6438900" cy="4024313"/>
-          </a:xfrm>
+            <a:off x="293290" y="2861668"/>
+            <a:ext cx="5487650" cy="3658433"/>
+          </a:xfrm>
+        </p:spPr>
+      </p:pic>
+      <p:pic>
+        <p:nvPicPr>
+          <p:cNvPr id="3" name="Picture 2">
+            <a:extLst>
+              <a:ext uri="{FF2B5EF4-FFF2-40B4-BE49-F238E27FC236}">
+                <a16:creationId xmlns:a16="http://schemas.microsoft.com/office/drawing/2014/main" id="{DBD354B3-5182-4A5C-8643-C862C4D6A5E1}"/>
+              </a:ext>
+            </a:extLst>
+          </p:cNvPr>
+          <p:cNvPicPr>
+            <a:picLocks noChangeAspect="1"/>
+          </p:cNvPicPr>
+          <p:nvPr/>
+        </p:nvPicPr>
+        <p:blipFill>
+          <a:blip r:embed="rId5"/>
+          <a:stretch>
+            <a:fillRect/>
+          </a:stretch>
+        </p:blipFill>
+        <p:spPr>
+          <a:xfrm>
+            <a:off x="719139" y="307415"/>
+            <a:ext cx="4352921" cy="2206943"/>
+          </a:xfrm>
+          <a:prstGeom prst="rect">
+            <a:avLst/>
+          </a:prstGeom>
         </p:spPr>
       </p:pic>
     </p:spTree>
     <p:extLst>
       <p:ext uri="{BB962C8B-B14F-4D97-AF65-F5344CB8AC3E}">
-        <p14:creationId xmlns:p14="http://schemas.microsoft.com/office/powerpoint/2010/main" val="3255844021"/>
+        <p14:creationId xmlns:p14="http://schemas.microsoft.com/office/powerpoint/2010/main" val="3189742200"/>
       </p:ext>
     </p:extLst>
   </p:cSld>
@@ -7319,7 +8179,7 @@
           <p:cNvPr id="2" name="Title 1">
             <a:extLst>
               <a:ext uri="{FF2B5EF4-FFF2-40B4-BE49-F238E27FC236}">
-                <a16:creationId xmlns:a16="http://schemas.microsoft.com/office/drawing/2014/main" id="{C0016DF1-4D43-4FBF-8D9F-5CD30271F800}"/>
+                <a16:creationId xmlns:a16="http://schemas.microsoft.com/office/drawing/2014/main" id="{19CD08C8-D4A6-4EC2-9C36-5C60792206C3}"/>
               </a:ext>
             </a:extLst>
           </p:cNvPr>
@@ -7344,42 +8204,10 @@
       </p:sp>
       <p:pic>
         <p:nvPicPr>
-          <p:cNvPr id="4" name="Content Placeholder 3">
+          <p:cNvPr id="3" name="Picture 2">
             <a:extLst>
               <a:ext uri="{FF2B5EF4-FFF2-40B4-BE49-F238E27FC236}">
-                <a16:creationId xmlns:a16="http://schemas.microsoft.com/office/drawing/2014/main" id="{5D7FB06B-F50D-4FC2-B577-FA36B058F27C}"/>
-              </a:ext>
-            </a:extLst>
-          </p:cNvPr>
-          <p:cNvPicPr>
-            <a:picLocks noGrp="1" noChangeAspect="1"/>
-          </p:cNvPicPr>
-          <p:nvPr>
-            <p:ph idx="1"/>
-          </p:nvPr>
-        </p:nvPicPr>
-        <p:blipFill>
-          <a:blip r:embed="rId2"/>
-          <a:stretch>
-            <a:fillRect/>
-          </a:stretch>
-        </p:blipFill>
-        <p:spPr>
-          <a:xfrm>
-            <a:off x="4255068" y="2057401"/>
-            <a:ext cx="7791675" cy="3895838"/>
-          </a:xfrm>
-          <a:prstGeom prst="rect">
-            <a:avLst/>
-          </a:prstGeom>
-        </p:spPr>
-      </p:pic>
-      <p:pic>
-        <p:nvPicPr>
-          <p:cNvPr id="5" name="Picture 4">
-            <a:extLst>
-              <a:ext uri="{FF2B5EF4-FFF2-40B4-BE49-F238E27FC236}">
-                <a16:creationId xmlns:a16="http://schemas.microsoft.com/office/drawing/2014/main" id="{673118E6-9FA8-44E2-BC01-6DEE144DC473}"/>
+                <a16:creationId xmlns:a16="http://schemas.microsoft.com/office/drawing/2014/main" id="{18B07742-D8AA-4997-85C4-57378BF1DEF9}"/>
               </a:ext>
             </a:extLst>
           </p:cNvPr>
@@ -7388,15 +8216,46 @@
           </p:cNvPicPr>
           <p:nvPr/>
         </p:nvPicPr>
-        <p:blipFill rotWithShape="1">
+        <p:blipFill>
           <a:blip r:embed="rId3"/>
-          <a:srcRect l="18119" t="4856"/>
-          <a:stretch/>
+          <a:stretch>
+            <a:fillRect/>
+          </a:stretch>
         </p:blipFill>
         <p:spPr>
           <a:xfrm>
-            <a:off x="111354" y="2416629"/>
-            <a:ext cx="3929742" cy="2908526"/>
+            <a:off x="1157287" y="3429000"/>
+            <a:ext cx="3476625" cy="1752600"/>
+          </a:xfrm>
+          <a:prstGeom prst="rect">
+            <a:avLst/>
+          </a:prstGeom>
+        </p:spPr>
+      </p:pic>
+      <p:pic>
+        <p:nvPicPr>
+          <p:cNvPr id="5" name="Picture 4">
+            <a:extLst>
+              <a:ext uri="{FF2B5EF4-FFF2-40B4-BE49-F238E27FC236}">
+                <a16:creationId xmlns:a16="http://schemas.microsoft.com/office/drawing/2014/main" id="{82FFAC81-33EA-485B-AF84-7BE3E2CA9648}"/>
+              </a:ext>
+            </a:extLst>
+          </p:cNvPr>
+          <p:cNvPicPr>
+            <a:picLocks noChangeAspect="1"/>
+          </p:cNvPicPr>
+          <p:nvPr/>
+        </p:nvPicPr>
+        <p:blipFill>
+          <a:blip r:embed="rId4"/>
+          <a:stretch>
+            <a:fillRect/>
+          </a:stretch>
+        </p:blipFill>
+        <p:spPr>
+          <a:xfrm>
+            <a:off x="5968773" y="2572654"/>
+            <a:ext cx="5896656" cy="3931104"/>
           </a:xfrm>
           <a:prstGeom prst="rect">
             <a:avLst/>
@@ -7406,7 +8265,7 @@
     </p:spTree>
     <p:extLst>
       <p:ext uri="{BB962C8B-B14F-4D97-AF65-F5344CB8AC3E}">
-        <p14:creationId xmlns:p14="http://schemas.microsoft.com/office/powerpoint/2010/main" val="2755994038"/>
+        <p14:creationId xmlns:p14="http://schemas.microsoft.com/office/powerpoint/2010/main" val="3758669070"/>
       </p:ext>
     </p:extLst>
   </p:cSld>
@@ -7438,7 +8297,7 @@
           <p:cNvPr id="2" name="Title 1">
             <a:extLst>
               <a:ext uri="{FF2B5EF4-FFF2-40B4-BE49-F238E27FC236}">
-                <a16:creationId xmlns:a16="http://schemas.microsoft.com/office/drawing/2014/main" id="{FF6EDBB6-D931-4711-B91E-6A4C7FFD5BEC}"/>
+                <a16:creationId xmlns:a16="http://schemas.microsoft.com/office/drawing/2014/main" id="{48BBDA52-5DBD-4270-A388-ABBD364887AC}"/>
               </a:ext>
             </a:extLst>
           </p:cNvPr>
@@ -7449,12 +8308,7 @@
             <p:ph type="title"/>
           </p:nvPr>
         </p:nvSpPr>
-        <p:spPr>
-          <a:xfrm>
-            <a:off x="2974527" y="797030"/>
-            <a:ext cx="8610600" cy="1293028"/>
-          </a:xfrm>
-        </p:spPr>
+        <p:spPr/>
         <p:txBody>
           <a:bodyPr/>
           <a:lstStyle/>
@@ -7468,39 +8322,39 @@
       </p:sp>
       <p:pic>
         <p:nvPicPr>
-          <p:cNvPr id="5" name="Picture 4">
+          <p:cNvPr id="5" name="Content Placeholder 4">
             <a:extLst>
               <a:ext uri="{FF2B5EF4-FFF2-40B4-BE49-F238E27FC236}">
-                <a16:creationId xmlns:a16="http://schemas.microsoft.com/office/drawing/2014/main" id="{5BCE6CFD-A2E2-4A3C-A5AE-5BF174924CF5}"/>
+                <a16:creationId xmlns:a16="http://schemas.microsoft.com/office/drawing/2014/main" id="{A64F2B58-5CA1-426B-A747-A92BE8D5B21E}"/>
               </a:ext>
             </a:extLst>
           </p:cNvPr>
           <p:cNvPicPr>
-            <a:picLocks noChangeAspect="1"/>
+            <a:picLocks noGrp="1" noChangeAspect="1"/>
           </p:cNvPicPr>
-          <p:nvPr/>
+          <p:nvPr>
+            <p:ph idx="1"/>
+          </p:nvPr>
         </p:nvPicPr>
-        <p:blipFill rotWithShape="1">
+        <p:blipFill>
           <a:blip r:embed="rId3"/>
-          <a:srcRect l="8821"/>
-          <a:stretch/>
+          <a:stretch>
+            <a:fillRect/>
+          </a:stretch>
         </p:blipFill>
         <p:spPr>
           <a:xfrm>
-            <a:off x="106141" y="398115"/>
-            <a:ext cx="6272888" cy="1312990"/>
-          </a:xfrm>
-          <a:prstGeom prst="rect">
-            <a:avLst/>
-          </a:prstGeom>
+            <a:off x="6455235" y="2986097"/>
+            <a:ext cx="5681237" cy="3550773"/>
+          </a:xfrm>
         </p:spPr>
       </p:pic>
       <p:pic>
         <p:nvPicPr>
-          <p:cNvPr id="6" name="Picture 5" descr="A picture containing accessory, umbrella, clock&#10;&#10;Description automatically generated">
+          <p:cNvPr id="4" name="Picture 3">
             <a:extLst>
               <a:ext uri="{FF2B5EF4-FFF2-40B4-BE49-F238E27FC236}">
-                <a16:creationId xmlns:a16="http://schemas.microsoft.com/office/drawing/2014/main" id="{96918972-B59D-4872-A06A-E819018B38F1}"/>
+                <a16:creationId xmlns:a16="http://schemas.microsoft.com/office/drawing/2014/main" id="{661D2AEA-AC82-4BB8-9B2F-606260AFD96D}"/>
               </a:ext>
             </a:extLst>
           </p:cNvPr>
@@ -7517,8 +8371,38 @@
         </p:blipFill>
         <p:spPr>
           <a:xfrm>
-            <a:off x="2747976" y="1997804"/>
-            <a:ext cx="6189872" cy="4702627"/>
+            <a:off x="38098" y="764373"/>
+            <a:ext cx="7472591" cy="1293028"/>
+          </a:xfrm>
+          <a:prstGeom prst="rect">
+            <a:avLst/>
+          </a:prstGeom>
+        </p:spPr>
+      </p:pic>
+      <p:pic>
+        <p:nvPicPr>
+          <p:cNvPr id="7" name="Picture 6">
+            <a:extLst>
+              <a:ext uri="{FF2B5EF4-FFF2-40B4-BE49-F238E27FC236}">
+                <a16:creationId xmlns:a16="http://schemas.microsoft.com/office/drawing/2014/main" id="{2574CF1D-72EB-44B0-B6A6-92C719FD0519}"/>
+              </a:ext>
+            </a:extLst>
+          </p:cNvPr>
+          <p:cNvPicPr>
+            <a:picLocks noChangeAspect="1"/>
+          </p:cNvPicPr>
+          <p:nvPr/>
+        </p:nvPicPr>
+        <p:blipFill>
+          <a:blip r:embed="rId5"/>
+          <a:stretch>
+            <a:fillRect/>
+          </a:stretch>
+        </p:blipFill>
+        <p:spPr>
+          <a:xfrm>
+            <a:off x="78919" y="2986097"/>
+            <a:ext cx="6036312" cy="3550772"/>
           </a:xfrm>
           <a:prstGeom prst="rect">
             <a:avLst/>
@@ -7528,7 +8412,7 @@
     </p:spTree>
     <p:extLst>
       <p:ext uri="{BB962C8B-B14F-4D97-AF65-F5344CB8AC3E}">
-        <p14:creationId xmlns:p14="http://schemas.microsoft.com/office/powerpoint/2010/main" val="2482300198"/>
+        <p14:creationId xmlns:p14="http://schemas.microsoft.com/office/powerpoint/2010/main" val="3255844021"/>
       </p:ext>
     </p:extLst>
   </p:cSld>
@@ -7560,7 +8444,7 @@
           <p:cNvPr id="2" name="Title 1">
             <a:extLst>
               <a:ext uri="{FF2B5EF4-FFF2-40B4-BE49-F238E27FC236}">
-                <a16:creationId xmlns:a16="http://schemas.microsoft.com/office/drawing/2014/main" id="{19CD08C8-D4A6-4EC2-9C36-5C60792206C3}"/>
+                <a16:creationId xmlns:a16="http://schemas.microsoft.com/office/drawing/2014/main" id="{FF6EDBB6-D931-4711-B91E-6A4C7FFD5BEC}"/>
               </a:ext>
             </a:extLst>
           </p:cNvPr>
@@ -7571,7 +8455,12 @@
             <p:ph type="title"/>
           </p:nvPr>
         </p:nvSpPr>
-        <p:spPr/>
+        <p:spPr>
+          <a:xfrm>
+            <a:off x="2974527" y="797030"/>
+            <a:ext cx="8610600" cy="1293028"/>
+          </a:xfrm>
+        </p:spPr>
         <p:txBody>
           <a:bodyPr/>
           <a:lstStyle/>
@@ -7585,10 +8474,10 @@
       </p:sp>
       <p:pic>
         <p:nvPicPr>
-          <p:cNvPr id="7" name="Picture 6" descr="A screenshot of a cell phone&#10;&#10;Description automatically generated">
+          <p:cNvPr id="5" name="Picture 4">
             <a:extLst>
               <a:ext uri="{FF2B5EF4-FFF2-40B4-BE49-F238E27FC236}">
-                <a16:creationId xmlns:a16="http://schemas.microsoft.com/office/drawing/2014/main" id="{52A0C2FC-B938-4DFB-8071-DD5C2388041C}"/>
+                <a16:creationId xmlns:a16="http://schemas.microsoft.com/office/drawing/2014/main" id="{5BCE6CFD-A2E2-4A3C-A5AE-5BF174924CF5}"/>
               </a:ext>
             </a:extLst>
           </p:cNvPr>
@@ -7597,16 +8486,15 @@
           </p:cNvPicPr>
           <p:nvPr/>
         </p:nvPicPr>
-        <p:blipFill>
-          <a:blip r:embed="rId2"/>
-          <a:stretch>
-            <a:fillRect/>
-          </a:stretch>
+        <p:blipFill rotWithShape="1">
+          <a:blip r:embed="rId3"/>
+          <a:srcRect l="8821"/>
+          <a:stretch/>
         </p:blipFill>
         <p:spPr>
           <a:xfrm>
-            <a:off x="304175" y="2861669"/>
-            <a:ext cx="5487650" cy="3658433"/>
+            <a:off x="106141" y="398115"/>
+            <a:ext cx="6272888" cy="1312990"/>
           </a:xfrm>
           <a:prstGeom prst="rect">
             <a:avLst/>
@@ -7615,39 +8503,10 @@
       </p:pic>
       <p:pic>
         <p:nvPicPr>
-          <p:cNvPr id="11" name="Content Placeholder 10" descr="A screenshot of a cell phone&#10;&#10;Description automatically generated">
+          <p:cNvPr id="6" name="Picture 5" descr="A picture containing accessory, umbrella, clock&#10;&#10;Description automatically generated">
             <a:extLst>
               <a:ext uri="{FF2B5EF4-FFF2-40B4-BE49-F238E27FC236}">
-                <a16:creationId xmlns:a16="http://schemas.microsoft.com/office/drawing/2014/main" id="{D7089094-FB63-4278-92AA-B5253A756850}"/>
-              </a:ext>
-            </a:extLst>
-          </p:cNvPr>
-          <p:cNvPicPr>
-            <a:picLocks noGrp="1" noChangeAspect="1"/>
-          </p:cNvPicPr>
-          <p:nvPr>
-            <p:ph idx="1"/>
-          </p:nvPr>
-        </p:nvPicPr>
-        <p:blipFill>
-          <a:blip r:embed="rId3"/>
-          <a:stretch>
-            <a:fillRect/>
-          </a:stretch>
-        </p:blipFill>
-        <p:spPr>
-          <a:xfrm>
-            <a:off x="6400175" y="2861669"/>
-            <a:ext cx="5487650" cy="3658433"/>
-          </a:xfrm>
-        </p:spPr>
-      </p:pic>
-      <p:pic>
-        <p:nvPicPr>
-          <p:cNvPr id="3" name="Picture 2">
-            <a:extLst>
-              <a:ext uri="{FF2B5EF4-FFF2-40B4-BE49-F238E27FC236}">
-                <a16:creationId xmlns:a16="http://schemas.microsoft.com/office/drawing/2014/main" id="{DBD354B3-5182-4A5C-8643-C862C4D6A5E1}"/>
+                <a16:creationId xmlns:a16="http://schemas.microsoft.com/office/drawing/2014/main" id="{96918972-B59D-4872-A06A-E819018B38F1}"/>
               </a:ext>
             </a:extLst>
           </p:cNvPr>
@@ -7664,8 +8523,8 @@
         </p:blipFill>
         <p:spPr>
           <a:xfrm>
-            <a:off x="719139" y="307415"/>
-            <a:ext cx="4352921" cy="2206943"/>
+            <a:off x="2747976" y="1997804"/>
+            <a:ext cx="6189872" cy="4702627"/>
           </a:xfrm>
           <a:prstGeom prst="rect">
             <a:avLst/>
@@ -7675,7 +8534,7 @@
     </p:spTree>
     <p:extLst>
       <p:ext uri="{BB962C8B-B14F-4D97-AF65-F5344CB8AC3E}">
-        <p14:creationId xmlns:p14="http://schemas.microsoft.com/office/powerpoint/2010/main" val="3189742200"/>
+        <p14:creationId xmlns:p14="http://schemas.microsoft.com/office/powerpoint/2010/main" val="2482300198"/>
       </p:ext>
     </p:extLst>
   </p:cSld>
@@ -7707,7 +8566,7 @@
           <p:cNvPr id="2" name="Title 1">
             <a:extLst>
               <a:ext uri="{FF2B5EF4-FFF2-40B4-BE49-F238E27FC236}">
-                <a16:creationId xmlns:a16="http://schemas.microsoft.com/office/drawing/2014/main" id="{19CD08C8-D4A6-4EC2-9C36-5C60792206C3}"/>
+                <a16:creationId xmlns:a16="http://schemas.microsoft.com/office/drawing/2014/main" id="{C0016DF1-4D43-4FBF-8D9F-5CD30271F800}"/>
               </a:ext>
             </a:extLst>
           </p:cNvPr>
@@ -7732,10 +8591,10 @@
       </p:sp>
       <p:pic>
         <p:nvPicPr>
-          <p:cNvPr id="6" name="Content Placeholder 5">
+          <p:cNvPr id="4" name="Content Placeholder 3">
             <a:extLst>
               <a:ext uri="{FF2B5EF4-FFF2-40B4-BE49-F238E27FC236}">
-                <a16:creationId xmlns:a16="http://schemas.microsoft.com/office/drawing/2014/main" id="{1ACD8209-20EA-45C1-960A-9E0F0941FBEC}"/>
+                <a16:creationId xmlns:a16="http://schemas.microsoft.com/office/drawing/2014/main" id="{5D7FB06B-F50D-4FC2-B577-FA36B058F27C}"/>
               </a:ext>
             </a:extLst>
           </p:cNvPr>
@@ -7747,15 +8606,15 @@
           </p:nvPr>
         </p:nvPicPr>
         <p:blipFill>
-          <a:blip r:embed="rId2"/>
+          <a:blip r:embed="rId3"/>
           <a:stretch>
             <a:fillRect/>
           </a:stretch>
         </p:blipFill>
         <p:spPr>
           <a:xfrm>
-            <a:off x="6411685" y="2888341"/>
-            <a:ext cx="5529944" cy="3686629"/>
+            <a:off x="4255068" y="2057401"/>
+            <a:ext cx="7791675" cy="3895838"/>
           </a:xfrm>
           <a:prstGeom prst="rect">
             <a:avLst/>
@@ -7764,10 +8623,10 @@
       </p:pic>
       <p:pic>
         <p:nvPicPr>
-          <p:cNvPr id="8" name="Picture 7">
+          <p:cNvPr id="5" name="Picture 4">
             <a:extLst>
               <a:ext uri="{FF2B5EF4-FFF2-40B4-BE49-F238E27FC236}">
-                <a16:creationId xmlns:a16="http://schemas.microsoft.com/office/drawing/2014/main" id="{6A9247FD-522C-40A1-9F88-941A37B17A2A}"/>
+                <a16:creationId xmlns:a16="http://schemas.microsoft.com/office/drawing/2014/main" id="{673118E6-9FA8-44E2-BC01-6DEE144DC473}"/>
               </a:ext>
             </a:extLst>
           </p:cNvPr>
@@ -7776,46 +8635,15 @@
           </p:cNvPicPr>
           <p:nvPr/>
         </p:nvPicPr>
-        <p:blipFill>
-          <a:blip r:embed="rId3"/>
-          <a:stretch>
-            <a:fillRect/>
-          </a:stretch>
+        <p:blipFill rotWithShape="1">
+          <a:blip r:embed="rId4"/>
+          <a:srcRect l="18119" t="4856"/>
+          <a:stretch/>
         </p:blipFill>
         <p:spPr>
           <a:xfrm>
-            <a:off x="250371" y="2888341"/>
-            <a:ext cx="5529944" cy="3686629"/>
-          </a:xfrm>
-          <a:prstGeom prst="rect">
-            <a:avLst/>
-          </a:prstGeom>
-        </p:spPr>
-      </p:pic>
-      <p:pic>
-        <p:nvPicPr>
-          <p:cNvPr id="3" name="Picture 2">
-            <a:extLst>
-              <a:ext uri="{FF2B5EF4-FFF2-40B4-BE49-F238E27FC236}">
-                <a16:creationId xmlns:a16="http://schemas.microsoft.com/office/drawing/2014/main" id="{18B07742-D8AA-4997-85C4-57378BF1DEF9}"/>
-              </a:ext>
-            </a:extLst>
-          </p:cNvPr>
-          <p:cNvPicPr>
-            <a:picLocks noChangeAspect="1"/>
-          </p:cNvPicPr>
-          <p:nvPr/>
-        </p:nvPicPr>
-        <p:blipFill>
-          <a:blip r:embed="rId4"/>
-          <a:stretch>
-            <a:fillRect/>
-          </a:stretch>
-        </p:blipFill>
-        <p:spPr>
-          <a:xfrm>
-            <a:off x="1157287" y="534587"/>
-            <a:ext cx="3476625" cy="1752600"/>
+            <a:off x="111354" y="2416629"/>
+            <a:ext cx="3929742" cy="2908526"/>
           </a:xfrm>
           <a:prstGeom prst="rect">
             <a:avLst/>
@@ -7825,7 +8653,7 @@
     </p:spTree>
     <p:extLst>
       <p:ext uri="{BB962C8B-B14F-4D97-AF65-F5344CB8AC3E}">
-        <p14:creationId xmlns:p14="http://schemas.microsoft.com/office/powerpoint/2010/main" val="3758669070"/>
+        <p14:creationId xmlns:p14="http://schemas.microsoft.com/office/powerpoint/2010/main" val="2755994038"/>
       </p:ext>
     </p:extLst>
   </p:cSld>

</xml_diff>

<commit_message>
attempting 2 pptx update again
</commit_message>
<xml_diff>
--- a/Presentation - Project 1.pptx
+++ b/Presentation - Project 1.pptx
@@ -220,7 +220,7 @@
           <a:p>
             <a:fld id="{DE6CF32A-27F4-4172-9B0D-B765DA71D8C8}" type="datetimeFigureOut">
               <a:rPr lang="en-US" smtClean="0"/>
-              <a:t>1/21/2020</a:t>
+              <a:t>1/23/2020</a:t>
             </a:fld>
             <a:endParaRPr lang="en-US"/>
           </a:p>
@@ -1733,7 +1733,7 @@
           <a:p>
             <a:fld id="{48A87A34-81AB-432B-8DAE-1953F412C126}" type="datetimeFigureOut">
               <a:rPr lang="en-US" dirty="0"/>
-              <a:t>1/21/2020</a:t>
+              <a:t>1/23/2020</a:t>
             </a:fld>
             <a:endParaRPr lang="en-US" dirty="0"/>
           </a:p>
@@ -1995,7 +1995,7 @@
           <a:p>
             <a:fld id="{48A87A34-81AB-432B-8DAE-1953F412C126}" type="datetimeFigureOut">
               <a:rPr lang="en-US" dirty="0"/>
-              <a:t>1/21/2020</a:t>
+              <a:t>1/23/2020</a:t>
             </a:fld>
             <a:endParaRPr lang="en-US" dirty="0"/>
           </a:p>
@@ -2222,7 +2222,7 @@
             <a:fld id="{48A87A34-81AB-432B-8DAE-1953F412C126}" type="datetimeFigureOut">
               <a:rPr lang="en-US" dirty="0"/>
               <a:pPr/>
-              <a:t>1/21/2020</a:t>
+              <a:t>1/23/2020</a:t>
             </a:fld>
             <a:endParaRPr lang="en-US" dirty="0"/>
           </a:p>
@@ -2528,7 +2528,7 @@
             <a:fld id="{48A87A34-81AB-432B-8DAE-1953F412C126}" type="datetimeFigureOut">
               <a:rPr lang="en-US" dirty="0"/>
               <a:pPr/>
-              <a:t>1/21/2020</a:t>
+              <a:t>1/23/2020</a:t>
             </a:fld>
             <a:endParaRPr lang="en-US" dirty="0"/>
           </a:p>
@@ -2997,7 +2997,7 @@
             <a:fld id="{48A87A34-81AB-432B-8DAE-1953F412C126}" type="datetimeFigureOut">
               <a:rPr lang="en-US" dirty="0"/>
               <a:pPr/>
-              <a:t>1/21/2020</a:t>
+              <a:t>1/23/2020</a:t>
             </a:fld>
             <a:endParaRPr lang="en-US" dirty="0"/>
           </a:p>
@@ -3539,7 +3539,7 @@
           <a:p>
             <a:fld id="{48A87A34-81AB-432B-8DAE-1953F412C126}" type="datetimeFigureOut">
               <a:rPr lang="en-US" dirty="0"/>
-              <a:t>1/21/2020</a:t>
+              <a:t>1/23/2020</a:t>
             </a:fld>
             <a:endParaRPr lang="en-US" dirty="0"/>
           </a:p>
@@ -4308,7 +4308,7 @@
           <a:p>
             <a:fld id="{48A87A34-81AB-432B-8DAE-1953F412C126}" type="datetimeFigureOut">
               <a:rPr lang="en-US" dirty="0"/>
-              <a:t>1/21/2020</a:t>
+              <a:t>1/23/2020</a:t>
             </a:fld>
             <a:endParaRPr lang="en-US" dirty="0"/>
           </a:p>
@@ -4478,7 +4478,7 @@
           <a:p>
             <a:fld id="{48A87A34-81AB-432B-8DAE-1953F412C126}" type="datetimeFigureOut">
               <a:rPr lang="en-US" dirty="0"/>
-              <a:t>1/21/2020</a:t>
+              <a:t>1/23/2020</a:t>
             </a:fld>
             <a:endParaRPr lang="en-US" dirty="0"/>
           </a:p>
@@ -4697,7 +4697,7 @@
             <a:fld id="{48A87A34-81AB-432B-8DAE-1953F412C126}" type="datetimeFigureOut">
               <a:rPr lang="en-US" dirty="0"/>
               <a:pPr/>
-              <a:t>1/21/2020</a:t>
+              <a:t>1/23/2020</a:t>
             </a:fld>
             <a:endParaRPr lang="en-US" dirty="0"/>
           </a:p>
@@ -4872,7 +4872,7 @@
           <a:p>
             <a:fld id="{48A87A34-81AB-432B-8DAE-1953F412C126}" type="datetimeFigureOut">
               <a:rPr lang="en-US" dirty="0"/>
-              <a:t>1/21/2020</a:t>
+              <a:t>1/23/2020</a:t>
             </a:fld>
             <a:endParaRPr lang="en-US" dirty="0"/>
           </a:p>
@@ -5157,7 +5157,7 @@
             <a:fld id="{48A87A34-81AB-432B-8DAE-1953F412C126}" type="datetimeFigureOut">
               <a:rPr lang="en-US" dirty="0"/>
               <a:pPr/>
-              <a:t>1/21/2020</a:t>
+              <a:t>1/23/2020</a:t>
             </a:fld>
             <a:endParaRPr lang="en-US" dirty="0"/>
           </a:p>
@@ -5394,7 +5394,7 @@
           <a:p>
             <a:fld id="{48A87A34-81AB-432B-8DAE-1953F412C126}" type="datetimeFigureOut">
               <a:rPr lang="en-US" dirty="0"/>
-              <a:t>1/21/2020</a:t>
+              <a:t>1/23/2020</a:t>
             </a:fld>
             <a:endParaRPr lang="en-US" dirty="0"/>
           </a:p>
@@ -5768,7 +5768,7 @@
           <a:p>
             <a:fld id="{48A87A34-81AB-432B-8DAE-1953F412C126}" type="datetimeFigureOut">
               <a:rPr lang="en-US" dirty="0"/>
-              <a:t>1/21/2020</a:t>
+              <a:t>1/23/2020</a:t>
             </a:fld>
             <a:endParaRPr lang="en-US" dirty="0"/>
           </a:p>
@@ -5881,7 +5881,7 @@
           <a:p>
             <a:fld id="{48A87A34-81AB-432B-8DAE-1953F412C126}" type="datetimeFigureOut">
               <a:rPr lang="en-US" dirty="0"/>
-              <a:t>1/21/2020</a:t>
+              <a:t>1/23/2020</a:t>
             </a:fld>
             <a:endParaRPr lang="en-US" dirty="0"/>
           </a:p>
@@ -5971,7 +5971,7 @@
           <a:p>
             <a:fld id="{48A87A34-81AB-432B-8DAE-1953F412C126}" type="datetimeFigureOut">
               <a:rPr lang="en-US" dirty="0"/>
-              <a:t>1/21/2020</a:t>
+              <a:t>1/23/2020</a:t>
             </a:fld>
             <a:endParaRPr lang="en-US" dirty="0"/>
           </a:p>
@@ -6215,7 +6215,7 @@
           <a:p>
             <a:fld id="{48A87A34-81AB-432B-8DAE-1953F412C126}" type="datetimeFigureOut">
               <a:rPr lang="en-US" dirty="0"/>
-              <a:t>1/21/2020</a:t>
+              <a:t>1/23/2020</a:t>
             </a:fld>
             <a:endParaRPr lang="en-US" dirty="0"/>
           </a:p>
@@ -6467,7 +6467,7 @@
           <a:p>
             <a:fld id="{48A87A34-81AB-432B-8DAE-1953F412C126}" type="datetimeFigureOut">
               <a:rPr lang="en-US" dirty="0"/>
-              <a:t>1/21/2020</a:t>
+              <a:t>1/23/2020</a:t>
             </a:fld>
             <a:endParaRPr lang="en-US" dirty="0"/>
           </a:p>
@@ -6706,7 +6706,7 @@
             <a:fld id="{48A87A34-81AB-432B-8DAE-1953F412C126}" type="datetimeFigureOut">
               <a:rPr lang="en-US" dirty="0"/>
               <a:pPr/>
-              <a:t>1/21/2020</a:t>
+              <a:t>1/23/2020</a:t>
             </a:fld>
             <a:endParaRPr lang="en-US" dirty="0"/>
           </a:p>
@@ -7388,28 +7388,47 @@
           <a:p>
             <a:r>
               <a:rPr lang="en-US" dirty="0"/>
-              <a:t>Visualization – </a:t>
-            </a:r>
-            <a:r>
-              <a:rPr lang="en-US" dirty="0" err="1"/>
-              <a:t>Jupyter</a:t>
-            </a:r>
-            <a:r>
-              <a:rPr lang="en-US" dirty="0"/>
-              <a:t> Notebook</a:t>
-            </a:r>
-          </a:p>
-          <a:p>
-            <a:r>
-              <a:rPr lang="en-US" dirty="0"/>
               <a:t>The data needed special encoding</a:t>
             </a:r>
           </a:p>
           <a:p>
-            <a:r>
-              <a:rPr lang="en-US" dirty="0"/>
-              <a:t>Filtering thru the full file and slicing and dicing states for more concise comparisons were tedious</a:t>
-            </a:r>
+            <a:endParaRPr lang="en-US" dirty="0"/>
+          </a:p>
+          <a:p>
+            <a:r>
+              <a:rPr lang="en-US" dirty="0"/>
+              <a:t>Exploration</a:t>
+            </a:r>
+          </a:p>
+          <a:p>
+            <a:pPr marL="0" indent="0">
+              <a:buNone/>
+            </a:pPr>
+            <a:endParaRPr lang="en-US" dirty="0"/>
+          </a:p>
+          <a:p>
+            <a:r>
+              <a:rPr lang="en-US" dirty="0"/>
+              <a:t>Limitations in the dataset</a:t>
+            </a:r>
+          </a:p>
+          <a:p>
+            <a:endParaRPr lang="en-US" dirty="0"/>
+          </a:p>
+          <a:p>
+            <a:r>
+              <a:rPr lang="en-US" dirty="0"/>
+              <a:t>Wish list</a:t>
+            </a:r>
+          </a:p>
+          <a:p>
+            <a:endParaRPr lang="en-US" dirty="0"/>
+          </a:p>
+          <a:p>
+            <a:endParaRPr lang="en-US" dirty="0"/>
+          </a:p>
+          <a:p>
+            <a:endParaRPr lang="en-US" dirty="0"/>
           </a:p>
           <a:p>
             <a:endParaRPr lang="en-US" dirty="0"/>

</xml_diff>